<commit_message>
voy trabajando en los sidebar
</commit_message>
<xml_diff>
--- a/public/SystemShapes.pptx
+++ b/public/SystemShapes.pptx
@@ -261,7 +261,7 @@
           <a:p>
             <a:fld id="{3E0CAB7A-0CE4-45EF-934B-7E004E9774A7}" type="datetimeFigureOut">
               <a:rPr lang="es-ES" smtClean="0"/>
-              <a:t>17/04/2024</a:t>
+              <a:t>06/05/2024</a:t>
             </a:fld>
             <a:endParaRPr lang="es-ES"/>
           </a:p>
@@ -459,7 +459,7 @@
           <a:p>
             <a:fld id="{3E0CAB7A-0CE4-45EF-934B-7E004E9774A7}" type="datetimeFigureOut">
               <a:rPr lang="es-ES" smtClean="0"/>
-              <a:t>17/04/2024</a:t>
+              <a:t>06/05/2024</a:t>
             </a:fld>
             <a:endParaRPr lang="es-ES"/>
           </a:p>
@@ -667,7 +667,7 @@
           <a:p>
             <a:fld id="{3E0CAB7A-0CE4-45EF-934B-7E004E9774A7}" type="datetimeFigureOut">
               <a:rPr lang="es-ES" smtClean="0"/>
-              <a:t>17/04/2024</a:t>
+              <a:t>06/05/2024</a:t>
             </a:fld>
             <a:endParaRPr lang="es-ES"/>
           </a:p>
@@ -865,7 +865,7 @@
           <a:p>
             <a:fld id="{3E0CAB7A-0CE4-45EF-934B-7E004E9774A7}" type="datetimeFigureOut">
               <a:rPr lang="es-ES" smtClean="0"/>
-              <a:t>17/04/2024</a:t>
+              <a:t>06/05/2024</a:t>
             </a:fld>
             <a:endParaRPr lang="es-ES"/>
           </a:p>
@@ -1140,7 +1140,7 @@
           <a:p>
             <a:fld id="{3E0CAB7A-0CE4-45EF-934B-7E004E9774A7}" type="datetimeFigureOut">
               <a:rPr lang="es-ES" smtClean="0"/>
-              <a:t>17/04/2024</a:t>
+              <a:t>06/05/2024</a:t>
             </a:fld>
             <a:endParaRPr lang="es-ES"/>
           </a:p>
@@ -1405,7 +1405,7 @@
           <a:p>
             <a:fld id="{3E0CAB7A-0CE4-45EF-934B-7E004E9774A7}" type="datetimeFigureOut">
               <a:rPr lang="es-ES" smtClean="0"/>
-              <a:t>17/04/2024</a:t>
+              <a:t>06/05/2024</a:t>
             </a:fld>
             <a:endParaRPr lang="es-ES"/>
           </a:p>
@@ -1817,7 +1817,7 @@
           <a:p>
             <a:fld id="{3E0CAB7A-0CE4-45EF-934B-7E004E9774A7}" type="datetimeFigureOut">
               <a:rPr lang="es-ES" smtClean="0"/>
-              <a:t>17/04/2024</a:t>
+              <a:t>06/05/2024</a:t>
             </a:fld>
             <a:endParaRPr lang="es-ES"/>
           </a:p>
@@ -1958,7 +1958,7 @@
           <a:p>
             <a:fld id="{3E0CAB7A-0CE4-45EF-934B-7E004E9774A7}" type="datetimeFigureOut">
               <a:rPr lang="es-ES" smtClean="0"/>
-              <a:t>17/04/2024</a:t>
+              <a:t>06/05/2024</a:t>
             </a:fld>
             <a:endParaRPr lang="es-ES"/>
           </a:p>
@@ -2071,7 +2071,7 @@
           <a:p>
             <a:fld id="{3E0CAB7A-0CE4-45EF-934B-7E004E9774A7}" type="datetimeFigureOut">
               <a:rPr lang="es-ES" smtClean="0"/>
-              <a:t>17/04/2024</a:t>
+              <a:t>06/05/2024</a:t>
             </a:fld>
             <a:endParaRPr lang="es-ES"/>
           </a:p>
@@ -2382,7 +2382,7 @@
           <a:p>
             <a:fld id="{3E0CAB7A-0CE4-45EF-934B-7E004E9774A7}" type="datetimeFigureOut">
               <a:rPr lang="es-ES" smtClean="0"/>
-              <a:t>17/04/2024</a:t>
+              <a:t>06/05/2024</a:t>
             </a:fld>
             <a:endParaRPr lang="es-ES"/>
           </a:p>
@@ -2670,7 +2670,7 @@
           <a:p>
             <a:fld id="{3E0CAB7A-0CE4-45EF-934B-7E004E9774A7}" type="datetimeFigureOut">
               <a:rPr lang="es-ES" smtClean="0"/>
-              <a:t>17/04/2024</a:t>
+              <a:t>06/05/2024</a:t>
             </a:fld>
             <a:endParaRPr lang="es-ES"/>
           </a:p>
@@ -2911,7 +2911,7 @@
           <a:p>
             <a:fld id="{3E0CAB7A-0CE4-45EF-934B-7E004E9774A7}" type="datetimeFigureOut">
               <a:rPr lang="es-ES" smtClean="0"/>
-              <a:t>17/04/2024</a:t>
+              <a:t>06/05/2024</a:t>
             </a:fld>
             <a:endParaRPr lang="es-ES"/>
           </a:p>
@@ -6710,855 +6710,114 @@
           </p:txBody>
         </p:sp>
       </p:grpSp>
-      <p:grpSp>
-        <p:nvGrpSpPr>
-          <p:cNvPr id="83" name="Grupo 82">
-            <a:extLst>
-              <a:ext uri="{FF2B5EF4-FFF2-40B4-BE49-F238E27FC236}">
-                <a16:creationId xmlns:a16="http://schemas.microsoft.com/office/drawing/2014/main" id="{1D4A9645-3AFF-EE57-70B5-0A1690AB18D2}"/>
-              </a:ext>
-            </a:extLst>
-          </p:cNvPr>
-          <p:cNvGrpSpPr/>
+      <p:sp>
+        <p:nvSpPr>
+          <p:cNvPr id="50" name="Rectángulo 49">
+            <a:extLst>
+              <a:ext uri="{FF2B5EF4-FFF2-40B4-BE49-F238E27FC236}">
+                <a16:creationId xmlns:a16="http://schemas.microsoft.com/office/drawing/2014/main" id="{6B2FC44C-BF9E-7D86-269C-AB843CC3BD28}"/>
+              </a:ext>
+            </a:extLst>
+          </p:cNvPr>
+          <p:cNvSpPr>
+            <a:spLocks/>
+          </p:cNvSpPr>
           <p:nvPr/>
-        </p:nvGrpSpPr>
-        <p:grpSpPr>
+        </p:nvSpPr>
+        <p:spPr>
           <a:xfrm>
             <a:off x="5693410" y="193675"/>
-            <a:ext cx="2484000" cy="2484000"/>
-            <a:chOff x="5693410" y="193675"/>
-            <a:chExt cx="2484000" cy="2484000"/>
+            <a:ext cx="1220985" cy="2484000"/>
           </a:xfrm>
-        </p:grpSpPr>
-        <p:sp>
-          <p:nvSpPr>
-            <p:cNvPr id="50" name="Rectángulo 49">
-              <a:extLst>
-                <a:ext uri="{FF2B5EF4-FFF2-40B4-BE49-F238E27FC236}">
-                  <a16:creationId xmlns:a16="http://schemas.microsoft.com/office/drawing/2014/main" id="{6B2FC44C-BF9E-7D86-269C-AB843CC3BD28}"/>
-                </a:ext>
-              </a:extLst>
-            </p:cNvPr>
-            <p:cNvSpPr>
-              <a:spLocks/>
-            </p:cNvSpPr>
-            <p:nvPr/>
-          </p:nvSpPr>
-          <p:spPr>
-            <a:xfrm>
-              <a:off x="5693410" y="193675"/>
-              <a:ext cx="1220985" cy="2484000"/>
-            </a:xfrm>
-            <a:prstGeom prst="rect">
-              <a:avLst/>
-            </a:prstGeom>
-            <a:solidFill>
-              <a:schemeClr val="tx2">
-                <a:lumMod val="25000"/>
-                <a:lumOff val="75000"/>
-              </a:schemeClr>
-            </a:solidFill>
-          </p:spPr>
-          <p:style>
-            <a:lnRef idx="2">
-              <a:schemeClr val="accent1">
-                <a:shade val="15000"/>
-              </a:schemeClr>
-            </a:lnRef>
-            <a:fillRef idx="1">
-              <a:schemeClr val="accent1"/>
-            </a:fillRef>
-            <a:effectRef idx="0">
-              <a:schemeClr val="accent1"/>
-            </a:effectRef>
-            <a:fontRef idx="minor">
-              <a:schemeClr val="lt1"/>
-            </a:fontRef>
-          </p:style>
-          <p:txBody>
-            <a:bodyPr rtlCol="0" anchor="ctr"/>
-            <a:lstStyle/>
-            <a:p>
-              <a:pPr algn="ctr"/>
-              <a:endParaRPr lang="es-ES"/>
-            </a:p>
-          </p:txBody>
-        </p:sp>
-        <p:sp>
-          <p:nvSpPr>
-            <p:cNvPr id="51" name="Rectángulo 50">
-              <a:extLst>
-                <a:ext uri="{FF2B5EF4-FFF2-40B4-BE49-F238E27FC236}">
-                  <a16:creationId xmlns:a16="http://schemas.microsoft.com/office/drawing/2014/main" id="{5C7E4DD3-8F4E-5027-25D6-FE7C98391C22}"/>
-                </a:ext>
-              </a:extLst>
-            </p:cNvPr>
-            <p:cNvSpPr>
-              <a:spLocks/>
-            </p:cNvSpPr>
-            <p:nvPr/>
-          </p:nvSpPr>
-          <p:spPr>
-            <a:xfrm>
-              <a:off x="6914395" y="193675"/>
-              <a:ext cx="1263015" cy="1327150"/>
-            </a:xfrm>
-            <a:prstGeom prst="rect">
-              <a:avLst/>
-            </a:prstGeom>
-            <a:solidFill>
-              <a:schemeClr val="accent1">
-                <a:lumMod val="60000"/>
-                <a:lumOff val="40000"/>
-              </a:schemeClr>
-            </a:solidFill>
-          </p:spPr>
-          <p:style>
-            <a:lnRef idx="2">
-              <a:schemeClr val="accent1">
-                <a:shade val="15000"/>
-              </a:schemeClr>
-            </a:lnRef>
-            <a:fillRef idx="1">
-              <a:schemeClr val="accent1"/>
-            </a:fillRef>
-            <a:effectRef idx="0">
-              <a:schemeClr val="accent1"/>
-            </a:effectRef>
-            <a:fontRef idx="minor">
-              <a:schemeClr val="lt1"/>
-            </a:fontRef>
-          </p:style>
-          <p:txBody>
-            <a:bodyPr rtlCol="0" anchor="ctr"/>
-            <a:lstStyle/>
-            <a:p>
-              <a:pPr algn="ctr"/>
-              <a:endParaRPr lang="es-ES" dirty="0"/>
-            </a:p>
-          </p:txBody>
-        </p:sp>
-        <p:grpSp>
-          <p:nvGrpSpPr>
-            <p:cNvPr id="26" name="Grupo 25">
-              <a:extLst>
-                <a:ext uri="{FF2B5EF4-FFF2-40B4-BE49-F238E27FC236}">
-                  <a16:creationId xmlns:a16="http://schemas.microsoft.com/office/drawing/2014/main" id="{82836046-2CB2-7C09-E997-8C1B7B4FF190}"/>
-                </a:ext>
-              </a:extLst>
-            </p:cNvPr>
-            <p:cNvGrpSpPr/>
-            <p:nvPr/>
-          </p:nvGrpSpPr>
-          <p:grpSpPr>
-            <a:xfrm>
-              <a:off x="6609634" y="417512"/>
-              <a:ext cx="304761" cy="631786"/>
-              <a:chOff x="6609634" y="527050"/>
-              <a:chExt cx="304761" cy="631786"/>
-            </a:xfrm>
-          </p:grpSpPr>
-          <p:grpSp>
-            <p:nvGrpSpPr>
-              <p:cNvPr id="19" name="Grupo 18">
-                <a:extLst>
-                  <a:ext uri="{FF2B5EF4-FFF2-40B4-BE49-F238E27FC236}">
-                    <a16:creationId xmlns:a16="http://schemas.microsoft.com/office/drawing/2014/main" id="{8793FB59-CB21-0938-1A4A-B34260696E2D}"/>
-                  </a:ext>
-                </a:extLst>
-              </p:cNvPr>
-              <p:cNvGrpSpPr/>
-              <p:nvPr/>
-            </p:nvGrpSpPr>
-            <p:grpSpPr>
-              <a:xfrm>
-                <a:off x="6609634" y="1050964"/>
-                <a:ext cx="304761" cy="107872"/>
-                <a:chOff x="6609634" y="1050964"/>
-                <a:chExt cx="304761" cy="107872"/>
-              </a:xfrm>
-            </p:grpSpPr>
-            <p:sp>
-              <p:nvSpPr>
-                <p:cNvPr id="13" name="Diagrama de flujo: conector 12">
-                  <a:extLst>
-                    <a:ext uri="{FF2B5EF4-FFF2-40B4-BE49-F238E27FC236}">
-                      <a16:creationId xmlns:a16="http://schemas.microsoft.com/office/drawing/2014/main" id="{3D39EEEC-5596-9394-B7E4-11923EB3F279}"/>
-                    </a:ext>
-                  </a:extLst>
-                </p:cNvPr>
-                <p:cNvSpPr/>
-                <p:nvPr/>
-              </p:nvSpPr>
-              <p:spPr>
-                <a:xfrm>
-                  <a:off x="6609634" y="1050964"/>
-                  <a:ext cx="107872" cy="107872"/>
-                </a:xfrm>
-                <a:prstGeom prst="flowChartConnector">
-                  <a:avLst/>
-                </a:prstGeom>
-                <a:solidFill>
-                  <a:schemeClr val="accent1"/>
-                </a:solidFill>
-              </p:spPr>
-              <p:style>
-                <a:lnRef idx="2">
-                  <a:schemeClr val="accent1">
-                    <a:shade val="15000"/>
-                  </a:schemeClr>
-                </a:lnRef>
-                <a:fillRef idx="1">
-                  <a:schemeClr val="accent1"/>
-                </a:fillRef>
-                <a:effectRef idx="0">
-                  <a:schemeClr val="accent1"/>
-                </a:effectRef>
-                <a:fontRef idx="minor">
-                  <a:schemeClr val="lt1"/>
-                </a:fontRef>
-              </p:style>
-              <p:txBody>
-                <a:bodyPr rtlCol="0" anchor="ctr"/>
-                <a:lstStyle/>
-                <a:p>
-                  <a:pPr algn="ctr"/>
-                  <a:endParaRPr lang="es-ES"/>
-                </a:p>
-              </p:txBody>
-            </p:sp>
-            <p:cxnSp>
-              <p:nvCxnSpPr>
-                <p:cNvPr id="15" name="Conector recto 14">
-                  <a:extLst>
-                    <a:ext uri="{FF2B5EF4-FFF2-40B4-BE49-F238E27FC236}">
-                      <a16:creationId xmlns:a16="http://schemas.microsoft.com/office/drawing/2014/main" id="{78FE7BC0-6D66-6327-7DAF-C97462ABB87F}"/>
-                    </a:ext>
-                  </a:extLst>
-                </p:cNvPr>
-                <p:cNvCxnSpPr>
-                  <a:cxnSpLocks/>
-                </p:cNvCxnSpPr>
-                <p:nvPr/>
-              </p:nvCxnSpPr>
-              <p:spPr>
-                <a:xfrm>
-                  <a:off x="6717506" y="1104900"/>
-                  <a:ext cx="196889" cy="0"/>
-                </a:xfrm>
-                <a:prstGeom prst="line">
-                  <a:avLst/>
-                </a:prstGeom>
-                <a:ln>
-                  <a:solidFill>
-                    <a:schemeClr val="tx1"/>
-                  </a:solidFill>
-                </a:ln>
-              </p:spPr>
-              <p:style>
-                <a:lnRef idx="2">
-                  <a:schemeClr val="accent1"/>
-                </a:lnRef>
-                <a:fillRef idx="0">
-                  <a:schemeClr val="accent1"/>
-                </a:fillRef>
-                <a:effectRef idx="1">
-                  <a:schemeClr val="accent1"/>
-                </a:effectRef>
-                <a:fontRef idx="minor">
-                  <a:schemeClr val="tx1"/>
-                </a:fontRef>
-              </p:style>
-            </p:cxnSp>
-          </p:grpSp>
-          <p:grpSp>
-            <p:nvGrpSpPr>
-              <p:cNvPr id="20" name="Grupo 19">
-                <a:extLst>
-                  <a:ext uri="{FF2B5EF4-FFF2-40B4-BE49-F238E27FC236}">
-                    <a16:creationId xmlns:a16="http://schemas.microsoft.com/office/drawing/2014/main" id="{17AB06CD-8B3E-A1D9-2B0A-7B296CDDF4D0}"/>
-                  </a:ext>
-                </a:extLst>
-              </p:cNvPr>
-              <p:cNvGrpSpPr/>
-              <p:nvPr/>
-            </p:nvGrpSpPr>
-            <p:grpSpPr>
-              <a:xfrm>
-                <a:off x="6609634" y="527050"/>
-                <a:ext cx="304761" cy="107872"/>
-                <a:chOff x="6609634" y="1050964"/>
-                <a:chExt cx="304761" cy="107872"/>
-              </a:xfrm>
-            </p:grpSpPr>
-            <p:sp>
-              <p:nvSpPr>
-                <p:cNvPr id="21" name="Diagrama de flujo: conector 20">
-                  <a:extLst>
-                    <a:ext uri="{FF2B5EF4-FFF2-40B4-BE49-F238E27FC236}">
-                      <a16:creationId xmlns:a16="http://schemas.microsoft.com/office/drawing/2014/main" id="{29A33F41-7D9F-E06C-DE58-2C381BB3E725}"/>
-                    </a:ext>
-                  </a:extLst>
-                </p:cNvPr>
-                <p:cNvSpPr/>
-                <p:nvPr/>
-              </p:nvSpPr>
-              <p:spPr>
-                <a:xfrm>
-                  <a:off x="6609634" y="1050964"/>
-                  <a:ext cx="107872" cy="107872"/>
-                </a:xfrm>
-                <a:prstGeom prst="flowChartConnector">
-                  <a:avLst/>
-                </a:prstGeom>
-                <a:solidFill>
-                  <a:schemeClr val="accent1"/>
-                </a:solidFill>
-              </p:spPr>
-              <p:style>
-                <a:lnRef idx="2">
-                  <a:schemeClr val="accent1">
-                    <a:shade val="15000"/>
-                  </a:schemeClr>
-                </a:lnRef>
-                <a:fillRef idx="1">
-                  <a:schemeClr val="accent1"/>
-                </a:fillRef>
-                <a:effectRef idx="0">
-                  <a:schemeClr val="accent1"/>
-                </a:effectRef>
-                <a:fontRef idx="minor">
-                  <a:schemeClr val="lt1"/>
-                </a:fontRef>
-              </p:style>
-              <p:txBody>
-                <a:bodyPr rtlCol="0" anchor="ctr"/>
-                <a:lstStyle/>
-                <a:p>
-                  <a:pPr algn="ctr"/>
-                  <a:endParaRPr lang="es-ES"/>
-                </a:p>
-              </p:txBody>
-            </p:sp>
-            <p:cxnSp>
-              <p:nvCxnSpPr>
-                <p:cNvPr id="22" name="Conector recto 21">
-                  <a:extLst>
-                    <a:ext uri="{FF2B5EF4-FFF2-40B4-BE49-F238E27FC236}">
-                      <a16:creationId xmlns:a16="http://schemas.microsoft.com/office/drawing/2014/main" id="{9927D561-3751-09EA-FD4B-1659110CD5F9}"/>
-                    </a:ext>
-                  </a:extLst>
-                </p:cNvPr>
-                <p:cNvCxnSpPr>
-                  <a:cxnSpLocks/>
-                </p:cNvCxnSpPr>
-                <p:nvPr/>
-              </p:nvCxnSpPr>
-              <p:spPr>
-                <a:xfrm>
-                  <a:off x="6717506" y="1104900"/>
-                  <a:ext cx="196889" cy="0"/>
-                </a:xfrm>
-                <a:prstGeom prst="line">
-                  <a:avLst/>
-                </a:prstGeom>
-                <a:ln>
-                  <a:solidFill>
-                    <a:schemeClr val="tx1"/>
-                  </a:solidFill>
-                </a:ln>
-              </p:spPr>
-              <p:style>
-                <a:lnRef idx="2">
-                  <a:schemeClr val="accent1"/>
-                </a:lnRef>
-                <a:fillRef idx="0">
-                  <a:schemeClr val="accent1"/>
-                </a:fillRef>
-                <a:effectRef idx="1">
-                  <a:schemeClr val="accent1"/>
-                </a:effectRef>
-                <a:fontRef idx="minor">
-                  <a:schemeClr val="tx1"/>
-                </a:fontRef>
-              </p:style>
-            </p:cxnSp>
-          </p:grpSp>
-          <p:grpSp>
-            <p:nvGrpSpPr>
-              <p:cNvPr id="23" name="Grupo 22">
-                <a:extLst>
-                  <a:ext uri="{FF2B5EF4-FFF2-40B4-BE49-F238E27FC236}">
-                    <a16:creationId xmlns:a16="http://schemas.microsoft.com/office/drawing/2014/main" id="{8C1A8AA9-A784-63A0-E367-068349B1074D}"/>
-                  </a:ext>
-                </a:extLst>
-              </p:cNvPr>
-              <p:cNvGrpSpPr/>
-              <p:nvPr/>
-            </p:nvGrpSpPr>
-            <p:grpSpPr>
-              <a:xfrm>
-                <a:off x="6609634" y="787440"/>
-                <a:ext cx="304761" cy="107872"/>
-                <a:chOff x="6609634" y="1050964"/>
-                <a:chExt cx="304761" cy="107872"/>
-              </a:xfrm>
-            </p:grpSpPr>
-            <p:sp>
-              <p:nvSpPr>
-                <p:cNvPr id="24" name="Diagrama de flujo: conector 23">
-                  <a:extLst>
-                    <a:ext uri="{FF2B5EF4-FFF2-40B4-BE49-F238E27FC236}">
-                      <a16:creationId xmlns:a16="http://schemas.microsoft.com/office/drawing/2014/main" id="{3A16DAC4-E3DF-0F8B-0471-D99E5830479D}"/>
-                    </a:ext>
-                  </a:extLst>
-                </p:cNvPr>
-                <p:cNvSpPr/>
-                <p:nvPr/>
-              </p:nvSpPr>
-              <p:spPr>
-                <a:xfrm>
-                  <a:off x="6609634" y="1050964"/>
-                  <a:ext cx="107872" cy="107872"/>
-                </a:xfrm>
-                <a:prstGeom prst="flowChartConnector">
-                  <a:avLst/>
-                </a:prstGeom>
-                <a:solidFill>
-                  <a:schemeClr val="accent1"/>
-                </a:solidFill>
-              </p:spPr>
-              <p:style>
-                <a:lnRef idx="2">
-                  <a:schemeClr val="accent1">
-                    <a:shade val="15000"/>
-                  </a:schemeClr>
-                </a:lnRef>
-                <a:fillRef idx="1">
-                  <a:schemeClr val="accent1"/>
-                </a:fillRef>
-                <a:effectRef idx="0">
-                  <a:schemeClr val="accent1"/>
-                </a:effectRef>
-                <a:fontRef idx="minor">
-                  <a:schemeClr val="lt1"/>
-                </a:fontRef>
-              </p:style>
-              <p:txBody>
-                <a:bodyPr rtlCol="0" anchor="ctr"/>
-                <a:lstStyle/>
-                <a:p>
-                  <a:pPr algn="ctr"/>
-                  <a:endParaRPr lang="es-ES"/>
-                </a:p>
-              </p:txBody>
-            </p:sp>
-            <p:cxnSp>
-              <p:nvCxnSpPr>
-                <p:cNvPr id="25" name="Conector recto 24">
-                  <a:extLst>
-                    <a:ext uri="{FF2B5EF4-FFF2-40B4-BE49-F238E27FC236}">
-                      <a16:creationId xmlns:a16="http://schemas.microsoft.com/office/drawing/2014/main" id="{BF192274-46F8-73B4-68F0-8E3F36656609}"/>
-                    </a:ext>
-                  </a:extLst>
-                </p:cNvPr>
-                <p:cNvCxnSpPr>
-                  <a:cxnSpLocks/>
-                </p:cNvCxnSpPr>
-                <p:nvPr/>
-              </p:nvCxnSpPr>
-              <p:spPr>
-                <a:xfrm>
-                  <a:off x="6717506" y="1104900"/>
-                  <a:ext cx="196889" cy="0"/>
-                </a:xfrm>
-                <a:prstGeom prst="line">
-                  <a:avLst/>
-                </a:prstGeom>
-                <a:ln>
-                  <a:solidFill>
-                    <a:schemeClr val="tx1"/>
-                  </a:solidFill>
-                </a:ln>
-              </p:spPr>
-              <p:style>
-                <a:lnRef idx="2">
-                  <a:schemeClr val="accent1"/>
-                </a:lnRef>
-                <a:fillRef idx="0">
-                  <a:schemeClr val="accent1"/>
-                </a:fillRef>
-                <a:effectRef idx="1">
-                  <a:schemeClr val="accent1"/>
-                </a:effectRef>
-                <a:fontRef idx="minor">
-                  <a:schemeClr val="tx1"/>
-                </a:fontRef>
-              </p:style>
-            </p:cxnSp>
-          </p:grpSp>
-        </p:grpSp>
-        <p:grpSp>
-          <p:nvGrpSpPr>
-            <p:cNvPr id="27" name="Grupo 26">
-              <a:extLst>
-                <a:ext uri="{FF2B5EF4-FFF2-40B4-BE49-F238E27FC236}">
-                  <a16:creationId xmlns:a16="http://schemas.microsoft.com/office/drawing/2014/main" id="{ED8D0A5B-A80A-4A13-87FB-984271B19A7B}"/>
-                </a:ext>
-              </a:extLst>
-            </p:cNvPr>
-            <p:cNvGrpSpPr/>
-            <p:nvPr/>
-          </p:nvGrpSpPr>
-          <p:grpSpPr>
-            <a:xfrm flipH="1">
-              <a:off x="6914395" y="417512"/>
-              <a:ext cx="304761" cy="631786"/>
-              <a:chOff x="6609634" y="527050"/>
-              <a:chExt cx="304761" cy="631786"/>
-            </a:xfrm>
-          </p:grpSpPr>
-          <p:grpSp>
-            <p:nvGrpSpPr>
-              <p:cNvPr id="28" name="Grupo 27">
-                <a:extLst>
-                  <a:ext uri="{FF2B5EF4-FFF2-40B4-BE49-F238E27FC236}">
-                    <a16:creationId xmlns:a16="http://schemas.microsoft.com/office/drawing/2014/main" id="{D442C673-8D03-FE2B-8592-33FBBDB3BA74}"/>
-                  </a:ext>
-                </a:extLst>
-              </p:cNvPr>
-              <p:cNvGrpSpPr/>
-              <p:nvPr/>
-            </p:nvGrpSpPr>
-            <p:grpSpPr>
-              <a:xfrm>
-                <a:off x="6609634" y="1050964"/>
-                <a:ext cx="304761" cy="107872"/>
-                <a:chOff x="6609634" y="1050964"/>
-                <a:chExt cx="304761" cy="107872"/>
-              </a:xfrm>
-            </p:grpSpPr>
-            <p:sp>
-              <p:nvSpPr>
-                <p:cNvPr id="35" name="Diagrama de flujo: conector 34">
-                  <a:extLst>
-                    <a:ext uri="{FF2B5EF4-FFF2-40B4-BE49-F238E27FC236}">
-                      <a16:creationId xmlns:a16="http://schemas.microsoft.com/office/drawing/2014/main" id="{CAB12386-2B0C-C694-1A93-5232C58584E9}"/>
-                    </a:ext>
-                  </a:extLst>
-                </p:cNvPr>
-                <p:cNvSpPr/>
-                <p:nvPr/>
-              </p:nvSpPr>
-              <p:spPr>
-                <a:xfrm>
-                  <a:off x="6609634" y="1050964"/>
-                  <a:ext cx="107872" cy="107872"/>
-                </a:xfrm>
-                <a:prstGeom prst="flowChartConnector">
-                  <a:avLst/>
-                </a:prstGeom>
-                <a:solidFill>
-                  <a:schemeClr val="accent1"/>
-                </a:solidFill>
-              </p:spPr>
-              <p:style>
-                <a:lnRef idx="2">
-                  <a:schemeClr val="accent1">
-                    <a:shade val="15000"/>
-                  </a:schemeClr>
-                </a:lnRef>
-                <a:fillRef idx="1">
-                  <a:schemeClr val="accent1"/>
-                </a:fillRef>
-                <a:effectRef idx="0">
-                  <a:schemeClr val="accent1"/>
-                </a:effectRef>
-                <a:fontRef idx="minor">
-                  <a:schemeClr val="lt1"/>
-                </a:fontRef>
-              </p:style>
-              <p:txBody>
-                <a:bodyPr rtlCol="0" anchor="ctr"/>
-                <a:lstStyle/>
-                <a:p>
-                  <a:pPr algn="ctr"/>
-                  <a:endParaRPr lang="es-ES"/>
-                </a:p>
-              </p:txBody>
-            </p:sp>
-            <p:cxnSp>
-              <p:nvCxnSpPr>
-                <p:cNvPr id="36" name="Conector recto 35">
-                  <a:extLst>
-                    <a:ext uri="{FF2B5EF4-FFF2-40B4-BE49-F238E27FC236}">
-                      <a16:creationId xmlns:a16="http://schemas.microsoft.com/office/drawing/2014/main" id="{5F8A7773-B2AC-C78E-1FDF-DD41FA46C430}"/>
-                    </a:ext>
-                  </a:extLst>
-                </p:cNvPr>
-                <p:cNvCxnSpPr>
-                  <a:cxnSpLocks/>
-                </p:cNvCxnSpPr>
-                <p:nvPr/>
-              </p:nvCxnSpPr>
-              <p:spPr>
-                <a:xfrm>
-                  <a:off x="6717506" y="1104900"/>
-                  <a:ext cx="196889" cy="0"/>
-                </a:xfrm>
-                <a:prstGeom prst="line">
-                  <a:avLst/>
-                </a:prstGeom>
-                <a:ln>
-                  <a:solidFill>
-                    <a:schemeClr val="tx1"/>
-                  </a:solidFill>
-                </a:ln>
-              </p:spPr>
-              <p:style>
-                <a:lnRef idx="2">
-                  <a:schemeClr val="accent1"/>
-                </a:lnRef>
-                <a:fillRef idx="0">
-                  <a:schemeClr val="accent1"/>
-                </a:fillRef>
-                <a:effectRef idx="1">
-                  <a:schemeClr val="accent1"/>
-                </a:effectRef>
-                <a:fontRef idx="minor">
-                  <a:schemeClr val="tx1"/>
-                </a:fontRef>
-              </p:style>
-            </p:cxnSp>
-          </p:grpSp>
-          <p:grpSp>
-            <p:nvGrpSpPr>
-              <p:cNvPr id="29" name="Grupo 28">
-                <a:extLst>
-                  <a:ext uri="{FF2B5EF4-FFF2-40B4-BE49-F238E27FC236}">
-                    <a16:creationId xmlns:a16="http://schemas.microsoft.com/office/drawing/2014/main" id="{E1CB0B81-F43E-85DF-D079-AEFF1DE971A3}"/>
-                  </a:ext>
-                </a:extLst>
-              </p:cNvPr>
-              <p:cNvGrpSpPr/>
-              <p:nvPr/>
-            </p:nvGrpSpPr>
-            <p:grpSpPr>
-              <a:xfrm>
-                <a:off x="6609634" y="527050"/>
-                <a:ext cx="304761" cy="107872"/>
-                <a:chOff x="6609634" y="1050964"/>
-                <a:chExt cx="304761" cy="107872"/>
-              </a:xfrm>
-            </p:grpSpPr>
-            <p:sp>
-              <p:nvSpPr>
-                <p:cNvPr id="33" name="Diagrama de flujo: conector 32">
-                  <a:extLst>
-                    <a:ext uri="{FF2B5EF4-FFF2-40B4-BE49-F238E27FC236}">
-                      <a16:creationId xmlns:a16="http://schemas.microsoft.com/office/drawing/2014/main" id="{5197A18A-C15E-13A2-F0F1-EF534C1E2BD4}"/>
-                    </a:ext>
-                  </a:extLst>
-                </p:cNvPr>
-                <p:cNvSpPr/>
-                <p:nvPr/>
-              </p:nvSpPr>
-              <p:spPr>
-                <a:xfrm>
-                  <a:off x="6609634" y="1050964"/>
-                  <a:ext cx="107872" cy="107872"/>
-                </a:xfrm>
-                <a:prstGeom prst="flowChartConnector">
-                  <a:avLst/>
-                </a:prstGeom>
-                <a:solidFill>
-                  <a:schemeClr val="accent1"/>
-                </a:solidFill>
-              </p:spPr>
-              <p:style>
-                <a:lnRef idx="2">
-                  <a:schemeClr val="accent1">
-                    <a:shade val="15000"/>
-                  </a:schemeClr>
-                </a:lnRef>
-                <a:fillRef idx="1">
-                  <a:schemeClr val="accent1"/>
-                </a:fillRef>
-                <a:effectRef idx="0">
-                  <a:schemeClr val="accent1"/>
-                </a:effectRef>
-                <a:fontRef idx="minor">
-                  <a:schemeClr val="lt1"/>
-                </a:fontRef>
-              </p:style>
-              <p:txBody>
-                <a:bodyPr rtlCol="0" anchor="ctr"/>
-                <a:lstStyle/>
-                <a:p>
-                  <a:pPr algn="ctr"/>
-                  <a:endParaRPr lang="es-ES"/>
-                </a:p>
-              </p:txBody>
-            </p:sp>
-            <p:cxnSp>
-              <p:nvCxnSpPr>
-                <p:cNvPr id="34" name="Conector recto 33">
-                  <a:extLst>
-                    <a:ext uri="{FF2B5EF4-FFF2-40B4-BE49-F238E27FC236}">
-                      <a16:creationId xmlns:a16="http://schemas.microsoft.com/office/drawing/2014/main" id="{33EE2A1A-7DD4-C290-4CF9-3CBE3FBC9E66}"/>
-                    </a:ext>
-                  </a:extLst>
-                </p:cNvPr>
-                <p:cNvCxnSpPr>
-                  <a:cxnSpLocks/>
-                </p:cNvCxnSpPr>
-                <p:nvPr/>
-              </p:nvCxnSpPr>
-              <p:spPr>
-                <a:xfrm>
-                  <a:off x="6717506" y="1104900"/>
-                  <a:ext cx="196889" cy="0"/>
-                </a:xfrm>
-                <a:prstGeom prst="line">
-                  <a:avLst/>
-                </a:prstGeom>
-                <a:ln>
-                  <a:solidFill>
-                    <a:schemeClr val="tx1"/>
-                  </a:solidFill>
-                </a:ln>
-              </p:spPr>
-              <p:style>
-                <a:lnRef idx="2">
-                  <a:schemeClr val="accent1"/>
-                </a:lnRef>
-                <a:fillRef idx="0">
-                  <a:schemeClr val="accent1"/>
-                </a:fillRef>
-                <a:effectRef idx="1">
-                  <a:schemeClr val="accent1"/>
-                </a:effectRef>
-                <a:fontRef idx="minor">
-                  <a:schemeClr val="tx1"/>
-                </a:fontRef>
-              </p:style>
-            </p:cxnSp>
-          </p:grpSp>
-          <p:grpSp>
-            <p:nvGrpSpPr>
-              <p:cNvPr id="30" name="Grupo 29">
-                <a:extLst>
-                  <a:ext uri="{FF2B5EF4-FFF2-40B4-BE49-F238E27FC236}">
-                    <a16:creationId xmlns:a16="http://schemas.microsoft.com/office/drawing/2014/main" id="{788E0224-7F80-E703-C6C9-9FB1FC7FC4FC}"/>
-                  </a:ext>
-                </a:extLst>
-              </p:cNvPr>
-              <p:cNvGrpSpPr/>
-              <p:nvPr/>
-            </p:nvGrpSpPr>
-            <p:grpSpPr>
-              <a:xfrm>
-                <a:off x="6609634" y="787440"/>
-                <a:ext cx="304761" cy="107872"/>
-                <a:chOff x="6609634" y="1050964"/>
-                <a:chExt cx="304761" cy="107872"/>
-              </a:xfrm>
-            </p:grpSpPr>
-            <p:sp>
-              <p:nvSpPr>
-                <p:cNvPr id="31" name="Diagrama de flujo: conector 30">
-                  <a:extLst>
-                    <a:ext uri="{FF2B5EF4-FFF2-40B4-BE49-F238E27FC236}">
-                      <a16:creationId xmlns:a16="http://schemas.microsoft.com/office/drawing/2014/main" id="{C3ED6F72-00B8-3D92-B0FD-40F66A2DBB22}"/>
-                    </a:ext>
-                  </a:extLst>
-                </p:cNvPr>
-                <p:cNvSpPr/>
-                <p:nvPr/>
-              </p:nvSpPr>
-              <p:spPr>
-                <a:xfrm>
-                  <a:off x="6609634" y="1050964"/>
-                  <a:ext cx="107872" cy="107872"/>
-                </a:xfrm>
-                <a:prstGeom prst="flowChartConnector">
-                  <a:avLst/>
-                </a:prstGeom>
-                <a:solidFill>
-                  <a:schemeClr val="accent1"/>
-                </a:solidFill>
-              </p:spPr>
-              <p:style>
-                <a:lnRef idx="2">
-                  <a:schemeClr val="accent1">
-                    <a:shade val="15000"/>
-                  </a:schemeClr>
-                </a:lnRef>
-                <a:fillRef idx="1">
-                  <a:schemeClr val="accent1"/>
-                </a:fillRef>
-                <a:effectRef idx="0">
-                  <a:schemeClr val="accent1"/>
-                </a:effectRef>
-                <a:fontRef idx="minor">
-                  <a:schemeClr val="lt1"/>
-                </a:fontRef>
-              </p:style>
-              <p:txBody>
-                <a:bodyPr rtlCol="0" anchor="ctr"/>
-                <a:lstStyle/>
-                <a:p>
-                  <a:pPr algn="ctr"/>
-                  <a:endParaRPr lang="es-ES"/>
-                </a:p>
-              </p:txBody>
-            </p:sp>
-            <p:cxnSp>
-              <p:nvCxnSpPr>
-                <p:cNvPr id="32" name="Conector recto 31">
-                  <a:extLst>
-                    <a:ext uri="{FF2B5EF4-FFF2-40B4-BE49-F238E27FC236}">
-                      <a16:creationId xmlns:a16="http://schemas.microsoft.com/office/drawing/2014/main" id="{B67419AC-7E6F-BAD7-4C6A-4DD38AA55879}"/>
-                    </a:ext>
-                  </a:extLst>
-                </p:cNvPr>
-                <p:cNvCxnSpPr>
-                  <a:cxnSpLocks/>
-                </p:cNvCxnSpPr>
-                <p:nvPr/>
-              </p:nvCxnSpPr>
-              <p:spPr>
-                <a:xfrm>
-                  <a:off x="6717506" y="1104900"/>
-                  <a:ext cx="196889" cy="0"/>
-                </a:xfrm>
-                <a:prstGeom prst="line">
-                  <a:avLst/>
-                </a:prstGeom>
-                <a:ln>
-                  <a:solidFill>
-                    <a:schemeClr val="tx1"/>
-                  </a:solidFill>
-                </a:ln>
-              </p:spPr>
-              <p:style>
-                <a:lnRef idx="2">
-                  <a:schemeClr val="accent1"/>
-                </a:lnRef>
-                <a:fillRef idx="0">
-                  <a:schemeClr val="accent1"/>
-                </a:fillRef>
-                <a:effectRef idx="1">
-                  <a:schemeClr val="accent1"/>
-                </a:effectRef>
-                <a:fontRef idx="minor">
-                  <a:schemeClr val="tx1"/>
-                </a:fontRef>
-              </p:style>
-            </p:cxnSp>
-          </p:grpSp>
-        </p:grpSp>
-      </p:grpSp>
+          <a:prstGeom prst="rect">
+            <a:avLst/>
+          </a:prstGeom>
+          <a:solidFill>
+            <a:schemeClr val="tx2">
+              <a:lumMod val="25000"/>
+              <a:lumOff val="75000"/>
+            </a:schemeClr>
+          </a:solidFill>
+        </p:spPr>
+        <p:style>
+          <a:lnRef idx="2">
+            <a:schemeClr val="accent1">
+              <a:shade val="15000"/>
+            </a:schemeClr>
+          </a:lnRef>
+          <a:fillRef idx="1">
+            <a:schemeClr val="accent1"/>
+          </a:fillRef>
+          <a:effectRef idx="0">
+            <a:schemeClr val="accent1"/>
+          </a:effectRef>
+          <a:fontRef idx="minor">
+            <a:schemeClr val="lt1"/>
+          </a:fontRef>
+        </p:style>
+        <p:txBody>
+          <a:bodyPr rtlCol="0" anchor="ctr"/>
+          <a:lstStyle/>
+          <a:p>
+            <a:pPr algn="ctr"/>
+            <a:endParaRPr lang="es-ES"/>
+          </a:p>
+        </p:txBody>
+      </p:sp>
+      <p:sp>
+        <p:nvSpPr>
+          <p:cNvPr id="51" name="Rectángulo 50">
+            <a:extLst>
+              <a:ext uri="{FF2B5EF4-FFF2-40B4-BE49-F238E27FC236}">
+                <a16:creationId xmlns:a16="http://schemas.microsoft.com/office/drawing/2014/main" id="{5C7E4DD3-8F4E-5027-25D6-FE7C98391C22}"/>
+              </a:ext>
+            </a:extLst>
+          </p:cNvPr>
+          <p:cNvSpPr>
+            <a:spLocks/>
+          </p:cNvSpPr>
+          <p:nvPr/>
+        </p:nvSpPr>
+        <p:spPr>
+          <a:xfrm>
+            <a:off x="6914395" y="193675"/>
+            <a:ext cx="1263015" cy="1327150"/>
+          </a:xfrm>
+          <a:prstGeom prst="rect">
+            <a:avLst/>
+          </a:prstGeom>
+          <a:solidFill>
+            <a:schemeClr val="accent1">
+              <a:lumMod val="60000"/>
+              <a:lumOff val="40000"/>
+            </a:schemeClr>
+          </a:solidFill>
+        </p:spPr>
+        <p:style>
+          <a:lnRef idx="2">
+            <a:schemeClr val="accent1">
+              <a:shade val="15000"/>
+            </a:schemeClr>
+          </a:lnRef>
+          <a:fillRef idx="1">
+            <a:schemeClr val="accent1"/>
+          </a:fillRef>
+          <a:effectRef idx="0">
+            <a:schemeClr val="accent1"/>
+          </a:effectRef>
+          <a:fontRef idx="minor">
+            <a:schemeClr val="lt1"/>
+          </a:fontRef>
+        </p:style>
+        <p:txBody>
+          <a:bodyPr rtlCol="0" anchor="ctr"/>
+          <a:lstStyle/>
+          <a:p>
+            <a:pPr algn="ctr"/>
+            <a:endParaRPr lang="es-ES" dirty="0"/>
+          </a:p>
+        </p:txBody>
+      </p:sp>
       <p:sp>
         <p:nvSpPr>
           <p:cNvPr id="37" name="Diagrama de flujo: entrada manual 36">
@@ -7728,10 +6987,123 @@
       </p:sp>
       <p:grpSp>
         <p:nvGrpSpPr>
-          <p:cNvPr id="69" name="Grupo 68">
-            <a:extLst>
-              <a:ext uri="{FF2B5EF4-FFF2-40B4-BE49-F238E27FC236}">
-                <a16:creationId xmlns:a16="http://schemas.microsoft.com/office/drawing/2014/main" id="{C1504198-E51C-B2B6-A58A-EDACD836EB33}"/>
+          <p:cNvPr id="66" name="Grupo 65">
+            <a:extLst>
+              <a:ext uri="{FF2B5EF4-FFF2-40B4-BE49-F238E27FC236}">
+                <a16:creationId xmlns:a16="http://schemas.microsoft.com/office/drawing/2014/main" id="{CFEEF514-F433-ECBD-F28A-A48D701F3880}"/>
+              </a:ext>
+            </a:extLst>
+          </p:cNvPr>
+          <p:cNvGrpSpPr/>
+          <p:nvPr/>
+        </p:nvGrpSpPr>
+        <p:grpSpPr>
+          <a:xfrm>
+            <a:off x="9317728" y="1283247"/>
+            <a:ext cx="161334" cy="260482"/>
+            <a:chOff x="9303650" y="1285629"/>
+            <a:chExt cx="161334" cy="260482"/>
+          </a:xfrm>
+        </p:grpSpPr>
+        <p:sp>
+          <p:nvSpPr>
+            <p:cNvPr id="52" name="Diagrama de flujo: conector 51">
+              <a:extLst>
+                <a:ext uri="{FF2B5EF4-FFF2-40B4-BE49-F238E27FC236}">
+                  <a16:creationId xmlns:a16="http://schemas.microsoft.com/office/drawing/2014/main" id="{4DA8E563-45A8-5EE9-1202-D413806B2F6D}"/>
+                </a:ext>
+              </a:extLst>
+            </p:cNvPr>
+            <p:cNvSpPr/>
+            <p:nvPr/>
+          </p:nvSpPr>
+          <p:spPr>
+            <a:xfrm rot="18888775">
+              <a:off x="9303650" y="1438239"/>
+              <a:ext cx="107872" cy="107872"/>
+            </a:xfrm>
+            <a:prstGeom prst="flowChartConnector">
+              <a:avLst/>
+            </a:prstGeom>
+            <a:solidFill>
+              <a:schemeClr val="accent1"/>
+            </a:solidFill>
+          </p:spPr>
+          <p:style>
+            <a:lnRef idx="2">
+              <a:schemeClr val="accent1">
+                <a:shade val="15000"/>
+              </a:schemeClr>
+            </a:lnRef>
+            <a:fillRef idx="1">
+              <a:schemeClr val="accent1"/>
+            </a:fillRef>
+            <a:effectRef idx="0">
+              <a:schemeClr val="accent1"/>
+            </a:effectRef>
+            <a:fontRef idx="minor">
+              <a:schemeClr val="lt1"/>
+            </a:fontRef>
+          </p:style>
+          <p:txBody>
+            <a:bodyPr rtlCol="0" anchor="ctr"/>
+            <a:lstStyle/>
+            <a:p>
+              <a:pPr algn="ctr"/>
+              <a:endParaRPr lang="es-ES"/>
+            </a:p>
+          </p:txBody>
+        </p:sp>
+        <p:cxnSp>
+          <p:nvCxnSpPr>
+            <p:cNvPr id="53" name="Conector recto 52">
+              <a:extLst>
+                <a:ext uri="{FF2B5EF4-FFF2-40B4-BE49-F238E27FC236}">
+                  <a16:creationId xmlns:a16="http://schemas.microsoft.com/office/drawing/2014/main" id="{F0F5DB33-75B8-EB20-39AF-6C9907372B3B}"/>
+                </a:ext>
+              </a:extLst>
+            </p:cNvPr>
+            <p:cNvCxnSpPr>
+              <a:cxnSpLocks/>
+            </p:cNvCxnSpPr>
+            <p:nvPr/>
+          </p:nvCxnSpPr>
+          <p:spPr>
+            <a:xfrm rot="18888775">
+              <a:off x="9366539" y="1384074"/>
+              <a:ext cx="196889" cy="0"/>
+            </a:xfrm>
+            <a:prstGeom prst="line">
+              <a:avLst/>
+            </a:prstGeom>
+            <a:ln>
+              <a:solidFill>
+                <a:schemeClr val="tx1"/>
+              </a:solidFill>
+            </a:ln>
+          </p:spPr>
+          <p:style>
+            <a:lnRef idx="2">
+              <a:schemeClr val="accent1"/>
+            </a:lnRef>
+            <a:fillRef idx="0">
+              <a:schemeClr val="accent1"/>
+            </a:fillRef>
+            <a:effectRef idx="1">
+              <a:schemeClr val="accent1"/>
+            </a:effectRef>
+            <a:fontRef idx="minor">
+              <a:schemeClr val="tx1"/>
+            </a:fontRef>
+          </p:style>
+        </p:cxnSp>
+      </p:grpSp>
+      <p:grpSp>
+        <p:nvGrpSpPr>
+          <p:cNvPr id="68" name="Grupo 67">
+            <a:extLst>
+              <a:ext uri="{FF2B5EF4-FFF2-40B4-BE49-F238E27FC236}">
+                <a16:creationId xmlns:a16="http://schemas.microsoft.com/office/drawing/2014/main" id="{8F98A8A2-1D5D-09FF-1195-B2CE58D6CE3A}"/>
               </a:ext>
             </a:extLst>
           </p:cNvPr>
@@ -7741,357 +7113,110 @@
         <p:grpSpPr>
           <a:xfrm>
             <a:off x="8648635" y="621921"/>
-            <a:ext cx="830427" cy="921808"/>
-            <a:chOff x="8648635" y="621921"/>
-            <a:chExt cx="830427" cy="921808"/>
+            <a:ext cx="161334" cy="260482"/>
+            <a:chOff x="8617533" y="626683"/>
+            <a:chExt cx="161334" cy="260482"/>
           </a:xfrm>
         </p:grpSpPr>
-        <p:grpSp>
-          <p:nvGrpSpPr>
-            <p:cNvPr id="66" name="Grupo 65">
+        <p:sp>
+          <p:nvSpPr>
+            <p:cNvPr id="47" name="Diagrama de flujo: conector 46">
               <a:extLst>
                 <a:ext uri="{FF2B5EF4-FFF2-40B4-BE49-F238E27FC236}">
-                  <a16:creationId xmlns:a16="http://schemas.microsoft.com/office/drawing/2014/main" id="{CFEEF514-F433-ECBD-F28A-A48D701F3880}"/>
+                  <a16:creationId xmlns:a16="http://schemas.microsoft.com/office/drawing/2014/main" id="{F1847D6C-74C8-CD9E-86B9-19B5E100DB94}"/>
                 </a:ext>
               </a:extLst>
             </p:cNvPr>
-            <p:cNvGrpSpPr/>
+            <p:cNvSpPr/>
             <p:nvPr/>
-          </p:nvGrpSpPr>
-          <p:grpSpPr>
-            <a:xfrm>
-              <a:off x="9317728" y="1283247"/>
-              <a:ext cx="161334" cy="260482"/>
-              <a:chOff x="9303650" y="1285629"/>
-              <a:chExt cx="161334" cy="260482"/>
+          </p:nvSpPr>
+          <p:spPr>
+            <a:xfrm rot="18888775">
+              <a:off x="8617533" y="779293"/>
+              <a:ext cx="107872" cy="107872"/>
             </a:xfrm>
-          </p:grpSpPr>
-          <p:sp>
-            <p:nvSpPr>
-              <p:cNvPr id="52" name="Diagrama de flujo: conector 51">
-                <a:extLst>
-                  <a:ext uri="{FF2B5EF4-FFF2-40B4-BE49-F238E27FC236}">
-                    <a16:creationId xmlns:a16="http://schemas.microsoft.com/office/drawing/2014/main" id="{4DA8E563-45A8-5EE9-1202-D413806B2F6D}"/>
-                  </a:ext>
-                </a:extLst>
-              </p:cNvPr>
-              <p:cNvSpPr/>
-              <p:nvPr/>
-            </p:nvSpPr>
-            <p:spPr>
-              <a:xfrm rot="18888775">
-                <a:off x="9303650" y="1438239"/>
-                <a:ext cx="107872" cy="107872"/>
-              </a:xfrm>
-              <a:prstGeom prst="flowChartConnector">
-                <a:avLst/>
-              </a:prstGeom>
-              <a:solidFill>
-                <a:schemeClr val="accent1"/>
-              </a:solidFill>
-            </p:spPr>
-            <p:style>
-              <a:lnRef idx="2">
-                <a:schemeClr val="accent1">
-                  <a:shade val="15000"/>
-                </a:schemeClr>
-              </a:lnRef>
-              <a:fillRef idx="1">
-                <a:schemeClr val="accent1"/>
-              </a:fillRef>
-              <a:effectRef idx="0">
-                <a:schemeClr val="accent1"/>
-              </a:effectRef>
-              <a:fontRef idx="minor">
-                <a:schemeClr val="lt1"/>
-              </a:fontRef>
-            </p:style>
-            <p:txBody>
-              <a:bodyPr rtlCol="0" anchor="ctr"/>
-              <a:lstStyle/>
-              <a:p>
-                <a:pPr algn="ctr"/>
-                <a:endParaRPr lang="es-ES"/>
-              </a:p>
-            </p:txBody>
-          </p:sp>
-          <p:cxnSp>
-            <p:nvCxnSpPr>
-              <p:cNvPr id="53" name="Conector recto 52">
-                <a:extLst>
-                  <a:ext uri="{FF2B5EF4-FFF2-40B4-BE49-F238E27FC236}">
-                    <a16:creationId xmlns:a16="http://schemas.microsoft.com/office/drawing/2014/main" id="{F0F5DB33-75B8-EB20-39AF-6C9907372B3B}"/>
-                  </a:ext>
-                </a:extLst>
-              </p:cNvPr>
-              <p:cNvCxnSpPr>
-                <a:cxnSpLocks/>
-              </p:cNvCxnSpPr>
-              <p:nvPr/>
-            </p:nvCxnSpPr>
-            <p:spPr>
-              <a:xfrm rot="18888775">
-                <a:off x="9366539" y="1384074"/>
-                <a:ext cx="196889" cy="0"/>
-              </a:xfrm>
-              <a:prstGeom prst="line">
-                <a:avLst/>
-              </a:prstGeom>
-              <a:ln>
-                <a:solidFill>
-                  <a:schemeClr val="tx1"/>
-                </a:solidFill>
-              </a:ln>
-            </p:spPr>
-            <p:style>
-              <a:lnRef idx="2">
-                <a:schemeClr val="accent1"/>
-              </a:lnRef>
-              <a:fillRef idx="0">
-                <a:schemeClr val="accent1"/>
-              </a:fillRef>
-              <a:effectRef idx="1">
-                <a:schemeClr val="accent1"/>
-              </a:effectRef>
-              <a:fontRef idx="minor">
-                <a:schemeClr val="tx1"/>
-              </a:fontRef>
-            </p:style>
-          </p:cxnSp>
-        </p:grpSp>
-        <p:grpSp>
-          <p:nvGrpSpPr>
-            <p:cNvPr id="68" name="Grupo 67">
+            <a:prstGeom prst="flowChartConnector">
+              <a:avLst/>
+            </a:prstGeom>
+            <a:solidFill>
+              <a:schemeClr val="accent1"/>
+            </a:solidFill>
+          </p:spPr>
+          <p:style>
+            <a:lnRef idx="2">
+              <a:schemeClr val="accent1">
+                <a:shade val="15000"/>
+              </a:schemeClr>
+            </a:lnRef>
+            <a:fillRef idx="1">
+              <a:schemeClr val="accent1"/>
+            </a:fillRef>
+            <a:effectRef idx="0">
+              <a:schemeClr val="accent1"/>
+            </a:effectRef>
+            <a:fontRef idx="minor">
+              <a:schemeClr val="lt1"/>
+            </a:fontRef>
+          </p:style>
+          <p:txBody>
+            <a:bodyPr rtlCol="0" anchor="ctr"/>
+            <a:lstStyle/>
+            <a:p>
+              <a:pPr algn="ctr"/>
+              <a:endParaRPr lang="es-ES" dirty="0"/>
+            </a:p>
+          </p:txBody>
+        </p:sp>
+        <p:cxnSp>
+          <p:nvCxnSpPr>
+            <p:cNvPr id="48" name="Conector recto 47">
               <a:extLst>
                 <a:ext uri="{FF2B5EF4-FFF2-40B4-BE49-F238E27FC236}">
-                  <a16:creationId xmlns:a16="http://schemas.microsoft.com/office/drawing/2014/main" id="{8F98A8A2-1D5D-09FF-1195-B2CE58D6CE3A}"/>
+                  <a16:creationId xmlns:a16="http://schemas.microsoft.com/office/drawing/2014/main" id="{7002EAED-7D72-1486-649F-544407B2D546}"/>
                 </a:ext>
               </a:extLst>
             </p:cNvPr>
-            <p:cNvGrpSpPr/>
+            <p:cNvCxnSpPr>
+              <a:cxnSpLocks/>
+            </p:cNvCxnSpPr>
             <p:nvPr/>
-          </p:nvGrpSpPr>
-          <p:grpSpPr>
-            <a:xfrm>
-              <a:off x="8648635" y="621921"/>
-              <a:ext cx="161334" cy="260482"/>
-              <a:chOff x="8617533" y="626683"/>
-              <a:chExt cx="161334" cy="260482"/>
+          </p:nvCxnSpPr>
+          <p:spPr>
+            <a:xfrm rot="18888775">
+              <a:off x="8680422" y="725128"/>
+              <a:ext cx="196889" cy="0"/>
             </a:xfrm>
-          </p:grpSpPr>
-          <p:sp>
-            <p:nvSpPr>
-              <p:cNvPr id="47" name="Diagrama de flujo: conector 46">
-                <a:extLst>
-                  <a:ext uri="{FF2B5EF4-FFF2-40B4-BE49-F238E27FC236}">
-                    <a16:creationId xmlns:a16="http://schemas.microsoft.com/office/drawing/2014/main" id="{F1847D6C-74C8-CD9E-86B9-19B5E100DB94}"/>
-                  </a:ext>
-                </a:extLst>
-              </p:cNvPr>
-              <p:cNvSpPr/>
-              <p:nvPr/>
-            </p:nvSpPr>
-            <p:spPr>
-              <a:xfrm rot="18888775">
-                <a:off x="8617533" y="779293"/>
-                <a:ext cx="107872" cy="107872"/>
-              </a:xfrm>
-              <a:prstGeom prst="flowChartConnector">
-                <a:avLst/>
-              </a:prstGeom>
+            <a:prstGeom prst="line">
+              <a:avLst/>
+            </a:prstGeom>
+            <a:ln>
               <a:solidFill>
-                <a:schemeClr val="accent1"/>
+                <a:schemeClr val="tx1"/>
               </a:solidFill>
-            </p:spPr>
-            <p:style>
-              <a:lnRef idx="2">
-                <a:schemeClr val="accent1">
-                  <a:shade val="15000"/>
-                </a:schemeClr>
-              </a:lnRef>
-              <a:fillRef idx="1">
-                <a:schemeClr val="accent1"/>
-              </a:fillRef>
-              <a:effectRef idx="0">
-                <a:schemeClr val="accent1"/>
-              </a:effectRef>
-              <a:fontRef idx="minor">
-                <a:schemeClr val="lt1"/>
-              </a:fontRef>
-            </p:style>
-            <p:txBody>
-              <a:bodyPr rtlCol="0" anchor="ctr"/>
-              <a:lstStyle/>
-              <a:p>
-                <a:pPr algn="ctr"/>
-                <a:endParaRPr lang="es-ES" dirty="0"/>
-              </a:p>
-            </p:txBody>
-          </p:sp>
-          <p:cxnSp>
-            <p:nvCxnSpPr>
-              <p:cNvPr id="48" name="Conector recto 47">
-                <a:extLst>
-                  <a:ext uri="{FF2B5EF4-FFF2-40B4-BE49-F238E27FC236}">
-                    <a16:creationId xmlns:a16="http://schemas.microsoft.com/office/drawing/2014/main" id="{7002EAED-7D72-1486-649F-544407B2D546}"/>
-                  </a:ext>
-                </a:extLst>
-              </p:cNvPr>
-              <p:cNvCxnSpPr>
-                <a:cxnSpLocks/>
-              </p:cNvCxnSpPr>
-              <p:nvPr/>
-            </p:nvCxnSpPr>
-            <p:spPr>
-              <a:xfrm rot="18888775">
-                <a:off x="8680422" y="725128"/>
-                <a:ext cx="196889" cy="0"/>
-              </a:xfrm>
-              <a:prstGeom prst="line">
-                <a:avLst/>
-              </a:prstGeom>
-              <a:ln>
-                <a:solidFill>
-                  <a:schemeClr val="tx1"/>
-                </a:solidFill>
-              </a:ln>
-            </p:spPr>
-            <p:style>
-              <a:lnRef idx="2">
-                <a:schemeClr val="accent1"/>
-              </a:lnRef>
-              <a:fillRef idx="0">
-                <a:schemeClr val="accent1"/>
-              </a:fillRef>
-              <a:effectRef idx="1">
-                <a:schemeClr val="accent1"/>
-              </a:effectRef>
-              <a:fontRef idx="minor">
-                <a:schemeClr val="tx1"/>
-              </a:fontRef>
-            </p:style>
-          </p:cxnSp>
-        </p:grpSp>
-        <p:grpSp>
-          <p:nvGrpSpPr>
-            <p:cNvPr id="67" name="Grupo 66">
-              <a:extLst>
-                <a:ext uri="{FF2B5EF4-FFF2-40B4-BE49-F238E27FC236}">
-                  <a16:creationId xmlns:a16="http://schemas.microsoft.com/office/drawing/2014/main" id="{DDB17FBB-63C9-A071-CC5D-5B07840BD50C}"/>
-                </a:ext>
-              </a:extLst>
-            </p:cNvPr>
-            <p:cNvGrpSpPr/>
-            <p:nvPr/>
-          </p:nvGrpSpPr>
-          <p:grpSpPr>
-            <a:xfrm>
-              <a:off x="8983206" y="941426"/>
-              <a:ext cx="161334" cy="260482"/>
-              <a:chOff x="8955183" y="953213"/>
-              <a:chExt cx="161334" cy="260482"/>
-            </a:xfrm>
-          </p:grpSpPr>
-          <p:sp>
-            <p:nvSpPr>
-              <p:cNvPr id="45" name="Diagrama de flujo: conector 44">
-                <a:extLst>
-                  <a:ext uri="{FF2B5EF4-FFF2-40B4-BE49-F238E27FC236}">
-                    <a16:creationId xmlns:a16="http://schemas.microsoft.com/office/drawing/2014/main" id="{516A464D-10AF-9AB4-0556-34DA388DDF0B}"/>
-                  </a:ext>
-                </a:extLst>
-              </p:cNvPr>
-              <p:cNvSpPr/>
-              <p:nvPr/>
-            </p:nvSpPr>
-            <p:spPr>
-              <a:xfrm rot="18888775">
-                <a:off x="8955183" y="1105823"/>
-                <a:ext cx="107872" cy="107872"/>
-              </a:xfrm>
-              <a:prstGeom prst="flowChartConnector">
-                <a:avLst/>
-              </a:prstGeom>
-              <a:solidFill>
-                <a:schemeClr val="accent1"/>
-              </a:solidFill>
-            </p:spPr>
-            <p:style>
-              <a:lnRef idx="2">
-                <a:schemeClr val="accent1">
-                  <a:shade val="15000"/>
-                </a:schemeClr>
-              </a:lnRef>
-              <a:fillRef idx="1">
-                <a:schemeClr val="accent1"/>
-              </a:fillRef>
-              <a:effectRef idx="0">
-                <a:schemeClr val="accent1"/>
-              </a:effectRef>
-              <a:fontRef idx="minor">
-                <a:schemeClr val="lt1"/>
-              </a:fontRef>
-            </p:style>
-            <p:txBody>
-              <a:bodyPr rtlCol="0" anchor="ctr"/>
-              <a:lstStyle/>
-              <a:p>
-                <a:pPr algn="ctr"/>
-                <a:endParaRPr lang="es-ES"/>
-              </a:p>
-            </p:txBody>
-          </p:sp>
-          <p:cxnSp>
-            <p:nvCxnSpPr>
-              <p:cNvPr id="46" name="Conector recto 45">
-                <a:extLst>
-                  <a:ext uri="{FF2B5EF4-FFF2-40B4-BE49-F238E27FC236}">
-                    <a16:creationId xmlns:a16="http://schemas.microsoft.com/office/drawing/2014/main" id="{081EF80D-BBCC-8B10-11E7-C02347AF302C}"/>
-                  </a:ext>
-                </a:extLst>
-              </p:cNvPr>
-              <p:cNvCxnSpPr>
-                <a:cxnSpLocks/>
-              </p:cNvCxnSpPr>
-              <p:nvPr/>
-            </p:nvCxnSpPr>
-            <p:spPr>
-              <a:xfrm rot="18888775">
-                <a:off x="9018072" y="1051658"/>
-                <a:ext cx="196889" cy="0"/>
-              </a:xfrm>
-              <a:prstGeom prst="line">
-                <a:avLst/>
-              </a:prstGeom>
-              <a:ln>
-                <a:solidFill>
-                  <a:schemeClr val="tx1"/>
-                </a:solidFill>
-              </a:ln>
-            </p:spPr>
-            <p:style>
-              <a:lnRef idx="2">
-                <a:schemeClr val="accent1"/>
-              </a:lnRef>
-              <a:fillRef idx="0">
-                <a:schemeClr val="accent1"/>
-              </a:fillRef>
-              <a:effectRef idx="1">
-                <a:schemeClr val="accent1"/>
-              </a:effectRef>
-              <a:fontRef idx="minor">
-                <a:schemeClr val="tx1"/>
-              </a:fontRef>
-            </p:style>
-          </p:cxnSp>
-        </p:grpSp>
+            </a:ln>
+          </p:spPr>
+          <p:style>
+            <a:lnRef idx="2">
+              <a:schemeClr val="accent1"/>
+            </a:lnRef>
+            <a:fillRef idx="0">
+              <a:schemeClr val="accent1"/>
+            </a:fillRef>
+            <a:effectRef idx="1">
+              <a:schemeClr val="accent1"/>
+            </a:effectRef>
+            <a:fontRef idx="minor">
+              <a:schemeClr val="tx1"/>
+            </a:fontRef>
+          </p:style>
+        </p:cxnSp>
       </p:grpSp>
       <p:grpSp>
         <p:nvGrpSpPr>
-          <p:cNvPr id="81" name="Grupo 80">
-            <a:extLst>
-              <a:ext uri="{FF2B5EF4-FFF2-40B4-BE49-F238E27FC236}">
-                <a16:creationId xmlns:a16="http://schemas.microsoft.com/office/drawing/2014/main" id="{DF556AD6-182A-46DB-F0F0-5D3ACB087F65}"/>
+          <p:cNvPr id="71" name="Grupo 70">
+            <a:extLst>
+              <a:ext uri="{FF2B5EF4-FFF2-40B4-BE49-F238E27FC236}">
+                <a16:creationId xmlns:a16="http://schemas.microsoft.com/office/drawing/2014/main" id="{614E50A6-EE61-EE4C-B273-5CAD86ED04B7}"/>
               </a:ext>
             </a:extLst>
           </p:cNvPr>
@@ -8099,352 +7224,218 @@
           <p:nvPr/>
         </p:nvGrpSpPr>
         <p:grpSpPr>
-          <a:xfrm>
+          <a:xfrm rot="10800000">
             <a:off x="8958831" y="408251"/>
-            <a:ext cx="825665" cy="926570"/>
-            <a:chOff x="8958831" y="408251"/>
-            <a:chExt cx="825665" cy="926570"/>
+            <a:ext cx="161334" cy="260482"/>
+            <a:chOff x="9303650" y="1285629"/>
+            <a:chExt cx="161334" cy="260482"/>
           </a:xfrm>
         </p:grpSpPr>
-        <p:grpSp>
-          <p:nvGrpSpPr>
-            <p:cNvPr id="71" name="Grupo 70">
+        <p:sp>
+          <p:nvSpPr>
+            <p:cNvPr id="78" name="Diagrama de flujo: conector 77">
               <a:extLst>
                 <a:ext uri="{FF2B5EF4-FFF2-40B4-BE49-F238E27FC236}">
-                  <a16:creationId xmlns:a16="http://schemas.microsoft.com/office/drawing/2014/main" id="{614E50A6-EE61-EE4C-B273-5CAD86ED04B7}"/>
+                  <a16:creationId xmlns:a16="http://schemas.microsoft.com/office/drawing/2014/main" id="{7EAB2CF6-384A-5093-8E57-0E9705E65189}"/>
                 </a:ext>
               </a:extLst>
             </p:cNvPr>
-            <p:cNvGrpSpPr/>
+            <p:cNvSpPr/>
             <p:nvPr/>
-          </p:nvGrpSpPr>
-          <p:grpSpPr>
-            <a:xfrm rot="10800000">
-              <a:off x="8958831" y="408251"/>
-              <a:ext cx="161334" cy="260482"/>
-              <a:chOff x="9303650" y="1285629"/>
-              <a:chExt cx="161334" cy="260482"/>
+          </p:nvSpPr>
+          <p:spPr>
+            <a:xfrm rot="18888775">
+              <a:off x="9303650" y="1438239"/>
+              <a:ext cx="107872" cy="107872"/>
             </a:xfrm>
-          </p:grpSpPr>
-          <p:sp>
-            <p:nvSpPr>
-              <p:cNvPr id="78" name="Diagrama de flujo: conector 77">
-                <a:extLst>
-                  <a:ext uri="{FF2B5EF4-FFF2-40B4-BE49-F238E27FC236}">
-                    <a16:creationId xmlns:a16="http://schemas.microsoft.com/office/drawing/2014/main" id="{7EAB2CF6-384A-5093-8E57-0E9705E65189}"/>
-                  </a:ext>
-                </a:extLst>
-              </p:cNvPr>
-              <p:cNvSpPr/>
-              <p:nvPr/>
-            </p:nvSpPr>
-            <p:spPr>
-              <a:xfrm rot="18888775">
-                <a:off x="9303650" y="1438239"/>
-                <a:ext cx="107872" cy="107872"/>
-              </a:xfrm>
-              <a:prstGeom prst="flowChartConnector">
-                <a:avLst/>
-              </a:prstGeom>
-              <a:solidFill>
-                <a:schemeClr val="accent1"/>
-              </a:solidFill>
-            </p:spPr>
-            <p:style>
-              <a:lnRef idx="2">
-                <a:schemeClr val="accent1">
-                  <a:shade val="15000"/>
-                </a:schemeClr>
-              </a:lnRef>
-              <a:fillRef idx="1">
-                <a:schemeClr val="accent1"/>
-              </a:fillRef>
-              <a:effectRef idx="0">
-                <a:schemeClr val="accent1"/>
-              </a:effectRef>
-              <a:fontRef idx="minor">
-                <a:schemeClr val="lt1"/>
-              </a:fontRef>
-            </p:style>
-            <p:txBody>
-              <a:bodyPr rtlCol="0" anchor="ctr"/>
-              <a:lstStyle/>
-              <a:p>
-                <a:pPr algn="ctr"/>
-                <a:endParaRPr lang="es-ES"/>
-              </a:p>
-            </p:txBody>
-          </p:sp>
-          <p:cxnSp>
-            <p:nvCxnSpPr>
-              <p:cNvPr id="79" name="Conector recto 78">
-                <a:extLst>
-                  <a:ext uri="{FF2B5EF4-FFF2-40B4-BE49-F238E27FC236}">
-                    <a16:creationId xmlns:a16="http://schemas.microsoft.com/office/drawing/2014/main" id="{750D83AE-07AC-1800-02AC-42CBD74E7DF5}"/>
-                  </a:ext>
-                </a:extLst>
-              </p:cNvPr>
-              <p:cNvCxnSpPr>
-                <a:cxnSpLocks/>
-              </p:cNvCxnSpPr>
-              <p:nvPr/>
-            </p:nvCxnSpPr>
-            <p:spPr>
-              <a:xfrm rot="18888775">
-                <a:off x="9366539" y="1384074"/>
-                <a:ext cx="196889" cy="0"/>
-              </a:xfrm>
-              <a:prstGeom prst="line">
-                <a:avLst/>
-              </a:prstGeom>
-              <a:ln>
-                <a:solidFill>
-                  <a:schemeClr val="tx1"/>
-                </a:solidFill>
-              </a:ln>
-            </p:spPr>
-            <p:style>
-              <a:lnRef idx="2">
-                <a:schemeClr val="accent1"/>
-              </a:lnRef>
-              <a:fillRef idx="0">
-                <a:schemeClr val="accent1"/>
-              </a:fillRef>
-              <a:effectRef idx="1">
-                <a:schemeClr val="accent1"/>
-              </a:effectRef>
-              <a:fontRef idx="minor">
-                <a:schemeClr val="tx1"/>
-              </a:fontRef>
-            </p:style>
-          </p:cxnSp>
-        </p:grpSp>
-        <p:grpSp>
-          <p:nvGrpSpPr>
-            <p:cNvPr id="72" name="Grupo 71">
+            <a:prstGeom prst="flowChartConnector">
+              <a:avLst/>
+            </a:prstGeom>
+            <a:solidFill>
+              <a:schemeClr val="accent1"/>
+            </a:solidFill>
+          </p:spPr>
+          <p:style>
+            <a:lnRef idx="2">
+              <a:schemeClr val="accent1">
+                <a:shade val="15000"/>
+              </a:schemeClr>
+            </a:lnRef>
+            <a:fillRef idx="1">
+              <a:schemeClr val="accent1"/>
+            </a:fillRef>
+            <a:effectRef idx="0">
+              <a:schemeClr val="accent1"/>
+            </a:effectRef>
+            <a:fontRef idx="minor">
+              <a:schemeClr val="lt1"/>
+            </a:fontRef>
+          </p:style>
+          <p:txBody>
+            <a:bodyPr rtlCol="0" anchor="ctr"/>
+            <a:lstStyle/>
+            <a:p>
+              <a:pPr algn="ctr"/>
+              <a:endParaRPr lang="es-ES"/>
+            </a:p>
+          </p:txBody>
+        </p:sp>
+        <p:cxnSp>
+          <p:nvCxnSpPr>
+            <p:cNvPr id="79" name="Conector recto 78">
               <a:extLst>
                 <a:ext uri="{FF2B5EF4-FFF2-40B4-BE49-F238E27FC236}">
-                  <a16:creationId xmlns:a16="http://schemas.microsoft.com/office/drawing/2014/main" id="{48CE890F-5194-ABC7-ACBE-7C8B80AD9DA1}"/>
+                  <a16:creationId xmlns:a16="http://schemas.microsoft.com/office/drawing/2014/main" id="{750D83AE-07AC-1800-02AC-42CBD74E7DF5}"/>
                 </a:ext>
               </a:extLst>
             </p:cNvPr>
-            <p:cNvGrpSpPr/>
+            <p:cNvCxnSpPr>
+              <a:cxnSpLocks/>
+            </p:cNvCxnSpPr>
             <p:nvPr/>
-          </p:nvGrpSpPr>
-          <p:grpSpPr>
-            <a:xfrm rot="10800000">
-              <a:off x="9623162" y="1074339"/>
-              <a:ext cx="161334" cy="260482"/>
-              <a:chOff x="8617533" y="626683"/>
-              <a:chExt cx="161334" cy="260482"/>
+          </p:nvCxnSpPr>
+          <p:spPr>
+            <a:xfrm rot="18888775">
+              <a:off x="9366539" y="1384074"/>
+              <a:ext cx="196889" cy="0"/>
             </a:xfrm>
-          </p:grpSpPr>
-          <p:sp>
-            <p:nvSpPr>
-              <p:cNvPr id="76" name="Diagrama de flujo: conector 75">
-                <a:extLst>
-                  <a:ext uri="{FF2B5EF4-FFF2-40B4-BE49-F238E27FC236}">
-                    <a16:creationId xmlns:a16="http://schemas.microsoft.com/office/drawing/2014/main" id="{99885E26-3D67-BB2D-7208-4FE000BB97A0}"/>
-                  </a:ext>
-                </a:extLst>
-              </p:cNvPr>
-              <p:cNvSpPr/>
-              <p:nvPr/>
-            </p:nvSpPr>
-            <p:spPr>
-              <a:xfrm rot="18888775">
-                <a:off x="8617533" y="779293"/>
-                <a:ext cx="107872" cy="107872"/>
-              </a:xfrm>
-              <a:prstGeom prst="flowChartConnector">
-                <a:avLst/>
-              </a:prstGeom>
+            <a:prstGeom prst="line">
+              <a:avLst/>
+            </a:prstGeom>
+            <a:ln>
               <a:solidFill>
-                <a:schemeClr val="accent1"/>
+                <a:schemeClr val="tx1"/>
               </a:solidFill>
-            </p:spPr>
-            <p:style>
-              <a:lnRef idx="2">
-                <a:schemeClr val="accent1">
-                  <a:shade val="15000"/>
-                </a:schemeClr>
-              </a:lnRef>
-              <a:fillRef idx="1">
-                <a:schemeClr val="accent1"/>
-              </a:fillRef>
-              <a:effectRef idx="0">
-                <a:schemeClr val="accent1"/>
-              </a:effectRef>
-              <a:fontRef idx="minor">
-                <a:schemeClr val="lt1"/>
-              </a:fontRef>
-            </p:style>
-            <p:txBody>
-              <a:bodyPr rtlCol="0" anchor="ctr"/>
-              <a:lstStyle/>
-              <a:p>
-                <a:pPr algn="ctr"/>
-                <a:endParaRPr lang="es-ES" dirty="0"/>
-              </a:p>
-            </p:txBody>
-          </p:sp>
-          <p:cxnSp>
-            <p:nvCxnSpPr>
-              <p:cNvPr id="77" name="Conector recto 76">
-                <a:extLst>
-                  <a:ext uri="{FF2B5EF4-FFF2-40B4-BE49-F238E27FC236}">
-                    <a16:creationId xmlns:a16="http://schemas.microsoft.com/office/drawing/2014/main" id="{09E867F4-0182-1248-3DED-5DCDD2D9BAD3}"/>
-                  </a:ext>
-                </a:extLst>
-              </p:cNvPr>
-              <p:cNvCxnSpPr>
-                <a:cxnSpLocks/>
-              </p:cNvCxnSpPr>
-              <p:nvPr/>
-            </p:nvCxnSpPr>
-            <p:spPr>
-              <a:xfrm rot="18888775">
-                <a:off x="8680422" y="725128"/>
-                <a:ext cx="196889" cy="0"/>
-              </a:xfrm>
-              <a:prstGeom prst="line">
-                <a:avLst/>
-              </a:prstGeom>
-              <a:ln>
-                <a:solidFill>
-                  <a:schemeClr val="tx1"/>
-                </a:solidFill>
-              </a:ln>
-            </p:spPr>
-            <p:style>
-              <a:lnRef idx="2">
-                <a:schemeClr val="accent1"/>
-              </a:lnRef>
-              <a:fillRef idx="0">
-                <a:schemeClr val="accent1"/>
-              </a:fillRef>
-              <a:effectRef idx="1">
-                <a:schemeClr val="accent1"/>
-              </a:effectRef>
-              <a:fontRef idx="minor">
-                <a:schemeClr val="tx1"/>
-              </a:fontRef>
-            </p:style>
-          </p:cxnSp>
-        </p:grpSp>
-        <p:grpSp>
-          <p:nvGrpSpPr>
-            <p:cNvPr id="73" name="Grupo 72">
+            </a:ln>
+          </p:spPr>
+          <p:style>
+            <a:lnRef idx="2">
+              <a:schemeClr val="accent1"/>
+            </a:lnRef>
+            <a:fillRef idx="0">
+              <a:schemeClr val="accent1"/>
+            </a:fillRef>
+            <a:effectRef idx="1">
+              <a:schemeClr val="accent1"/>
+            </a:effectRef>
+            <a:fontRef idx="minor">
+              <a:schemeClr val="tx1"/>
+            </a:fontRef>
+          </p:style>
+        </p:cxnSp>
+      </p:grpSp>
+      <p:grpSp>
+        <p:nvGrpSpPr>
+          <p:cNvPr id="72" name="Grupo 71">
+            <a:extLst>
+              <a:ext uri="{FF2B5EF4-FFF2-40B4-BE49-F238E27FC236}">
+                <a16:creationId xmlns:a16="http://schemas.microsoft.com/office/drawing/2014/main" id="{48CE890F-5194-ABC7-ACBE-7C8B80AD9DA1}"/>
+              </a:ext>
+            </a:extLst>
+          </p:cNvPr>
+          <p:cNvGrpSpPr/>
+          <p:nvPr/>
+        </p:nvGrpSpPr>
+        <p:grpSpPr>
+          <a:xfrm rot="10800000">
+            <a:off x="9623162" y="1074339"/>
+            <a:ext cx="161334" cy="260482"/>
+            <a:chOff x="8617533" y="626683"/>
+            <a:chExt cx="161334" cy="260482"/>
+          </a:xfrm>
+        </p:grpSpPr>
+        <p:sp>
+          <p:nvSpPr>
+            <p:cNvPr id="76" name="Diagrama de flujo: conector 75">
               <a:extLst>
                 <a:ext uri="{FF2B5EF4-FFF2-40B4-BE49-F238E27FC236}">
-                  <a16:creationId xmlns:a16="http://schemas.microsoft.com/office/drawing/2014/main" id="{7AD181A9-771E-4D1F-EC4A-C1D7D5958878}"/>
+                  <a16:creationId xmlns:a16="http://schemas.microsoft.com/office/drawing/2014/main" id="{99885E26-3D67-BB2D-7208-4FE000BB97A0}"/>
                 </a:ext>
               </a:extLst>
             </p:cNvPr>
-            <p:cNvGrpSpPr/>
+            <p:cNvSpPr/>
             <p:nvPr/>
-          </p:nvGrpSpPr>
-          <p:grpSpPr>
-            <a:xfrm rot="10800000">
-              <a:off x="9286210" y="733405"/>
-              <a:ext cx="161334" cy="260482"/>
-              <a:chOff x="8955183" y="953213"/>
-              <a:chExt cx="161334" cy="260482"/>
+          </p:nvSpPr>
+          <p:spPr>
+            <a:xfrm rot="18888775">
+              <a:off x="8617533" y="779293"/>
+              <a:ext cx="107872" cy="107872"/>
             </a:xfrm>
-          </p:grpSpPr>
-          <p:sp>
-            <p:nvSpPr>
-              <p:cNvPr id="74" name="Diagrama de flujo: conector 73">
-                <a:extLst>
-                  <a:ext uri="{FF2B5EF4-FFF2-40B4-BE49-F238E27FC236}">
-                    <a16:creationId xmlns:a16="http://schemas.microsoft.com/office/drawing/2014/main" id="{19F2762F-BB0A-763B-9371-D00B33D82A4B}"/>
-                  </a:ext>
-                </a:extLst>
-              </p:cNvPr>
-              <p:cNvSpPr/>
-              <p:nvPr/>
-            </p:nvSpPr>
-            <p:spPr>
-              <a:xfrm rot="18888775">
-                <a:off x="8955183" y="1105823"/>
-                <a:ext cx="107872" cy="107872"/>
-              </a:xfrm>
-              <a:prstGeom prst="flowChartConnector">
-                <a:avLst/>
-              </a:prstGeom>
+            <a:prstGeom prst="flowChartConnector">
+              <a:avLst/>
+            </a:prstGeom>
+            <a:solidFill>
+              <a:schemeClr val="accent1"/>
+            </a:solidFill>
+          </p:spPr>
+          <p:style>
+            <a:lnRef idx="2">
+              <a:schemeClr val="accent1">
+                <a:shade val="15000"/>
+              </a:schemeClr>
+            </a:lnRef>
+            <a:fillRef idx="1">
+              <a:schemeClr val="accent1"/>
+            </a:fillRef>
+            <a:effectRef idx="0">
+              <a:schemeClr val="accent1"/>
+            </a:effectRef>
+            <a:fontRef idx="minor">
+              <a:schemeClr val="lt1"/>
+            </a:fontRef>
+          </p:style>
+          <p:txBody>
+            <a:bodyPr rtlCol="0" anchor="ctr"/>
+            <a:lstStyle/>
+            <a:p>
+              <a:pPr algn="ctr"/>
+              <a:endParaRPr lang="es-ES" dirty="0"/>
+            </a:p>
+          </p:txBody>
+        </p:sp>
+        <p:cxnSp>
+          <p:nvCxnSpPr>
+            <p:cNvPr id="77" name="Conector recto 76">
+              <a:extLst>
+                <a:ext uri="{FF2B5EF4-FFF2-40B4-BE49-F238E27FC236}">
+                  <a16:creationId xmlns:a16="http://schemas.microsoft.com/office/drawing/2014/main" id="{09E867F4-0182-1248-3DED-5DCDD2D9BAD3}"/>
+                </a:ext>
+              </a:extLst>
+            </p:cNvPr>
+            <p:cNvCxnSpPr>
+              <a:cxnSpLocks/>
+            </p:cNvCxnSpPr>
+            <p:nvPr/>
+          </p:nvCxnSpPr>
+          <p:spPr>
+            <a:xfrm rot="18888775">
+              <a:off x="8680422" y="725128"/>
+              <a:ext cx="196889" cy="0"/>
+            </a:xfrm>
+            <a:prstGeom prst="line">
+              <a:avLst/>
+            </a:prstGeom>
+            <a:ln>
               <a:solidFill>
-                <a:schemeClr val="accent1"/>
+                <a:schemeClr val="tx1"/>
               </a:solidFill>
-            </p:spPr>
-            <p:style>
-              <a:lnRef idx="2">
-                <a:schemeClr val="accent1">
-                  <a:shade val="15000"/>
-                </a:schemeClr>
-              </a:lnRef>
-              <a:fillRef idx="1">
-                <a:schemeClr val="accent1"/>
-              </a:fillRef>
-              <a:effectRef idx="0">
-                <a:schemeClr val="accent1"/>
-              </a:effectRef>
-              <a:fontRef idx="minor">
-                <a:schemeClr val="lt1"/>
-              </a:fontRef>
-            </p:style>
-            <p:txBody>
-              <a:bodyPr rtlCol="0" anchor="ctr"/>
-              <a:lstStyle/>
-              <a:p>
-                <a:pPr algn="ctr"/>
-                <a:endParaRPr lang="es-ES"/>
-              </a:p>
-            </p:txBody>
-          </p:sp>
-          <p:cxnSp>
-            <p:nvCxnSpPr>
-              <p:cNvPr id="75" name="Conector recto 74">
-                <a:extLst>
-                  <a:ext uri="{FF2B5EF4-FFF2-40B4-BE49-F238E27FC236}">
-                    <a16:creationId xmlns:a16="http://schemas.microsoft.com/office/drawing/2014/main" id="{2B716FBF-707F-14C7-B1C7-3BAB7C52E8D8}"/>
-                  </a:ext>
-                </a:extLst>
-              </p:cNvPr>
-              <p:cNvCxnSpPr>
-                <a:cxnSpLocks/>
-              </p:cNvCxnSpPr>
-              <p:nvPr/>
-            </p:nvCxnSpPr>
-            <p:spPr>
-              <a:xfrm rot="18888775">
-                <a:off x="9018072" y="1051658"/>
-                <a:ext cx="196889" cy="0"/>
-              </a:xfrm>
-              <a:prstGeom prst="line">
-                <a:avLst/>
-              </a:prstGeom>
-              <a:ln>
-                <a:solidFill>
-                  <a:schemeClr val="tx1"/>
-                </a:solidFill>
-              </a:ln>
-            </p:spPr>
-            <p:style>
-              <a:lnRef idx="2">
-                <a:schemeClr val="accent1"/>
-              </a:lnRef>
-              <a:fillRef idx="0">
-                <a:schemeClr val="accent1"/>
-              </a:fillRef>
-              <a:effectRef idx="1">
-                <a:schemeClr val="accent1"/>
-              </a:effectRef>
-              <a:fontRef idx="minor">
-                <a:schemeClr val="tx1"/>
-              </a:fontRef>
-            </p:style>
-          </p:cxnSp>
-        </p:grpSp>
+            </a:ln>
+          </p:spPr>
+          <p:style>
+            <a:lnRef idx="2">
+              <a:schemeClr val="accent1"/>
+            </a:lnRef>
+            <a:fillRef idx="0">
+              <a:schemeClr val="accent1"/>
+            </a:fillRef>
+            <a:effectRef idx="1">
+              <a:schemeClr val="accent1"/>
+            </a:effectRef>
+            <a:fontRef idx="minor">
+              <a:schemeClr val="tx1"/>
+            </a:fontRef>
+          </p:style>
+        </p:cxnSp>
       </p:grpSp>
       <p:sp>
         <p:nvSpPr>
@@ -8556,10 +7547,123 @@
       </p:sp>
       <p:grpSp>
         <p:nvGrpSpPr>
-          <p:cNvPr id="87" name="Grupo 86">
-            <a:extLst>
-              <a:ext uri="{FF2B5EF4-FFF2-40B4-BE49-F238E27FC236}">
-                <a16:creationId xmlns:a16="http://schemas.microsoft.com/office/drawing/2014/main" id="{A161D3B2-D5BC-59B2-FE52-9B33472AA99E}"/>
+          <p:cNvPr id="98" name="Grupo 97">
+            <a:extLst>
+              <a:ext uri="{FF2B5EF4-FFF2-40B4-BE49-F238E27FC236}">
+                <a16:creationId xmlns:a16="http://schemas.microsoft.com/office/drawing/2014/main" id="{7894B7AD-82C3-5FF9-2FD8-4643367A8EA3}"/>
+              </a:ext>
+            </a:extLst>
+          </p:cNvPr>
+          <p:cNvGrpSpPr/>
+          <p:nvPr/>
+        </p:nvGrpSpPr>
+        <p:grpSpPr>
+          <a:xfrm>
+            <a:off x="1138474" y="2770246"/>
+            <a:ext cx="304761" cy="107872"/>
+            <a:chOff x="6609634" y="1050964"/>
+            <a:chExt cx="304761" cy="107872"/>
+          </a:xfrm>
+        </p:grpSpPr>
+        <p:sp>
+          <p:nvSpPr>
+            <p:cNvPr id="105" name="Diagrama de flujo: conector 104">
+              <a:extLst>
+                <a:ext uri="{FF2B5EF4-FFF2-40B4-BE49-F238E27FC236}">
+                  <a16:creationId xmlns:a16="http://schemas.microsoft.com/office/drawing/2014/main" id="{DD57B5EC-9CE4-53F6-C4F6-C7D651EB6F39}"/>
+                </a:ext>
+              </a:extLst>
+            </p:cNvPr>
+            <p:cNvSpPr/>
+            <p:nvPr/>
+          </p:nvSpPr>
+          <p:spPr>
+            <a:xfrm>
+              <a:off x="6609634" y="1050964"/>
+              <a:ext cx="107872" cy="107872"/>
+            </a:xfrm>
+            <a:prstGeom prst="flowChartConnector">
+              <a:avLst/>
+            </a:prstGeom>
+            <a:solidFill>
+              <a:schemeClr val="accent1"/>
+            </a:solidFill>
+          </p:spPr>
+          <p:style>
+            <a:lnRef idx="2">
+              <a:schemeClr val="accent1">
+                <a:shade val="15000"/>
+              </a:schemeClr>
+            </a:lnRef>
+            <a:fillRef idx="1">
+              <a:schemeClr val="accent1"/>
+            </a:fillRef>
+            <a:effectRef idx="0">
+              <a:schemeClr val="accent1"/>
+            </a:effectRef>
+            <a:fontRef idx="minor">
+              <a:schemeClr val="lt1"/>
+            </a:fontRef>
+          </p:style>
+          <p:txBody>
+            <a:bodyPr rtlCol="0" anchor="ctr"/>
+            <a:lstStyle/>
+            <a:p>
+              <a:pPr algn="ctr"/>
+              <a:endParaRPr lang="es-ES"/>
+            </a:p>
+          </p:txBody>
+        </p:sp>
+        <p:cxnSp>
+          <p:nvCxnSpPr>
+            <p:cNvPr id="106" name="Conector recto 105">
+              <a:extLst>
+                <a:ext uri="{FF2B5EF4-FFF2-40B4-BE49-F238E27FC236}">
+                  <a16:creationId xmlns:a16="http://schemas.microsoft.com/office/drawing/2014/main" id="{2B107618-872E-C1DF-6201-ABA4B62BEC7E}"/>
+                </a:ext>
+              </a:extLst>
+            </p:cNvPr>
+            <p:cNvCxnSpPr>
+              <a:cxnSpLocks/>
+            </p:cNvCxnSpPr>
+            <p:nvPr/>
+          </p:nvCxnSpPr>
+          <p:spPr>
+            <a:xfrm>
+              <a:off x="6717506" y="1104900"/>
+              <a:ext cx="196889" cy="0"/>
+            </a:xfrm>
+            <a:prstGeom prst="line">
+              <a:avLst/>
+            </a:prstGeom>
+            <a:ln>
+              <a:solidFill>
+                <a:schemeClr val="tx1"/>
+              </a:solidFill>
+            </a:ln>
+          </p:spPr>
+          <p:style>
+            <a:lnRef idx="2">
+              <a:schemeClr val="accent1"/>
+            </a:lnRef>
+            <a:fillRef idx="0">
+              <a:schemeClr val="accent1"/>
+            </a:fillRef>
+            <a:effectRef idx="1">
+              <a:schemeClr val="accent1"/>
+            </a:effectRef>
+            <a:fontRef idx="minor">
+              <a:schemeClr val="tx1"/>
+            </a:fontRef>
+          </p:style>
+        </p:cxnSp>
+      </p:grpSp>
+      <p:grpSp>
+        <p:nvGrpSpPr>
+          <p:cNvPr id="99" name="Grupo 98">
+            <a:extLst>
+              <a:ext uri="{FF2B5EF4-FFF2-40B4-BE49-F238E27FC236}">
+                <a16:creationId xmlns:a16="http://schemas.microsoft.com/office/drawing/2014/main" id="{E6310015-344B-3829-2C3D-E4CEAA462ED4}"/>
               </a:ext>
             </a:extLst>
           </p:cNvPr>
@@ -8569,357 +7673,223 @@
         <p:grpSpPr>
           <a:xfrm>
             <a:off x="1138474" y="2246332"/>
-            <a:ext cx="304761" cy="631786"/>
-            <a:chOff x="6609634" y="527050"/>
-            <a:chExt cx="304761" cy="631786"/>
+            <a:ext cx="304761" cy="107872"/>
+            <a:chOff x="6609634" y="1050964"/>
+            <a:chExt cx="304761" cy="107872"/>
           </a:xfrm>
         </p:grpSpPr>
-        <p:grpSp>
-          <p:nvGrpSpPr>
-            <p:cNvPr id="98" name="Grupo 97">
+        <p:sp>
+          <p:nvSpPr>
+            <p:cNvPr id="103" name="Diagrama de flujo: conector 102">
               <a:extLst>
                 <a:ext uri="{FF2B5EF4-FFF2-40B4-BE49-F238E27FC236}">
-                  <a16:creationId xmlns:a16="http://schemas.microsoft.com/office/drawing/2014/main" id="{7894B7AD-82C3-5FF9-2FD8-4643367A8EA3}"/>
+                  <a16:creationId xmlns:a16="http://schemas.microsoft.com/office/drawing/2014/main" id="{0C096872-4656-E31D-24AC-E363E52725FA}"/>
                 </a:ext>
               </a:extLst>
             </p:cNvPr>
-            <p:cNvGrpSpPr/>
+            <p:cNvSpPr/>
             <p:nvPr/>
-          </p:nvGrpSpPr>
-          <p:grpSpPr>
+          </p:nvSpPr>
+          <p:spPr>
             <a:xfrm>
               <a:off x="6609634" y="1050964"/>
-              <a:ext cx="304761" cy="107872"/>
-              <a:chOff x="6609634" y="1050964"/>
-              <a:chExt cx="304761" cy="107872"/>
+              <a:ext cx="107872" cy="107872"/>
             </a:xfrm>
-          </p:grpSpPr>
-          <p:sp>
-            <p:nvSpPr>
-              <p:cNvPr id="105" name="Diagrama de flujo: conector 104">
-                <a:extLst>
-                  <a:ext uri="{FF2B5EF4-FFF2-40B4-BE49-F238E27FC236}">
-                    <a16:creationId xmlns:a16="http://schemas.microsoft.com/office/drawing/2014/main" id="{DD57B5EC-9CE4-53F6-C4F6-C7D651EB6F39}"/>
-                  </a:ext>
-                </a:extLst>
-              </p:cNvPr>
-              <p:cNvSpPr/>
-              <p:nvPr/>
-            </p:nvSpPr>
-            <p:spPr>
-              <a:xfrm>
-                <a:off x="6609634" y="1050964"/>
-                <a:ext cx="107872" cy="107872"/>
-              </a:xfrm>
-              <a:prstGeom prst="flowChartConnector">
-                <a:avLst/>
-              </a:prstGeom>
-              <a:solidFill>
-                <a:schemeClr val="accent1"/>
-              </a:solidFill>
-            </p:spPr>
-            <p:style>
-              <a:lnRef idx="2">
-                <a:schemeClr val="accent1">
-                  <a:shade val="15000"/>
-                </a:schemeClr>
-              </a:lnRef>
-              <a:fillRef idx="1">
-                <a:schemeClr val="accent1"/>
-              </a:fillRef>
-              <a:effectRef idx="0">
-                <a:schemeClr val="accent1"/>
-              </a:effectRef>
-              <a:fontRef idx="minor">
-                <a:schemeClr val="lt1"/>
-              </a:fontRef>
-            </p:style>
-            <p:txBody>
-              <a:bodyPr rtlCol="0" anchor="ctr"/>
-              <a:lstStyle/>
-              <a:p>
-                <a:pPr algn="ctr"/>
-                <a:endParaRPr lang="es-ES"/>
-              </a:p>
-            </p:txBody>
-          </p:sp>
-          <p:cxnSp>
-            <p:nvCxnSpPr>
-              <p:cNvPr id="106" name="Conector recto 105">
-                <a:extLst>
-                  <a:ext uri="{FF2B5EF4-FFF2-40B4-BE49-F238E27FC236}">
-                    <a16:creationId xmlns:a16="http://schemas.microsoft.com/office/drawing/2014/main" id="{2B107618-872E-C1DF-6201-ABA4B62BEC7E}"/>
-                  </a:ext>
-                </a:extLst>
-              </p:cNvPr>
-              <p:cNvCxnSpPr>
-                <a:cxnSpLocks/>
-              </p:cNvCxnSpPr>
-              <p:nvPr/>
-            </p:nvCxnSpPr>
-            <p:spPr>
-              <a:xfrm>
-                <a:off x="6717506" y="1104900"/>
-                <a:ext cx="196889" cy="0"/>
-              </a:xfrm>
-              <a:prstGeom prst="line">
-                <a:avLst/>
-              </a:prstGeom>
-              <a:ln>
-                <a:solidFill>
-                  <a:schemeClr val="tx1"/>
-                </a:solidFill>
-              </a:ln>
-            </p:spPr>
-            <p:style>
-              <a:lnRef idx="2">
-                <a:schemeClr val="accent1"/>
-              </a:lnRef>
-              <a:fillRef idx="0">
-                <a:schemeClr val="accent1"/>
-              </a:fillRef>
-              <a:effectRef idx="1">
-                <a:schemeClr val="accent1"/>
-              </a:effectRef>
-              <a:fontRef idx="minor">
-                <a:schemeClr val="tx1"/>
-              </a:fontRef>
-            </p:style>
-          </p:cxnSp>
-        </p:grpSp>
-        <p:grpSp>
-          <p:nvGrpSpPr>
-            <p:cNvPr id="99" name="Grupo 98">
+            <a:prstGeom prst="flowChartConnector">
+              <a:avLst/>
+            </a:prstGeom>
+            <a:solidFill>
+              <a:schemeClr val="accent1"/>
+            </a:solidFill>
+          </p:spPr>
+          <p:style>
+            <a:lnRef idx="2">
+              <a:schemeClr val="accent1">
+                <a:shade val="15000"/>
+              </a:schemeClr>
+            </a:lnRef>
+            <a:fillRef idx="1">
+              <a:schemeClr val="accent1"/>
+            </a:fillRef>
+            <a:effectRef idx="0">
+              <a:schemeClr val="accent1"/>
+            </a:effectRef>
+            <a:fontRef idx="minor">
+              <a:schemeClr val="lt1"/>
+            </a:fontRef>
+          </p:style>
+          <p:txBody>
+            <a:bodyPr rtlCol="0" anchor="ctr"/>
+            <a:lstStyle/>
+            <a:p>
+              <a:pPr algn="ctr"/>
+              <a:endParaRPr lang="es-ES"/>
+            </a:p>
+          </p:txBody>
+        </p:sp>
+        <p:cxnSp>
+          <p:nvCxnSpPr>
+            <p:cNvPr id="104" name="Conector recto 103">
               <a:extLst>
                 <a:ext uri="{FF2B5EF4-FFF2-40B4-BE49-F238E27FC236}">
-                  <a16:creationId xmlns:a16="http://schemas.microsoft.com/office/drawing/2014/main" id="{E6310015-344B-3829-2C3D-E4CEAA462ED4}"/>
+                  <a16:creationId xmlns:a16="http://schemas.microsoft.com/office/drawing/2014/main" id="{4D0D993F-2156-7365-0956-0A490B1F8079}"/>
                 </a:ext>
               </a:extLst>
             </p:cNvPr>
-            <p:cNvGrpSpPr/>
+            <p:cNvCxnSpPr>
+              <a:cxnSpLocks/>
+            </p:cNvCxnSpPr>
             <p:nvPr/>
-          </p:nvGrpSpPr>
-          <p:grpSpPr>
+          </p:nvCxnSpPr>
+          <p:spPr>
             <a:xfrm>
-              <a:off x="6609634" y="527050"/>
-              <a:ext cx="304761" cy="107872"/>
-              <a:chOff x="6609634" y="1050964"/>
-              <a:chExt cx="304761" cy="107872"/>
+              <a:off x="6717506" y="1104900"/>
+              <a:ext cx="196889" cy="0"/>
             </a:xfrm>
-          </p:grpSpPr>
-          <p:sp>
-            <p:nvSpPr>
-              <p:cNvPr id="103" name="Diagrama de flujo: conector 102">
-                <a:extLst>
-                  <a:ext uri="{FF2B5EF4-FFF2-40B4-BE49-F238E27FC236}">
-                    <a16:creationId xmlns:a16="http://schemas.microsoft.com/office/drawing/2014/main" id="{0C096872-4656-E31D-24AC-E363E52725FA}"/>
-                  </a:ext>
-                </a:extLst>
-              </p:cNvPr>
-              <p:cNvSpPr/>
-              <p:nvPr/>
-            </p:nvSpPr>
-            <p:spPr>
-              <a:xfrm>
-                <a:off x="6609634" y="1050964"/>
-                <a:ext cx="107872" cy="107872"/>
-              </a:xfrm>
-              <a:prstGeom prst="flowChartConnector">
-                <a:avLst/>
-              </a:prstGeom>
+            <a:prstGeom prst="line">
+              <a:avLst/>
+            </a:prstGeom>
+            <a:ln>
               <a:solidFill>
-                <a:schemeClr val="accent1"/>
+                <a:schemeClr val="tx1"/>
               </a:solidFill>
-            </p:spPr>
-            <p:style>
-              <a:lnRef idx="2">
-                <a:schemeClr val="accent1">
-                  <a:shade val="15000"/>
-                </a:schemeClr>
-              </a:lnRef>
-              <a:fillRef idx="1">
-                <a:schemeClr val="accent1"/>
-              </a:fillRef>
-              <a:effectRef idx="0">
-                <a:schemeClr val="accent1"/>
-              </a:effectRef>
-              <a:fontRef idx="minor">
-                <a:schemeClr val="lt1"/>
-              </a:fontRef>
-            </p:style>
-            <p:txBody>
-              <a:bodyPr rtlCol="0" anchor="ctr"/>
-              <a:lstStyle/>
-              <a:p>
-                <a:pPr algn="ctr"/>
-                <a:endParaRPr lang="es-ES"/>
-              </a:p>
-            </p:txBody>
-          </p:sp>
-          <p:cxnSp>
-            <p:nvCxnSpPr>
-              <p:cNvPr id="104" name="Conector recto 103">
-                <a:extLst>
-                  <a:ext uri="{FF2B5EF4-FFF2-40B4-BE49-F238E27FC236}">
-                    <a16:creationId xmlns:a16="http://schemas.microsoft.com/office/drawing/2014/main" id="{4D0D993F-2156-7365-0956-0A490B1F8079}"/>
-                  </a:ext>
-                </a:extLst>
-              </p:cNvPr>
-              <p:cNvCxnSpPr>
-                <a:cxnSpLocks/>
-              </p:cNvCxnSpPr>
-              <p:nvPr/>
-            </p:nvCxnSpPr>
-            <p:spPr>
-              <a:xfrm>
-                <a:off x="6717506" y="1104900"/>
-                <a:ext cx="196889" cy="0"/>
-              </a:xfrm>
-              <a:prstGeom prst="line">
-                <a:avLst/>
-              </a:prstGeom>
-              <a:ln>
-                <a:solidFill>
-                  <a:schemeClr val="tx1"/>
-                </a:solidFill>
-              </a:ln>
-            </p:spPr>
-            <p:style>
-              <a:lnRef idx="2">
-                <a:schemeClr val="accent1"/>
-              </a:lnRef>
-              <a:fillRef idx="0">
-                <a:schemeClr val="accent1"/>
-              </a:fillRef>
-              <a:effectRef idx="1">
-                <a:schemeClr val="accent1"/>
-              </a:effectRef>
-              <a:fontRef idx="minor">
-                <a:schemeClr val="tx1"/>
-              </a:fontRef>
-            </p:style>
-          </p:cxnSp>
-        </p:grpSp>
-        <p:grpSp>
-          <p:nvGrpSpPr>
-            <p:cNvPr id="100" name="Grupo 99">
+            </a:ln>
+          </p:spPr>
+          <p:style>
+            <a:lnRef idx="2">
+              <a:schemeClr val="accent1"/>
+            </a:lnRef>
+            <a:fillRef idx="0">
+              <a:schemeClr val="accent1"/>
+            </a:fillRef>
+            <a:effectRef idx="1">
+              <a:schemeClr val="accent1"/>
+            </a:effectRef>
+            <a:fontRef idx="minor">
+              <a:schemeClr val="tx1"/>
+            </a:fontRef>
+          </p:style>
+        </p:cxnSp>
+      </p:grpSp>
+      <p:grpSp>
+        <p:nvGrpSpPr>
+          <p:cNvPr id="89" name="Grupo 88">
+            <a:extLst>
+              <a:ext uri="{FF2B5EF4-FFF2-40B4-BE49-F238E27FC236}">
+                <a16:creationId xmlns:a16="http://schemas.microsoft.com/office/drawing/2014/main" id="{43AA8AF2-5C0A-07FA-E1D2-3C9D11D7F440}"/>
+              </a:ext>
+            </a:extLst>
+          </p:cNvPr>
+          <p:cNvGrpSpPr/>
+          <p:nvPr/>
+        </p:nvGrpSpPr>
+        <p:grpSpPr>
+          <a:xfrm flipH="1">
+            <a:off x="1443235" y="2770246"/>
+            <a:ext cx="304761" cy="107872"/>
+            <a:chOff x="6609634" y="1050964"/>
+            <a:chExt cx="304761" cy="107872"/>
+          </a:xfrm>
+        </p:grpSpPr>
+        <p:sp>
+          <p:nvSpPr>
+            <p:cNvPr id="96" name="Diagrama de flujo: conector 95">
               <a:extLst>
                 <a:ext uri="{FF2B5EF4-FFF2-40B4-BE49-F238E27FC236}">
-                  <a16:creationId xmlns:a16="http://schemas.microsoft.com/office/drawing/2014/main" id="{21E5C46A-4A11-6F2B-C5D7-49B1913684A0}"/>
+                  <a16:creationId xmlns:a16="http://schemas.microsoft.com/office/drawing/2014/main" id="{DAE12C56-A795-6F57-0265-C8094E8E3878}"/>
                 </a:ext>
               </a:extLst>
             </p:cNvPr>
-            <p:cNvGrpSpPr/>
+            <p:cNvSpPr/>
             <p:nvPr/>
-          </p:nvGrpSpPr>
-          <p:grpSpPr>
+          </p:nvSpPr>
+          <p:spPr>
             <a:xfrm>
-              <a:off x="6609634" y="787440"/>
-              <a:ext cx="304761" cy="107872"/>
-              <a:chOff x="6609634" y="1050964"/>
-              <a:chExt cx="304761" cy="107872"/>
+              <a:off x="6609634" y="1050964"/>
+              <a:ext cx="107872" cy="107872"/>
             </a:xfrm>
-          </p:grpSpPr>
-          <p:sp>
-            <p:nvSpPr>
-              <p:cNvPr id="101" name="Diagrama de flujo: conector 100">
-                <a:extLst>
-                  <a:ext uri="{FF2B5EF4-FFF2-40B4-BE49-F238E27FC236}">
-                    <a16:creationId xmlns:a16="http://schemas.microsoft.com/office/drawing/2014/main" id="{444F51BC-9CAF-B380-E5A7-73E5560ED322}"/>
-                  </a:ext>
-                </a:extLst>
-              </p:cNvPr>
-              <p:cNvSpPr/>
-              <p:nvPr/>
-            </p:nvSpPr>
-            <p:spPr>
-              <a:xfrm>
-                <a:off x="6609634" y="1050964"/>
-                <a:ext cx="107872" cy="107872"/>
-              </a:xfrm>
-              <a:prstGeom prst="flowChartConnector">
-                <a:avLst/>
-              </a:prstGeom>
+            <a:prstGeom prst="flowChartConnector">
+              <a:avLst/>
+            </a:prstGeom>
+            <a:solidFill>
+              <a:schemeClr val="accent1"/>
+            </a:solidFill>
+          </p:spPr>
+          <p:style>
+            <a:lnRef idx="2">
+              <a:schemeClr val="accent1">
+                <a:shade val="15000"/>
+              </a:schemeClr>
+            </a:lnRef>
+            <a:fillRef idx="1">
+              <a:schemeClr val="accent1"/>
+            </a:fillRef>
+            <a:effectRef idx="0">
+              <a:schemeClr val="accent1"/>
+            </a:effectRef>
+            <a:fontRef idx="minor">
+              <a:schemeClr val="lt1"/>
+            </a:fontRef>
+          </p:style>
+          <p:txBody>
+            <a:bodyPr rtlCol="0" anchor="ctr"/>
+            <a:lstStyle/>
+            <a:p>
+              <a:pPr algn="ctr"/>
+              <a:endParaRPr lang="es-ES"/>
+            </a:p>
+          </p:txBody>
+        </p:sp>
+        <p:cxnSp>
+          <p:nvCxnSpPr>
+            <p:cNvPr id="97" name="Conector recto 96">
+              <a:extLst>
+                <a:ext uri="{FF2B5EF4-FFF2-40B4-BE49-F238E27FC236}">
+                  <a16:creationId xmlns:a16="http://schemas.microsoft.com/office/drawing/2014/main" id="{76D9A508-06DB-4211-1311-C7648B81BA0E}"/>
+                </a:ext>
+              </a:extLst>
+            </p:cNvPr>
+            <p:cNvCxnSpPr>
+              <a:cxnSpLocks/>
+            </p:cNvCxnSpPr>
+            <p:nvPr/>
+          </p:nvCxnSpPr>
+          <p:spPr>
+            <a:xfrm>
+              <a:off x="6717506" y="1104900"/>
+              <a:ext cx="196889" cy="0"/>
+            </a:xfrm>
+            <a:prstGeom prst="line">
+              <a:avLst/>
+            </a:prstGeom>
+            <a:ln>
               <a:solidFill>
-                <a:schemeClr val="accent1"/>
+                <a:schemeClr val="tx1"/>
               </a:solidFill>
-            </p:spPr>
-            <p:style>
-              <a:lnRef idx="2">
-                <a:schemeClr val="accent1">
-                  <a:shade val="15000"/>
-                </a:schemeClr>
-              </a:lnRef>
-              <a:fillRef idx="1">
-                <a:schemeClr val="accent1"/>
-              </a:fillRef>
-              <a:effectRef idx="0">
-                <a:schemeClr val="accent1"/>
-              </a:effectRef>
-              <a:fontRef idx="minor">
-                <a:schemeClr val="lt1"/>
-              </a:fontRef>
-            </p:style>
-            <p:txBody>
-              <a:bodyPr rtlCol="0" anchor="ctr"/>
-              <a:lstStyle/>
-              <a:p>
-                <a:pPr algn="ctr"/>
-                <a:endParaRPr lang="es-ES"/>
-              </a:p>
-            </p:txBody>
-          </p:sp>
-          <p:cxnSp>
-            <p:nvCxnSpPr>
-              <p:cNvPr id="102" name="Conector recto 101">
-                <a:extLst>
-                  <a:ext uri="{FF2B5EF4-FFF2-40B4-BE49-F238E27FC236}">
-                    <a16:creationId xmlns:a16="http://schemas.microsoft.com/office/drawing/2014/main" id="{3C9B2B72-EEB6-747A-E9F7-4BC59CD98006}"/>
-                  </a:ext>
-                </a:extLst>
-              </p:cNvPr>
-              <p:cNvCxnSpPr>
-                <a:cxnSpLocks/>
-              </p:cNvCxnSpPr>
-              <p:nvPr/>
-            </p:nvCxnSpPr>
-            <p:spPr>
-              <a:xfrm>
-                <a:off x="6717506" y="1104900"/>
-                <a:ext cx="196889" cy="0"/>
-              </a:xfrm>
-              <a:prstGeom prst="line">
-                <a:avLst/>
-              </a:prstGeom>
-              <a:ln>
-                <a:solidFill>
-                  <a:schemeClr val="tx1"/>
-                </a:solidFill>
-              </a:ln>
-            </p:spPr>
-            <p:style>
-              <a:lnRef idx="2">
-                <a:schemeClr val="accent1"/>
-              </a:lnRef>
-              <a:fillRef idx="0">
-                <a:schemeClr val="accent1"/>
-              </a:fillRef>
-              <a:effectRef idx="1">
-                <a:schemeClr val="accent1"/>
-              </a:effectRef>
-              <a:fontRef idx="minor">
-                <a:schemeClr val="tx1"/>
-              </a:fontRef>
-            </p:style>
-          </p:cxnSp>
-        </p:grpSp>
+            </a:ln>
+          </p:spPr>
+          <p:style>
+            <a:lnRef idx="2">
+              <a:schemeClr val="accent1"/>
+            </a:lnRef>
+            <a:fillRef idx="0">
+              <a:schemeClr val="accent1"/>
+            </a:fillRef>
+            <a:effectRef idx="1">
+              <a:schemeClr val="accent1"/>
+            </a:effectRef>
+            <a:fontRef idx="minor">
+              <a:schemeClr val="tx1"/>
+            </a:fontRef>
+          </p:style>
+        </p:cxnSp>
       </p:grpSp>
       <p:grpSp>
         <p:nvGrpSpPr>
-          <p:cNvPr id="88" name="Grupo 87">
-            <a:extLst>
-              <a:ext uri="{FF2B5EF4-FFF2-40B4-BE49-F238E27FC236}">
-                <a16:creationId xmlns:a16="http://schemas.microsoft.com/office/drawing/2014/main" id="{BD0C6F1A-9B41-68DF-9B7B-3DBDADD4B7FF}"/>
+          <p:cNvPr id="90" name="Grupo 89">
+            <a:extLst>
+              <a:ext uri="{FF2B5EF4-FFF2-40B4-BE49-F238E27FC236}">
+                <a16:creationId xmlns:a16="http://schemas.microsoft.com/office/drawing/2014/main" id="{39D55D66-8C97-604A-395A-6841A765EB60}"/>
               </a:ext>
             </a:extLst>
           </p:cNvPr>
@@ -8929,350 +7899,103 @@
         <p:grpSpPr>
           <a:xfrm flipH="1">
             <a:off x="1443235" y="2246332"/>
-            <a:ext cx="304761" cy="631786"/>
-            <a:chOff x="6609634" y="527050"/>
-            <a:chExt cx="304761" cy="631786"/>
+            <a:ext cx="304761" cy="107872"/>
+            <a:chOff x="6609634" y="1050964"/>
+            <a:chExt cx="304761" cy="107872"/>
           </a:xfrm>
         </p:grpSpPr>
-        <p:grpSp>
-          <p:nvGrpSpPr>
-            <p:cNvPr id="89" name="Grupo 88">
+        <p:sp>
+          <p:nvSpPr>
+            <p:cNvPr id="94" name="Diagrama de flujo: conector 93">
               <a:extLst>
                 <a:ext uri="{FF2B5EF4-FFF2-40B4-BE49-F238E27FC236}">
-                  <a16:creationId xmlns:a16="http://schemas.microsoft.com/office/drawing/2014/main" id="{43AA8AF2-5C0A-07FA-E1D2-3C9D11D7F440}"/>
+                  <a16:creationId xmlns:a16="http://schemas.microsoft.com/office/drawing/2014/main" id="{0989F854-966D-AB49-9243-1D2614D2A7B3}"/>
                 </a:ext>
               </a:extLst>
             </p:cNvPr>
-            <p:cNvGrpSpPr/>
+            <p:cNvSpPr/>
             <p:nvPr/>
-          </p:nvGrpSpPr>
-          <p:grpSpPr>
+          </p:nvSpPr>
+          <p:spPr>
             <a:xfrm>
               <a:off x="6609634" y="1050964"/>
-              <a:ext cx="304761" cy="107872"/>
-              <a:chOff x="6609634" y="1050964"/>
-              <a:chExt cx="304761" cy="107872"/>
+              <a:ext cx="107872" cy="107872"/>
             </a:xfrm>
-          </p:grpSpPr>
-          <p:sp>
-            <p:nvSpPr>
-              <p:cNvPr id="96" name="Diagrama de flujo: conector 95">
-                <a:extLst>
-                  <a:ext uri="{FF2B5EF4-FFF2-40B4-BE49-F238E27FC236}">
-                    <a16:creationId xmlns:a16="http://schemas.microsoft.com/office/drawing/2014/main" id="{DAE12C56-A795-6F57-0265-C8094E8E3878}"/>
-                  </a:ext>
-                </a:extLst>
-              </p:cNvPr>
-              <p:cNvSpPr/>
-              <p:nvPr/>
-            </p:nvSpPr>
-            <p:spPr>
-              <a:xfrm>
-                <a:off x="6609634" y="1050964"/>
-                <a:ext cx="107872" cy="107872"/>
-              </a:xfrm>
-              <a:prstGeom prst="flowChartConnector">
-                <a:avLst/>
-              </a:prstGeom>
-              <a:solidFill>
-                <a:schemeClr val="accent1"/>
-              </a:solidFill>
-            </p:spPr>
-            <p:style>
-              <a:lnRef idx="2">
-                <a:schemeClr val="accent1">
-                  <a:shade val="15000"/>
-                </a:schemeClr>
-              </a:lnRef>
-              <a:fillRef idx="1">
-                <a:schemeClr val="accent1"/>
-              </a:fillRef>
-              <a:effectRef idx="0">
-                <a:schemeClr val="accent1"/>
-              </a:effectRef>
-              <a:fontRef idx="minor">
-                <a:schemeClr val="lt1"/>
-              </a:fontRef>
-            </p:style>
-            <p:txBody>
-              <a:bodyPr rtlCol="0" anchor="ctr"/>
-              <a:lstStyle/>
-              <a:p>
-                <a:pPr algn="ctr"/>
-                <a:endParaRPr lang="es-ES"/>
-              </a:p>
-            </p:txBody>
-          </p:sp>
-          <p:cxnSp>
-            <p:nvCxnSpPr>
-              <p:cNvPr id="97" name="Conector recto 96">
-                <a:extLst>
-                  <a:ext uri="{FF2B5EF4-FFF2-40B4-BE49-F238E27FC236}">
-                    <a16:creationId xmlns:a16="http://schemas.microsoft.com/office/drawing/2014/main" id="{76D9A508-06DB-4211-1311-C7648B81BA0E}"/>
-                  </a:ext>
-                </a:extLst>
-              </p:cNvPr>
-              <p:cNvCxnSpPr>
-                <a:cxnSpLocks/>
-              </p:cNvCxnSpPr>
-              <p:nvPr/>
-            </p:nvCxnSpPr>
-            <p:spPr>
-              <a:xfrm>
-                <a:off x="6717506" y="1104900"/>
-                <a:ext cx="196889" cy="0"/>
-              </a:xfrm>
-              <a:prstGeom prst="line">
-                <a:avLst/>
-              </a:prstGeom>
-              <a:ln>
-                <a:solidFill>
-                  <a:schemeClr val="tx1"/>
-                </a:solidFill>
-              </a:ln>
-            </p:spPr>
-            <p:style>
-              <a:lnRef idx="2">
-                <a:schemeClr val="accent1"/>
-              </a:lnRef>
-              <a:fillRef idx="0">
-                <a:schemeClr val="accent1"/>
-              </a:fillRef>
-              <a:effectRef idx="1">
-                <a:schemeClr val="accent1"/>
-              </a:effectRef>
-              <a:fontRef idx="minor">
-                <a:schemeClr val="tx1"/>
-              </a:fontRef>
-            </p:style>
-          </p:cxnSp>
-        </p:grpSp>
-        <p:grpSp>
-          <p:nvGrpSpPr>
-            <p:cNvPr id="90" name="Grupo 89">
+            <a:prstGeom prst="flowChartConnector">
+              <a:avLst/>
+            </a:prstGeom>
+            <a:solidFill>
+              <a:schemeClr val="accent1"/>
+            </a:solidFill>
+          </p:spPr>
+          <p:style>
+            <a:lnRef idx="2">
+              <a:schemeClr val="accent1">
+                <a:shade val="15000"/>
+              </a:schemeClr>
+            </a:lnRef>
+            <a:fillRef idx="1">
+              <a:schemeClr val="accent1"/>
+            </a:fillRef>
+            <a:effectRef idx="0">
+              <a:schemeClr val="accent1"/>
+            </a:effectRef>
+            <a:fontRef idx="minor">
+              <a:schemeClr val="lt1"/>
+            </a:fontRef>
+          </p:style>
+          <p:txBody>
+            <a:bodyPr rtlCol="0" anchor="ctr"/>
+            <a:lstStyle/>
+            <a:p>
+              <a:pPr algn="ctr"/>
+              <a:endParaRPr lang="es-ES"/>
+            </a:p>
+          </p:txBody>
+        </p:sp>
+        <p:cxnSp>
+          <p:nvCxnSpPr>
+            <p:cNvPr id="95" name="Conector recto 94">
               <a:extLst>
                 <a:ext uri="{FF2B5EF4-FFF2-40B4-BE49-F238E27FC236}">
-                  <a16:creationId xmlns:a16="http://schemas.microsoft.com/office/drawing/2014/main" id="{39D55D66-8C97-604A-395A-6841A765EB60}"/>
+                  <a16:creationId xmlns:a16="http://schemas.microsoft.com/office/drawing/2014/main" id="{FCFFEF2D-5B85-49C3-0044-8301EBFF4FE3}"/>
                 </a:ext>
               </a:extLst>
             </p:cNvPr>
-            <p:cNvGrpSpPr/>
+            <p:cNvCxnSpPr>
+              <a:cxnSpLocks/>
+            </p:cNvCxnSpPr>
             <p:nvPr/>
-          </p:nvGrpSpPr>
-          <p:grpSpPr>
+          </p:nvCxnSpPr>
+          <p:spPr>
             <a:xfrm>
-              <a:off x="6609634" y="527050"/>
-              <a:ext cx="304761" cy="107872"/>
-              <a:chOff x="6609634" y="1050964"/>
-              <a:chExt cx="304761" cy="107872"/>
+              <a:off x="6717506" y="1104900"/>
+              <a:ext cx="196889" cy="0"/>
             </a:xfrm>
-          </p:grpSpPr>
-          <p:sp>
-            <p:nvSpPr>
-              <p:cNvPr id="94" name="Diagrama de flujo: conector 93">
-                <a:extLst>
-                  <a:ext uri="{FF2B5EF4-FFF2-40B4-BE49-F238E27FC236}">
-                    <a16:creationId xmlns:a16="http://schemas.microsoft.com/office/drawing/2014/main" id="{0989F854-966D-AB49-9243-1D2614D2A7B3}"/>
-                  </a:ext>
-                </a:extLst>
-              </p:cNvPr>
-              <p:cNvSpPr/>
-              <p:nvPr/>
-            </p:nvSpPr>
-            <p:spPr>
-              <a:xfrm>
-                <a:off x="6609634" y="1050964"/>
-                <a:ext cx="107872" cy="107872"/>
-              </a:xfrm>
-              <a:prstGeom prst="flowChartConnector">
-                <a:avLst/>
-              </a:prstGeom>
+            <a:prstGeom prst="line">
+              <a:avLst/>
+            </a:prstGeom>
+            <a:ln>
               <a:solidFill>
-                <a:schemeClr val="accent1"/>
+                <a:schemeClr val="tx1"/>
               </a:solidFill>
-            </p:spPr>
-            <p:style>
-              <a:lnRef idx="2">
-                <a:schemeClr val="accent1">
-                  <a:shade val="15000"/>
-                </a:schemeClr>
-              </a:lnRef>
-              <a:fillRef idx="1">
-                <a:schemeClr val="accent1"/>
-              </a:fillRef>
-              <a:effectRef idx="0">
-                <a:schemeClr val="accent1"/>
-              </a:effectRef>
-              <a:fontRef idx="minor">
-                <a:schemeClr val="lt1"/>
-              </a:fontRef>
-            </p:style>
-            <p:txBody>
-              <a:bodyPr rtlCol="0" anchor="ctr"/>
-              <a:lstStyle/>
-              <a:p>
-                <a:pPr algn="ctr"/>
-                <a:endParaRPr lang="es-ES"/>
-              </a:p>
-            </p:txBody>
-          </p:sp>
-          <p:cxnSp>
-            <p:nvCxnSpPr>
-              <p:cNvPr id="95" name="Conector recto 94">
-                <a:extLst>
-                  <a:ext uri="{FF2B5EF4-FFF2-40B4-BE49-F238E27FC236}">
-                    <a16:creationId xmlns:a16="http://schemas.microsoft.com/office/drawing/2014/main" id="{FCFFEF2D-5B85-49C3-0044-8301EBFF4FE3}"/>
-                  </a:ext>
-                </a:extLst>
-              </p:cNvPr>
-              <p:cNvCxnSpPr>
-                <a:cxnSpLocks/>
-              </p:cNvCxnSpPr>
-              <p:nvPr/>
-            </p:nvCxnSpPr>
-            <p:spPr>
-              <a:xfrm>
-                <a:off x="6717506" y="1104900"/>
-                <a:ext cx="196889" cy="0"/>
-              </a:xfrm>
-              <a:prstGeom prst="line">
-                <a:avLst/>
-              </a:prstGeom>
-              <a:ln>
-                <a:solidFill>
-                  <a:schemeClr val="tx1"/>
-                </a:solidFill>
-              </a:ln>
-            </p:spPr>
-            <p:style>
-              <a:lnRef idx="2">
-                <a:schemeClr val="accent1"/>
-              </a:lnRef>
-              <a:fillRef idx="0">
-                <a:schemeClr val="accent1"/>
-              </a:fillRef>
-              <a:effectRef idx="1">
-                <a:schemeClr val="accent1"/>
-              </a:effectRef>
-              <a:fontRef idx="minor">
-                <a:schemeClr val="tx1"/>
-              </a:fontRef>
-            </p:style>
-          </p:cxnSp>
-        </p:grpSp>
-        <p:grpSp>
-          <p:nvGrpSpPr>
-            <p:cNvPr id="91" name="Grupo 90">
-              <a:extLst>
-                <a:ext uri="{FF2B5EF4-FFF2-40B4-BE49-F238E27FC236}">
-                  <a16:creationId xmlns:a16="http://schemas.microsoft.com/office/drawing/2014/main" id="{53CD267A-AB4C-7432-4A7A-748CDF30C9E4}"/>
-                </a:ext>
-              </a:extLst>
-            </p:cNvPr>
-            <p:cNvGrpSpPr/>
-            <p:nvPr/>
-          </p:nvGrpSpPr>
-          <p:grpSpPr>
-            <a:xfrm>
-              <a:off x="6609634" y="787440"/>
-              <a:ext cx="304761" cy="107872"/>
-              <a:chOff x="6609634" y="1050964"/>
-              <a:chExt cx="304761" cy="107872"/>
-            </a:xfrm>
-          </p:grpSpPr>
-          <p:sp>
-            <p:nvSpPr>
-              <p:cNvPr id="92" name="Diagrama de flujo: conector 91">
-                <a:extLst>
-                  <a:ext uri="{FF2B5EF4-FFF2-40B4-BE49-F238E27FC236}">
-                    <a16:creationId xmlns:a16="http://schemas.microsoft.com/office/drawing/2014/main" id="{25B6DFDA-CEE4-887D-2C6D-8D36AFD21A8E}"/>
-                  </a:ext>
-                </a:extLst>
-              </p:cNvPr>
-              <p:cNvSpPr/>
-              <p:nvPr/>
-            </p:nvSpPr>
-            <p:spPr>
-              <a:xfrm>
-                <a:off x="6609634" y="1050964"/>
-                <a:ext cx="107872" cy="107872"/>
-              </a:xfrm>
-              <a:prstGeom prst="flowChartConnector">
-                <a:avLst/>
-              </a:prstGeom>
-              <a:solidFill>
-                <a:schemeClr val="accent1"/>
-              </a:solidFill>
-            </p:spPr>
-            <p:style>
-              <a:lnRef idx="2">
-                <a:schemeClr val="accent1">
-                  <a:shade val="15000"/>
-                </a:schemeClr>
-              </a:lnRef>
-              <a:fillRef idx="1">
-                <a:schemeClr val="accent1"/>
-              </a:fillRef>
-              <a:effectRef idx="0">
-                <a:schemeClr val="accent1"/>
-              </a:effectRef>
-              <a:fontRef idx="minor">
-                <a:schemeClr val="lt1"/>
-              </a:fontRef>
-            </p:style>
-            <p:txBody>
-              <a:bodyPr rtlCol="0" anchor="ctr"/>
-              <a:lstStyle/>
-              <a:p>
-                <a:pPr algn="ctr"/>
-                <a:endParaRPr lang="es-ES"/>
-              </a:p>
-            </p:txBody>
-          </p:sp>
-          <p:cxnSp>
-            <p:nvCxnSpPr>
-              <p:cNvPr id="93" name="Conector recto 92">
-                <a:extLst>
-                  <a:ext uri="{FF2B5EF4-FFF2-40B4-BE49-F238E27FC236}">
-                    <a16:creationId xmlns:a16="http://schemas.microsoft.com/office/drawing/2014/main" id="{4520DB7E-CD3E-2574-CD2B-196D860DDFF0}"/>
-                  </a:ext>
-                </a:extLst>
-              </p:cNvPr>
-              <p:cNvCxnSpPr>
-                <a:cxnSpLocks/>
-              </p:cNvCxnSpPr>
-              <p:nvPr/>
-            </p:nvCxnSpPr>
-            <p:spPr>
-              <a:xfrm>
-                <a:off x="6717506" y="1104900"/>
-                <a:ext cx="196889" cy="0"/>
-              </a:xfrm>
-              <a:prstGeom prst="line">
-                <a:avLst/>
-              </a:prstGeom>
-              <a:ln>
-                <a:solidFill>
-                  <a:schemeClr val="tx1"/>
-                </a:solidFill>
-              </a:ln>
-            </p:spPr>
-            <p:style>
-              <a:lnRef idx="2">
-                <a:schemeClr val="accent1"/>
-              </a:lnRef>
-              <a:fillRef idx="0">
-                <a:schemeClr val="accent1"/>
-              </a:fillRef>
-              <a:effectRef idx="1">
-                <a:schemeClr val="accent1"/>
-              </a:effectRef>
-              <a:fontRef idx="minor">
-                <a:schemeClr val="tx1"/>
-              </a:fontRef>
-            </p:style>
-          </p:cxnSp>
-        </p:grpSp>
+            </a:ln>
+          </p:spPr>
+          <p:style>
+            <a:lnRef idx="2">
+              <a:schemeClr val="accent1"/>
+            </a:lnRef>
+            <a:fillRef idx="0">
+              <a:schemeClr val="accent1"/>
+            </a:fillRef>
+            <a:effectRef idx="1">
+              <a:schemeClr val="accent1"/>
+            </a:effectRef>
+            <a:fontRef idx="minor">
+              <a:schemeClr val="tx1"/>
+            </a:fontRef>
+          </p:style>
+        </p:cxnSp>
       </p:grpSp>
       <p:sp>
         <p:nvSpPr>
@@ -9330,10 +8053,123 @@
       </p:sp>
       <p:grpSp>
         <p:nvGrpSpPr>
-          <p:cNvPr id="111" name="Grupo 110">
-            <a:extLst>
-              <a:ext uri="{FF2B5EF4-FFF2-40B4-BE49-F238E27FC236}">
-                <a16:creationId xmlns:a16="http://schemas.microsoft.com/office/drawing/2014/main" id="{316D7A3A-F45D-C787-B403-CD2D42488242}"/>
+          <p:cNvPr id="112" name="Grupo 111">
+            <a:extLst>
+              <a:ext uri="{FF2B5EF4-FFF2-40B4-BE49-F238E27FC236}">
+                <a16:creationId xmlns:a16="http://schemas.microsoft.com/office/drawing/2014/main" id="{DA8440BD-6E6B-C9F5-9F3D-4D2F024CAE8D}"/>
+              </a:ext>
+            </a:extLst>
+          </p:cNvPr>
+          <p:cNvGrpSpPr/>
+          <p:nvPr/>
+        </p:nvGrpSpPr>
+        <p:grpSpPr>
+          <a:xfrm flipH="1">
+            <a:off x="3970432" y="2639257"/>
+            <a:ext cx="304761" cy="107872"/>
+            <a:chOff x="6609634" y="1050964"/>
+            <a:chExt cx="304761" cy="107872"/>
+          </a:xfrm>
+        </p:grpSpPr>
+        <p:sp>
+          <p:nvSpPr>
+            <p:cNvPr id="119" name="Diagrama de flujo: conector 118">
+              <a:extLst>
+                <a:ext uri="{FF2B5EF4-FFF2-40B4-BE49-F238E27FC236}">
+                  <a16:creationId xmlns:a16="http://schemas.microsoft.com/office/drawing/2014/main" id="{18082BF9-2945-6B9E-37D3-5096CC52531B}"/>
+                </a:ext>
+              </a:extLst>
+            </p:cNvPr>
+            <p:cNvSpPr/>
+            <p:nvPr/>
+          </p:nvSpPr>
+          <p:spPr>
+            <a:xfrm>
+              <a:off x="6609634" y="1050964"/>
+              <a:ext cx="107872" cy="107872"/>
+            </a:xfrm>
+            <a:prstGeom prst="flowChartConnector">
+              <a:avLst/>
+            </a:prstGeom>
+            <a:solidFill>
+              <a:schemeClr val="accent1"/>
+            </a:solidFill>
+          </p:spPr>
+          <p:style>
+            <a:lnRef idx="2">
+              <a:schemeClr val="accent1">
+                <a:shade val="15000"/>
+              </a:schemeClr>
+            </a:lnRef>
+            <a:fillRef idx="1">
+              <a:schemeClr val="accent1"/>
+            </a:fillRef>
+            <a:effectRef idx="0">
+              <a:schemeClr val="accent1"/>
+            </a:effectRef>
+            <a:fontRef idx="minor">
+              <a:schemeClr val="lt1"/>
+            </a:fontRef>
+          </p:style>
+          <p:txBody>
+            <a:bodyPr rtlCol="0" anchor="ctr"/>
+            <a:lstStyle/>
+            <a:p>
+              <a:pPr algn="ctr"/>
+              <a:endParaRPr lang="es-ES"/>
+            </a:p>
+          </p:txBody>
+        </p:sp>
+        <p:cxnSp>
+          <p:nvCxnSpPr>
+            <p:cNvPr id="120" name="Conector recto 119">
+              <a:extLst>
+                <a:ext uri="{FF2B5EF4-FFF2-40B4-BE49-F238E27FC236}">
+                  <a16:creationId xmlns:a16="http://schemas.microsoft.com/office/drawing/2014/main" id="{71DA69AA-C48F-4F6C-4A5F-6197BA5992D7}"/>
+                </a:ext>
+              </a:extLst>
+            </p:cNvPr>
+            <p:cNvCxnSpPr>
+              <a:cxnSpLocks/>
+            </p:cNvCxnSpPr>
+            <p:nvPr/>
+          </p:nvCxnSpPr>
+          <p:spPr>
+            <a:xfrm>
+              <a:off x="6717506" y="1104900"/>
+              <a:ext cx="196889" cy="0"/>
+            </a:xfrm>
+            <a:prstGeom prst="line">
+              <a:avLst/>
+            </a:prstGeom>
+            <a:ln>
+              <a:solidFill>
+                <a:schemeClr val="tx1"/>
+              </a:solidFill>
+            </a:ln>
+          </p:spPr>
+          <p:style>
+            <a:lnRef idx="2">
+              <a:schemeClr val="accent1"/>
+            </a:lnRef>
+            <a:fillRef idx="0">
+              <a:schemeClr val="accent1"/>
+            </a:fillRef>
+            <a:effectRef idx="1">
+              <a:schemeClr val="accent1"/>
+            </a:effectRef>
+            <a:fontRef idx="minor">
+              <a:schemeClr val="tx1"/>
+            </a:fontRef>
+          </p:style>
+        </p:cxnSp>
+      </p:grpSp>
+      <p:grpSp>
+        <p:nvGrpSpPr>
+          <p:cNvPr id="113" name="Grupo 112">
+            <a:extLst>
+              <a:ext uri="{FF2B5EF4-FFF2-40B4-BE49-F238E27FC236}">
+                <a16:creationId xmlns:a16="http://schemas.microsoft.com/office/drawing/2014/main" id="{F968A6FC-EA01-CA38-7CFA-E1CF0BA0A745}"/>
               </a:ext>
             </a:extLst>
           </p:cNvPr>
@@ -9343,350 +8179,103 @@
         <p:grpSpPr>
           <a:xfrm flipH="1">
             <a:off x="3970432" y="2115343"/>
-            <a:ext cx="304761" cy="631786"/>
-            <a:chOff x="6609634" y="527050"/>
-            <a:chExt cx="304761" cy="631786"/>
+            <a:ext cx="304761" cy="107872"/>
+            <a:chOff x="6609634" y="1050964"/>
+            <a:chExt cx="304761" cy="107872"/>
           </a:xfrm>
         </p:grpSpPr>
-        <p:grpSp>
-          <p:nvGrpSpPr>
-            <p:cNvPr id="112" name="Grupo 111">
+        <p:sp>
+          <p:nvSpPr>
+            <p:cNvPr id="117" name="Diagrama de flujo: conector 116">
               <a:extLst>
                 <a:ext uri="{FF2B5EF4-FFF2-40B4-BE49-F238E27FC236}">
-                  <a16:creationId xmlns:a16="http://schemas.microsoft.com/office/drawing/2014/main" id="{DA8440BD-6E6B-C9F5-9F3D-4D2F024CAE8D}"/>
+                  <a16:creationId xmlns:a16="http://schemas.microsoft.com/office/drawing/2014/main" id="{2612E417-4486-E254-9443-80DC899FD66F}"/>
                 </a:ext>
               </a:extLst>
             </p:cNvPr>
-            <p:cNvGrpSpPr/>
+            <p:cNvSpPr/>
             <p:nvPr/>
-          </p:nvGrpSpPr>
-          <p:grpSpPr>
+          </p:nvSpPr>
+          <p:spPr>
             <a:xfrm>
               <a:off x="6609634" y="1050964"/>
-              <a:ext cx="304761" cy="107872"/>
-              <a:chOff x="6609634" y="1050964"/>
-              <a:chExt cx="304761" cy="107872"/>
+              <a:ext cx="107872" cy="107872"/>
             </a:xfrm>
-          </p:grpSpPr>
-          <p:sp>
-            <p:nvSpPr>
-              <p:cNvPr id="119" name="Diagrama de flujo: conector 118">
-                <a:extLst>
-                  <a:ext uri="{FF2B5EF4-FFF2-40B4-BE49-F238E27FC236}">
-                    <a16:creationId xmlns:a16="http://schemas.microsoft.com/office/drawing/2014/main" id="{18082BF9-2945-6B9E-37D3-5096CC52531B}"/>
-                  </a:ext>
-                </a:extLst>
-              </p:cNvPr>
-              <p:cNvSpPr/>
-              <p:nvPr/>
-            </p:nvSpPr>
-            <p:spPr>
-              <a:xfrm>
-                <a:off x="6609634" y="1050964"/>
-                <a:ext cx="107872" cy="107872"/>
-              </a:xfrm>
-              <a:prstGeom prst="flowChartConnector">
-                <a:avLst/>
-              </a:prstGeom>
-              <a:solidFill>
-                <a:schemeClr val="accent1"/>
-              </a:solidFill>
-            </p:spPr>
-            <p:style>
-              <a:lnRef idx="2">
-                <a:schemeClr val="accent1">
-                  <a:shade val="15000"/>
-                </a:schemeClr>
-              </a:lnRef>
-              <a:fillRef idx="1">
-                <a:schemeClr val="accent1"/>
-              </a:fillRef>
-              <a:effectRef idx="0">
-                <a:schemeClr val="accent1"/>
-              </a:effectRef>
-              <a:fontRef idx="minor">
-                <a:schemeClr val="lt1"/>
-              </a:fontRef>
-            </p:style>
-            <p:txBody>
-              <a:bodyPr rtlCol="0" anchor="ctr"/>
-              <a:lstStyle/>
-              <a:p>
-                <a:pPr algn="ctr"/>
-                <a:endParaRPr lang="es-ES"/>
-              </a:p>
-            </p:txBody>
-          </p:sp>
-          <p:cxnSp>
-            <p:nvCxnSpPr>
-              <p:cNvPr id="120" name="Conector recto 119">
-                <a:extLst>
-                  <a:ext uri="{FF2B5EF4-FFF2-40B4-BE49-F238E27FC236}">
-                    <a16:creationId xmlns:a16="http://schemas.microsoft.com/office/drawing/2014/main" id="{71DA69AA-C48F-4F6C-4A5F-6197BA5992D7}"/>
-                  </a:ext>
-                </a:extLst>
-              </p:cNvPr>
-              <p:cNvCxnSpPr>
-                <a:cxnSpLocks/>
-              </p:cNvCxnSpPr>
-              <p:nvPr/>
-            </p:nvCxnSpPr>
-            <p:spPr>
-              <a:xfrm>
-                <a:off x="6717506" y="1104900"/>
-                <a:ext cx="196889" cy="0"/>
-              </a:xfrm>
-              <a:prstGeom prst="line">
-                <a:avLst/>
-              </a:prstGeom>
-              <a:ln>
-                <a:solidFill>
-                  <a:schemeClr val="tx1"/>
-                </a:solidFill>
-              </a:ln>
-            </p:spPr>
-            <p:style>
-              <a:lnRef idx="2">
-                <a:schemeClr val="accent1"/>
-              </a:lnRef>
-              <a:fillRef idx="0">
-                <a:schemeClr val="accent1"/>
-              </a:fillRef>
-              <a:effectRef idx="1">
-                <a:schemeClr val="accent1"/>
-              </a:effectRef>
-              <a:fontRef idx="minor">
-                <a:schemeClr val="tx1"/>
-              </a:fontRef>
-            </p:style>
-          </p:cxnSp>
-        </p:grpSp>
-        <p:grpSp>
-          <p:nvGrpSpPr>
-            <p:cNvPr id="113" name="Grupo 112">
+            <a:prstGeom prst="flowChartConnector">
+              <a:avLst/>
+            </a:prstGeom>
+            <a:solidFill>
+              <a:schemeClr val="accent1"/>
+            </a:solidFill>
+          </p:spPr>
+          <p:style>
+            <a:lnRef idx="2">
+              <a:schemeClr val="accent1">
+                <a:shade val="15000"/>
+              </a:schemeClr>
+            </a:lnRef>
+            <a:fillRef idx="1">
+              <a:schemeClr val="accent1"/>
+            </a:fillRef>
+            <a:effectRef idx="0">
+              <a:schemeClr val="accent1"/>
+            </a:effectRef>
+            <a:fontRef idx="minor">
+              <a:schemeClr val="lt1"/>
+            </a:fontRef>
+          </p:style>
+          <p:txBody>
+            <a:bodyPr rtlCol="0" anchor="ctr"/>
+            <a:lstStyle/>
+            <a:p>
+              <a:pPr algn="ctr"/>
+              <a:endParaRPr lang="es-ES"/>
+            </a:p>
+          </p:txBody>
+        </p:sp>
+        <p:cxnSp>
+          <p:nvCxnSpPr>
+            <p:cNvPr id="118" name="Conector recto 117">
               <a:extLst>
                 <a:ext uri="{FF2B5EF4-FFF2-40B4-BE49-F238E27FC236}">
-                  <a16:creationId xmlns:a16="http://schemas.microsoft.com/office/drawing/2014/main" id="{F968A6FC-EA01-CA38-7CFA-E1CF0BA0A745}"/>
+                  <a16:creationId xmlns:a16="http://schemas.microsoft.com/office/drawing/2014/main" id="{56291682-DC06-A0DF-E09A-88C83FDB8CF4}"/>
                 </a:ext>
               </a:extLst>
             </p:cNvPr>
-            <p:cNvGrpSpPr/>
+            <p:cNvCxnSpPr>
+              <a:cxnSpLocks/>
+            </p:cNvCxnSpPr>
             <p:nvPr/>
-          </p:nvGrpSpPr>
-          <p:grpSpPr>
+          </p:nvCxnSpPr>
+          <p:spPr>
             <a:xfrm>
-              <a:off x="6609634" y="527050"/>
-              <a:ext cx="304761" cy="107872"/>
-              <a:chOff x="6609634" y="1050964"/>
-              <a:chExt cx="304761" cy="107872"/>
+              <a:off x="6717506" y="1104900"/>
+              <a:ext cx="196889" cy="0"/>
             </a:xfrm>
-          </p:grpSpPr>
-          <p:sp>
-            <p:nvSpPr>
-              <p:cNvPr id="117" name="Diagrama de flujo: conector 116">
-                <a:extLst>
-                  <a:ext uri="{FF2B5EF4-FFF2-40B4-BE49-F238E27FC236}">
-                    <a16:creationId xmlns:a16="http://schemas.microsoft.com/office/drawing/2014/main" id="{2612E417-4486-E254-9443-80DC899FD66F}"/>
-                  </a:ext>
-                </a:extLst>
-              </p:cNvPr>
-              <p:cNvSpPr/>
-              <p:nvPr/>
-            </p:nvSpPr>
-            <p:spPr>
-              <a:xfrm>
-                <a:off x="6609634" y="1050964"/>
-                <a:ext cx="107872" cy="107872"/>
-              </a:xfrm>
-              <a:prstGeom prst="flowChartConnector">
-                <a:avLst/>
-              </a:prstGeom>
+            <a:prstGeom prst="line">
+              <a:avLst/>
+            </a:prstGeom>
+            <a:ln>
               <a:solidFill>
-                <a:schemeClr val="accent1"/>
+                <a:schemeClr val="tx1"/>
               </a:solidFill>
-            </p:spPr>
-            <p:style>
-              <a:lnRef idx="2">
-                <a:schemeClr val="accent1">
-                  <a:shade val="15000"/>
-                </a:schemeClr>
-              </a:lnRef>
-              <a:fillRef idx="1">
-                <a:schemeClr val="accent1"/>
-              </a:fillRef>
-              <a:effectRef idx="0">
-                <a:schemeClr val="accent1"/>
-              </a:effectRef>
-              <a:fontRef idx="minor">
-                <a:schemeClr val="lt1"/>
-              </a:fontRef>
-            </p:style>
-            <p:txBody>
-              <a:bodyPr rtlCol="0" anchor="ctr"/>
-              <a:lstStyle/>
-              <a:p>
-                <a:pPr algn="ctr"/>
-                <a:endParaRPr lang="es-ES"/>
-              </a:p>
-            </p:txBody>
-          </p:sp>
-          <p:cxnSp>
-            <p:nvCxnSpPr>
-              <p:cNvPr id="118" name="Conector recto 117">
-                <a:extLst>
-                  <a:ext uri="{FF2B5EF4-FFF2-40B4-BE49-F238E27FC236}">
-                    <a16:creationId xmlns:a16="http://schemas.microsoft.com/office/drawing/2014/main" id="{56291682-DC06-A0DF-E09A-88C83FDB8CF4}"/>
-                  </a:ext>
-                </a:extLst>
-              </p:cNvPr>
-              <p:cNvCxnSpPr>
-                <a:cxnSpLocks/>
-              </p:cNvCxnSpPr>
-              <p:nvPr/>
-            </p:nvCxnSpPr>
-            <p:spPr>
-              <a:xfrm>
-                <a:off x="6717506" y="1104900"/>
-                <a:ext cx="196889" cy="0"/>
-              </a:xfrm>
-              <a:prstGeom prst="line">
-                <a:avLst/>
-              </a:prstGeom>
-              <a:ln>
-                <a:solidFill>
-                  <a:schemeClr val="tx1"/>
-                </a:solidFill>
-              </a:ln>
-            </p:spPr>
-            <p:style>
-              <a:lnRef idx="2">
-                <a:schemeClr val="accent1"/>
-              </a:lnRef>
-              <a:fillRef idx="0">
-                <a:schemeClr val="accent1"/>
-              </a:fillRef>
-              <a:effectRef idx="1">
-                <a:schemeClr val="accent1"/>
-              </a:effectRef>
-              <a:fontRef idx="minor">
-                <a:schemeClr val="tx1"/>
-              </a:fontRef>
-            </p:style>
-          </p:cxnSp>
-        </p:grpSp>
-        <p:grpSp>
-          <p:nvGrpSpPr>
-            <p:cNvPr id="114" name="Grupo 113">
-              <a:extLst>
-                <a:ext uri="{FF2B5EF4-FFF2-40B4-BE49-F238E27FC236}">
-                  <a16:creationId xmlns:a16="http://schemas.microsoft.com/office/drawing/2014/main" id="{37998B0E-B4AF-9691-7FA4-F6A743878F38}"/>
-                </a:ext>
-              </a:extLst>
-            </p:cNvPr>
-            <p:cNvGrpSpPr/>
-            <p:nvPr/>
-          </p:nvGrpSpPr>
-          <p:grpSpPr>
-            <a:xfrm>
-              <a:off x="6609634" y="787440"/>
-              <a:ext cx="304761" cy="107872"/>
-              <a:chOff x="6609634" y="1050964"/>
-              <a:chExt cx="304761" cy="107872"/>
-            </a:xfrm>
-          </p:grpSpPr>
-          <p:sp>
-            <p:nvSpPr>
-              <p:cNvPr id="115" name="Diagrama de flujo: conector 114">
-                <a:extLst>
-                  <a:ext uri="{FF2B5EF4-FFF2-40B4-BE49-F238E27FC236}">
-                    <a16:creationId xmlns:a16="http://schemas.microsoft.com/office/drawing/2014/main" id="{443AB851-B305-D228-6D56-C41836109C04}"/>
-                  </a:ext>
-                </a:extLst>
-              </p:cNvPr>
-              <p:cNvSpPr/>
-              <p:nvPr/>
-            </p:nvSpPr>
-            <p:spPr>
-              <a:xfrm>
-                <a:off x="6609634" y="1050964"/>
-                <a:ext cx="107872" cy="107872"/>
-              </a:xfrm>
-              <a:prstGeom prst="flowChartConnector">
-                <a:avLst/>
-              </a:prstGeom>
-              <a:solidFill>
-                <a:schemeClr val="accent1"/>
-              </a:solidFill>
-            </p:spPr>
-            <p:style>
-              <a:lnRef idx="2">
-                <a:schemeClr val="accent1">
-                  <a:shade val="15000"/>
-                </a:schemeClr>
-              </a:lnRef>
-              <a:fillRef idx="1">
-                <a:schemeClr val="accent1"/>
-              </a:fillRef>
-              <a:effectRef idx="0">
-                <a:schemeClr val="accent1"/>
-              </a:effectRef>
-              <a:fontRef idx="minor">
-                <a:schemeClr val="lt1"/>
-              </a:fontRef>
-            </p:style>
-            <p:txBody>
-              <a:bodyPr rtlCol="0" anchor="ctr"/>
-              <a:lstStyle/>
-              <a:p>
-                <a:pPr algn="ctr"/>
-                <a:endParaRPr lang="es-ES"/>
-              </a:p>
-            </p:txBody>
-          </p:sp>
-          <p:cxnSp>
-            <p:nvCxnSpPr>
-              <p:cNvPr id="116" name="Conector recto 115">
-                <a:extLst>
-                  <a:ext uri="{FF2B5EF4-FFF2-40B4-BE49-F238E27FC236}">
-                    <a16:creationId xmlns:a16="http://schemas.microsoft.com/office/drawing/2014/main" id="{0DD77898-6C99-7827-A24A-9CAB9A8A4684}"/>
-                  </a:ext>
-                </a:extLst>
-              </p:cNvPr>
-              <p:cNvCxnSpPr>
-                <a:cxnSpLocks/>
-              </p:cNvCxnSpPr>
-              <p:nvPr/>
-            </p:nvCxnSpPr>
-            <p:spPr>
-              <a:xfrm>
-                <a:off x="6717506" y="1104900"/>
-                <a:ext cx="196889" cy="0"/>
-              </a:xfrm>
-              <a:prstGeom prst="line">
-                <a:avLst/>
-              </a:prstGeom>
-              <a:ln>
-                <a:solidFill>
-                  <a:schemeClr val="tx1"/>
-                </a:solidFill>
-              </a:ln>
-            </p:spPr>
-            <p:style>
-              <a:lnRef idx="2">
-                <a:schemeClr val="accent1"/>
-              </a:lnRef>
-              <a:fillRef idx="0">
-                <a:schemeClr val="accent1"/>
-              </a:fillRef>
-              <a:effectRef idx="1">
-                <a:schemeClr val="accent1"/>
-              </a:effectRef>
-              <a:fontRef idx="minor">
-                <a:schemeClr val="tx1"/>
-              </a:fontRef>
-            </p:style>
-          </p:cxnSp>
-        </p:grpSp>
+            </a:ln>
+          </p:spPr>
+          <p:style>
+            <a:lnRef idx="2">
+              <a:schemeClr val="accent1"/>
+            </a:lnRef>
+            <a:fillRef idx="0">
+              <a:schemeClr val="accent1"/>
+            </a:fillRef>
+            <a:effectRef idx="1">
+              <a:schemeClr val="accent1"/>
+            </a:effectRef>
+            <a:fontRef idx="minor">
+              <a:schemeClr val="tx1"/>
+            </a:fontRef>
+          </p:style>
+        </p:cxnSp>
       </p:grpSp>
       <p:sp>
         <p:nvSpPr>
@@ -10655,10 +9244,123 @@
       </p:sp>
       <p:grpSp>
         <p:nvGrpSpPr>
-          <p:cNvPr id="110" name="Grupo 109">
-            <a:extLst>
-              <a:ext uri="{FF2B5EF4-FFF2-40B4-BE49-F238E27FC236}">
-                <a16:creationId xmlns:a16="http://schemas.microsoft.com/office/drawing/2014/main" id="{59B908F0-9979-C860-1DF7-35D600079C22}"/>
+          <p:cNvPr id="121" name="Grupo 120">
+            <a:extLst>
+              <a:ext uri="{FF2B5EF4-FFF2-40B4-BE49-F238E27FC236}">
+                <a16:creationId xmlns:a16="http://schemas.microsoft.com/office/drawing/2014/main" id="{208D9B54-B6D0-540A-A625-F21C64DBE298}"/>
+              </a:ext>
+            </a:extLst>
+          </p:cNvPr>
+          <p:cNvGrpSpPr/>
+          <p:nvPr/>
+        </p:nvGrpSpPr>
+        <p:grpSpPr>
+          <a:xfrm>
+            <a:off x="3665671" y="2639257"/>
+            <a:ext cx="304761" cy="107872"/>
+            <a:chOff x="6609634" y="1050964"/>
+            <a:chExt cx="304761" cy="107872"/>
+          </a:xfrm>
+        </p:grpSpPr>
+        <p:sp>
+          <p:nvSpPr>
+            <p:cNvPr id="128" name="Diagrama de flujo: conector 127">
+              <a:extLst>
+                <a:ext uri="{FF2B5EF4-FFF2-40B4-BE49-F238E27FC236}">
+                  <a16:creationId xmlns:a16="http://schemas.microsoft.com/office/drawing/2014/main" id="{DD72DE3A-C5FC-E6D4-9342-67E2D5E5FCC3}"/>
+                </a:ext>
+              </a:extLst>
+            </p:cNvPr>
+            <p:cNvSpPr/>
+            <p:nvPr/>
+          </p:nvSpPr>
+          <p:spPr>
+            <a:xfrm>
+              <a:off x="6609634" y="1050964"/>
+              <a:ext cx="107872" cy="107872"/>
+            </a:xfrm>
+            <a:prstGeom prst="flowChartConnector">
+              <a:avLst/>
+            </a:prstGeom>
+            <a:solidFill>
+              <a:schemeClr val="accent1"/>
+            </a:solidFill>
+          </p:spPr>
+          <p:style>
+            <a:lnRef idx="2">
+              <a:schemeClr val="accent1">
+                <a:shade val="15000"/>
+              </a:schemeClr>
+            </a:lnRef>
+            <a:fillRef idx="1">
+              <a:schemeClr val="accent1"/>
+            </a:fillRef>
+            <a:effectRef idx="0">
+              <a:schemeClr val="accent1"/>
+            </a:effectRef>
+            <a:fontRef idx="minor">
+              <a:schemeClr val="lt1"/>
+            </a:fontRef>
+          </p:style>
+          <p:txBody>
+            <a:bodyPr rtlCol="0" anchor="ctr"/>
+            <a:lstStyle/>
+            <a:p>
+              <a:pPr algn="ctr"/>
+              <a:endParaRPr lang="es-ES"/>
+            </a:p>
+          </p:txBody>
+        </p:sp>
+        <p:cxnSp>
+          <p:nvCxnSpPr>
+            <p:cNvPr id="129" name="Conector recto 128">
+              <a:extLst>
+                <a:ext uri="{FF2B5EF4-FFF2-40B4-BE49-F238E27FC236}">
+                  <a16:creationId xmlns:a16="http://schemas.microsoft.com/office/drawing/2014/main" id="{7E806124-8CEA-1CFA-ACAF-F6216F590963}"/>
+                </a:ext>
+              </a:extLst>
+            </p:cNvPr>
+            <p:cNvCxnSpPr>
+              <a:cxnSpLocks/>
+            </p:cNvCxnSpPr>
+            <p:nvPr/>
+          </p:nvCxnSpPr>
+          <p:spPr>
+            <a:xfrm>
+              <a:off x="6717506" y="1104900"/>
+              <a:ext cx="196889" cy="0"/>
+            </a:xfrm>
+            <a:prstGeom prst="line">
+              <a:avLst/>
+            </a:prstGeom>
+            <a:ln>
+              <a:solidFill>
+                <a:schemeClr val="tx1"/>
+              </a:solidFill>
+            </a:ln>
+          </p:spPr>
+          <p:style>
+            <a:lnRef idx="2">
+              <a:schemeClr val="accent1"/>
+            </a:lnRef>
+            <a:fillRef idx="0">
+              <a:schemeClr val="accent1"/>
+            </a:fillRef>
+            <a:effectRef idx="1">
+              <a:schemeClr val="accent1"/>
+            </a:effectRef>
+            <a:fontRef idx="minor">
+              <a:schemeClr val="tx1"/>
+            </a:fontRef>
+          </p:style>
+        </p:cxnSp>
+      </p:grpSp>
+      <p:grpSp>
+        <p:nvGrpSpPr>
+          <p:cNvPr id="122" name="Grupo 121">
+            <a:extLst>
+              <a:ext uri="{FF2B5EF4-FFF2-40B4-BE49-F238E27FC236}">
+                <a16:creationId xmlns:a16="http://schemas.microsoft.com/office/drawing/2014/main" id="{E46E3DAC-FFF7-725D-6F7D-8C7F984D1422}"/>
               </a:ext>
             </a:extLst>
           </p:cNvPr>
@@ -10668,350 +9370,663 @@
         <p:grpSpPr>
           <a:xfrm>
             <a:off x="3665671" y="2115343"/>
-            <a:ext cx="304761" cy="631786"/>
-            <a:chOff x="6609634" y="527050"/>
-            <a:chExt cx="304761" cy="631786"/>
+            <a:ext cx="304761" cy="107872"/>
+            <a:chOff x="6609634" y="1050964"/>
+            <a:chExt cx="304761" cy="107872"/>
           </a:xfrm>
         </p:grpSpPr>
-        <p:grpSp>
-          <p:nvGrpSpPr>
-            <p:cNvPr id="121" name="Grupo 120">
+        <p:sp>
+          <p:nvSpPr>
+            <p:cNvPr id="126" name="Diagrama de flujo: conector 125">
               <a:extLst>
                 <a:ext uri="{FF2B5EF4-FFF2-40B4-BE49-F238E27FC236}">
-                  <a16:creationId xmlns:a16="http://schemas.microsoft.com/office/drawing/2014/main" id="{208D9B54-B6D0-540A-A625-F21C64DBE298}"/>
+                  <a16:creationId xmlns:a16="http://schemas.microsoft.com/office/drawing/2014/main" id="{E75B8462-655F-B0DB-5852-3F0999D34F6B}"/>
                 </a:ext>
               </a:extLst>
             </p:cNvPr>
-            <p:cNvGrpSpPr/>
+            <p:cNvSpPr/>
             <p:nvPr/>
-          </p:nvGrpSpPr>
-          <p:grpSpPr>
+          </p:nvSpPr>
+          <p:spPr>
             <a:xfrm>
               <a:off x="6609634" y="1050964"/>
-              <a:ext cx="304761" cy="107872"/>
-              <a:chOff x="6609634" y="1050964"/>
-              <a:chExt cx="304761" cy="107872"/>
+              <a:ext cx="107872" cy="107872"/>
             </a:xfrm>
-          </p:grpSpPr>
-          <p:sp>
-            <p:nvSpPr>
-              <p:cNvPr id="128" name="Diagrama de flujo: conector 127">
-                <a:extLst>
-                  <a:ext uri="{FF2B5EF4-FFF2-40B4-BE49-F238E27FC236}">
-                    <a16:creationId xmlns:a16="http://schemas.microsoft.com/office/drawing/2014/main" id="{DD72DE3A-C5FC-E6D4-9342-67E2D5E5FCC3}"/>
-                  </a:ext>
-                </a:extLst>
-              </p:cNvPr>
-              <p:cNvSpPr/>
-              <p:nvPr/>
-            </p:nvSpPr>
-            <p:spPr>
-              <a:xfrm>
-                <a:off x="6609634" y="1050964"/>
-                <a:ext cx="107872" cy="107872"/>
-              </a:xfrm>
-              <a:prstGeom prst="flowChartConnector">
-                <a:avLst/>
-              </a:prstGeom>
-              <a:solidFill>
-                <a:schemeClr val="accent1"/>
-              </a:solidFill>
-            </p:spPr>
-            <p:style>
-              <a:lnRef idx="2">
-                <a:schemeClr val="accent1">
-                  <a:shade val="15000"/>
-                </a:schemeClr>
-              </a:lnRef>
-              <a:fillRef idx="1">
-                <a:schemeClr val="accent1"/>
-              </a:fillRef>
-              <a:effectRef idx="0">
-                <a:schemeClr val="accent1"/>
-              </a:effectRef>
-              <a:fontRef idx="minor">
-                <a:schemeClr val="lt1"/>
-              </a:fontRef>
-            </p:style>
-            <p:txBody>
-              <a:bodyPr rtlCol="0" anchor="ctr"/>
-              <a:lstStyle/>
-              <a:p>
-                <a:pPr algn="ctr"/>
-                <a:endParaRPr lang="es-ES"/>
-              </a:p>
-            </p:txBody>
-          </p:sp>
-          <p:cxnSp>
-            <p:nvCxnSpPr>
-              <p:cNvPr id="129" name="Conector recto 128">
-                <a:extLst>
-                  <a:ext uri="{FF2B5EF4-FFF2-40B4-BE49-F238E27FC236}">
-                    <a16:creationId xmlns:a16="http://schemas.microsoft.com/office/drawing/2014/main" id="{7E806124-8CEA-1CFA-ACAF-F6216F590963}"/>
-                  </a:ext>
-                </a:extLst>
-              </p:cNvPr>
-              <p:cNvCxnSpPr>
-                <a:cxnSpLocks/>
-              </p:cNvCxnSpPr>
-              <p:nvPr/>
-            </p:nvCxnSpPr>
-            <p:spPr>
-              <a:xfrm>
-                <a:off x="6717506" y="1104900"/>
-                <a:ext cx="196889" cy="0"/>
-              </a:xfrm>
-              <a:prstGeom prst="line">
-                <a:avLst/>
-              </a:prstGeom>
-              <a:ln>
-                <a:solidFill>
-                  <a:schemeClr val="tx1"/>
-                </a:solidFill>
-              </a:ln>
-            </p:spPr>
-            <p:style>
-              <a:lnRef idx="2">
-                <a:schemeClr val="accent1"/>
-              </a:lnRef>
-              <a:fillRef idx="0">
-                <a:schemeClr val="accent1"/>
-              </a:fillRef>
-              <a:effectRef idx="1">
-                <a:schemeClr val="accent1"/>
-              </a:effectRef>
-              <a:fontRef idx="minor">
-                <a:schemeClr val="tx1"/>
-              </a:fontRef>
-            </p:style>
-          </p:cxnSp>
-        </p:grpSp>
-        <p:grpSp>
-          <p:nvGrpSpPr>
-            <p:cNvPr id="122" name="Grupo 121">
+            <a:prstGeom prst="flowChartConnector">
+              <a:avLst/>
+            </a:prstGeom>
+            <a:solidFill>
+              <a:schemeClr val="accent1"/>
+            </a:solidFill>
+          </p:spPr>
+          <p:style>
+            <a:lnRef idx="2">
+              <a:schemeClr val="accent1">
+                <a:shade val="15000"/>
+              </a:schemeClr>
+            </a:lnRef>
+            <a:fillRef idx="1">
+              <a:schemeClr val="accent1"/>
+            </a:fillRef>
+            <a:effectRef idx="0">
+              <a:schemeClr val="accent1"/>
+            </a:effectRef>
+            <a:fontRef idx="minor">
+              <a:schemeClr val="lt1"/>
+            </a:fontRef>
+          </p:style>
+          <p:txBody>
+            <a:bodyPr rtlCol="0" anchor="ctr"/>
+            <a:lstStyle/>
+            <a:p>
+              <a:pPr algn="ctr"/>
+              <a:endParaRPr lang="es-ES"/>
+            </a:p>
+          </p:txBody>
+        </p:sp>
+        <p:cxnSp>
+          <p:nvCxnSpPr>
+            <p:cNvPr id="127" name="Conector recto 126">
               <a:extLst>
                 <a:ext uri="{FF2B5EF4-FFF2-40B4-BE49-F238E27FC236}">
-                  <a16:creationId xmlns:a16="http://schemas.microsoft.com/office/drawing/2014/main" id="{E46E3DAC-FFF7-725D-6F7D-8C7F984D1422}"/>
+                  <a16:creationId xmlns:a16="http://schemas.microsoft.com/office/drawing/2014/main" id="{92D64EDA-4292-8E1B-A10B-328207F5E620}"/>
                 </a:ext>
               </a:extLst>
             </p:cNvPr>
-            <p:cNvGrpSpPr/>
+            <p:cNvCxnSpPr>
+              <a:cxnSpLocks/>
+            </p:cNvCxnSpPr>
             <p:nvPr/>
-          </p:nvGrpSpPr>
-          <p:grpSpPr>
+          </p:nvCxnSpPr>
+          <p:spPr>
             <a:xfrm>
-              <a:off x="6609634" y="527050"/>
-              <a:ext cx="304761" cy="107872"/>
-              <a:chOff x="6609634" y="1050964"/>
-              <a:chExt cx="304761" cy="107872"/>
+              <a:off x="6717506" y="1104900"/>
+              <a:ext cx="196889" cy="0"/>
             </a:xfrm>
-          </p:grpSpPr>
-          <p:sp>
-            <p:nvSpPr>
-              <p:cNvPr id="126" name="Diagrama de flujo: conector 125">
-                <a:extLst>
-                  <a:ext uri="{FF2B5EF4-FFF2-40B4-BE49-F238E27FC236}">
-                    <a16:creationId xmlns:a16="http://schemas.microsoft.com/office/drawing/2014/main" id="{E75B8462-655F-B0DB-5852-3F0999D34F6B}"/>
-                  </a:ext>
-                </a:extLst>
-              </p:cNvPr>
-              <p:cNvSpPr/>
-              <p:nvPr/>
-            </p:nvSpPr>
-            <p:spPr>
-              <a:xfrm>
-                <a:off x="6609634" y="1050964"/>
-                <a:ext cx="107872" cy="107872"/>
-              </a:xfrm>
-              <a:prstGeom prst="flowChartConnector">
-                <a:avLst/>
-              </a:prstGeom>
+            <a:prstGeom prst="line">
+              <a:avLst/>
+            </a:prstGeom>
+            <a:ln>
               <a:solidFill>
-                <a:schemeClr val="accent1"/>
+                <a:schemeClr val="tx1"/>
               </a:solidFill>
-            </p:spPr>
-            <p:style>
-              <a:lnRef idx="2">
-                <a:schemeClr val="accent1">
-                  <a:shade val="15000"/>
-                </a:schemeClr>
-              </a:lnRef>
-              <a:fillRef idx="1">
-                <a:schemeClr val="accent1"/>
-              </a:fillRef>
-              <a:effectRef idx="0">
-                <a:schemeClr val="accent1"/>
-              </a:effectRef>
-              <a:fontRef idx="minor">
-                <a:schemeClr val="lt1"/>
-              </a:fontRef>
-            </p:style>
-            <p:txBody>
-              <a:bodyPr rtlCol="0" anchor="ctr"/>
-              <a:lstStyle/>
-              <a:p>
-                <a:pPr algn="ctr"/>
-                <a:endParaRPr lang="es-ES"/>
-              </a:p>
-            </p:txBody>
-          </p:sp>
-          <p:cxnSp>
-            <p:nvCxnSpPr>
-              <p:cNvPr id="127" name="Conector recto 126">
-                <a:extLst>
-                  <a:ext uri="{FF2B5EF4-FFF2-40B4-BE49-F238E27FC236}">
-                    <a16:creationId xmlns:a16="http://schemas.microsoft.com/office/drawing/2014/main" id="{92D64EDA-4292-8E1B-A10B-328207F5E620}"/>
-                  </a:ext>
-                </a:extLst>
-              </p:cNvPr>
-              <p:cNvCxnSpPr>
-                <a:cxnSpLocks/>
-              </p:cNvCxnSpPr>
-              <p:nvPr/>
-            </p:nvCxnSpPr>
-            <p:spPr>
-              <a:xfrm>
-                <a:off x="6717506" y="1104900"/>
-                <a:ext cx="196889" cy="0"/>
-              </a:xfrm>
-              <a:prstGeom prst="line">
-                <a:avLst/>
-              </a:prstGeom>
-              <a:ln>
-                <a:solidFill>
-                  <a:schemeClr val="tx1"/>
-                </a:solidFill>
-              </a:ln>
-            </p:spPr>
-            <p:style>
-              <a:lnRef idx="2">
-                <a:schemeClr val="accent1"/>
-              </a:lnRef>
-              <a:fillRef idx="0">
-                <a:schemeClr val="accent1"/>
-              </a:fillRef>
-              <a:effectRef idx="1">
-                <a:schemeClr val="accent1"/>
-              </a:effectRef>
-              <a:fontRef idx="minor">
-                <a:schemeClr val="tx1"/>
-              </a:fontRef>
-            </p:style>
-          </p:cxnSp>
-        </p:grpSp>
-        <p:grpSp>
-          <p:nvGrpSpPr>
-            <p:cNvPr id="123" name="Grupo 122">
+            </a:ln>
+          </p:spPr>
+          <p:style>
+            <a:lnRef idx="2">
+              <a:schemeClr val="accent1"/>
+            </a:lnRef>
+            <a:fillRef idx="0">
+              <a:schemeClr val="accent1"/>
+            </a:fillRef>
+            <a:effectRef idx="1">
+              <a:schemeClr val="accent1"/>
+            </a:effectRef>
+            <a:fontRef idx="minor">
+              <a:schemeClr val="tx1"/>
+            </a:fontRef>
+          </p:style>
+        </p:cxnSp>
+      </p:grpSp>
+      <p:sp>
+        <p:nvSpPr>
+          <p:cNvPr id="3" name="Rectángulo 2">
+            <a:extLst>
+              <a:ext uri="{FF2B5EF4-FFF2-40B4-BE49-F238E27FC236}">
+                <a16:creationId xmlns:a16="http://schemas.microsoft.com/office/drawing/2014/main" id="{3293ACB9-58A2-AF1C-DA5F-E8EB89EC07C2}"/>
+              </a:ext>
+            </a:extLst>
+          </p:cNvPr>
+          <p:cNvSpPr>
+            <a:spLocks/>
+          </p:cNvSpPr>
+          <p:nvPr/>
+        </p:nvSpPr>
+        <p:spPr>
+          <a:xfrm>
+            <a:off x="5693410" y="2770246"/>
+            <a:ext cx="1220985" cy="2484000"/>
+          </a:xfrm>
+          <a:prstGeom prst="rect">
+            <a:avLst/>
+          </a:prstGeom>
+          <a:solidFill>
+            <a:schemeClr val="tx2">
+              <a:lumMod val="25000"/>
+              <a:lumOff val="75000"/>
+            </a:schemeClr>
+          </a:solidFill>
+        </p:spPr>
+        <p:style>
+          <a:lnRef idx="2">
+            <a:schemeClr val="accent1">
+              <a:shade val="15000"/>
+            </a:schemeClr>
+          </a:lnRef>
+          <a:fillRef idx="1">
+            <a:schemeClr val="accent1"/>
+          </a:fillRef>
+          <a:effectRef idx="0">
+            <a:schemeClr val="accent1"/>
+          </a:effectRef>
+          <a:fontRef idx="minor">
+            <a:schemeClr val="lt1"/>
+          </a:fontRef>
+        </p:style>
+        <p:txBody>
+          <a:bodyPr rtlCol="0" anchor="ctr"/>
+          <a:lstStyle/>
+          <a:p>
+            <a:pPr algn="ctr"/>
+            <a:endParaRPr lang="es-ES"/>
+          </a:p>
+        </p:txBody>
+      </p:sp>
+      <p:sp>
+        <p:nvSpPr>
+          <p:cNvPr id="4" name="Rectángulo 3">
+            <a:extLst>
+              <a:ext uri="{FF2B5EF4-FFF2-40B4-BE49-F238E27FC236}">
+                <a16:creationId xmlns:a16="http://schemas.microsoft.com/office/drawing/2014/main" id="{E423EAE7-F127-1E72-4BE8-234E4D62DECB}"/>
+              </a:ext>
+            </a:extLst>
+          </p:cNvPr>
+          <p:cNvSpPr>
+            <a:spLocks/>
+          </p:cNvSpPr>
+          <p:nvPr/>
+        </p:nvSpPr>
+        <p:spPr>
+          <a:xfrm>
+            <a:off x="6914395" y="2770246"/>
+            <a:ext cx="1263015" cy="1327150"/>
+          </a:xfrm>
+          <a:prstGeom prst="rect">
+            <a:avLst/>
+          </a:prstGeom>
+          <a:solidFill>
+            <a:schemeClr val="accent1">
+              <a:lumMod val="60000"/>
+              <a:lumOff val="40000"/>
+            </a:schemeClr>
+          </a:solidFill>
+        </p:spPr>
+        <p:style>
+          <a:lnRef idx="2">
+            <a:schemeClr val="accent1">
+              <a:shade val="15000"/>
+            </a:schemeClr>
+          </a:lnRef>
+          <a:fillRef idx="1">
+            <a:schemeClr val="accent1"/>
+          </a:fillRef>
+          <a:effectRef idx="0">
+            <a:schemeClr val="accent1"/>
+          </a:effectRef>
+          <a:fontRef idx="minor">
+            <a:schemeClr val="lt1"/>
+          </a:fontRef>
+        </p:style>
+        <p:txBody>
+          <a:bodyPr rtlCol="0" anchor="ctr"/>
+          <a:lstStyle/>
+          <a:p>
+            <a:pPr algn="ctr"/>
+            <a:endParaRPr lang="es-ES" dirty="0"/>
+          </a:p>
+        </p:txBody>
+      </p:sp>
+      <p:grpSp>
+        <p:nvGrpSpPr>
+          <p:cNvPr id="49" name="Grupo 48">
+            <a:extLst>
+              <a:ext uri="{FF2B5EF4-FFF2-40B4-BE49-F238E27FC236}">
+                <a16:creationId xmlns:a16="http://schemas.microsoft.com/office/drawing/2014/main" id="{C0CB1D89-4583-AAA5-D7C0-7CFACF535F5E}"/>
+              </a:ext>
+            </a:extLst>
+          </p:cNvPr>
+          <p:cNvGrpSpPr/>
+          <p:nvPr/>
+        </p:nvGrpSpPr>
+        <p:grpSpPr>
+          <a:xfrm>
+            <a:off x="6609634" y="3517997"/>
+            <a:ext cx="304761" cy="107872"/>
+            <a:chOff x="6609634" y="1050964"/>
+            <a:chExt cx="304761" cy="107872"/>
+          </a:xfrm>
+        </p:grpSpPr>
+        <p:sp>
+          <p:nvSpPr>
+            <p:cNvPr id="60" name="Diagrama de flujo: conector 59">
               <a:extLst>
                 <a:ext uri="{FF2B5EF4-FFF2-40B4-BE49-F238E27FC236}">
-                  <a16:creationId xmlns:a16="http://schemas.microsoft.com/office/drawing/2014/main" id="{BC4322FA-440F-6587-3D7E-F40F37B0CB76}"/>
+                  <a16:creationId xmlns:a16="http://schemas.microsoft.com/office/drawing/2014/main" id="{E7C10538-EF06-BFBE-8D21-590C0B10B3FA}"/>
                 </a:ext>
               </a:extLst>
             </p:cNvPr>
-            <p:cNvGrpSpPr/>
+            <p:cNvSpPr/>
             <p:nvPr/>
-          </p:nvGrpSpPr>
-          <p:grpSpPr>
+          </p:nvSpPr>
+          <p:spPr>
             <a:xfrm>
-              <a:off x="6609634" y="787440"/>
-              <a:ext cx="304761" cy="107872"/>
-              <a:chOff x="6609634" y="1050964"/>
-              <a:chExt cx="304761" cy="107872"/>
+              <a:off x="6609634" y="1050964"/>
+              <a:ext cx="107872" cy="107872"/>
             </a:xfrm>
-          </p:grpSpPr>
-          <p:sp>
-            <p:nvSpPr>
-              <p:cNvPr id="124" name="Diagrama de flujo: conector 123">
-                <a:extLst>
-                  <a:ext uri="{FF2B5EF4-FFF2-40B4-BE49-F238E27FC236}">
-                    <a16:creationId xmlns:a16="http://schemas.microsoft.com/office/drawing/2014/main" id="{FCB55060-1413-4346-5D24-45A0794847BA}"/>
-                  </a:ext>
-                </a:extLst>
-              </p:cNvPr>
-              <p:cNvSpPr/>
-              <p:nvPr/>
-            </p:nvSpPr>
-            <p:spPr>
-              <a:xfrm>
-                <a:off x="6609634" y="1050964"/>
-                <a:ext cx="107872" cy="107872"/>
-              </a:xfrm>
-              <a:prstGeom prst="flowChartConnector">
-                <a:avLst/>
-              </a:prstGeom>
+            <a:prstGeom prst="flowChartConnector">
+              <a:avLst/>
+            </a:prstGeom>
+            <a:solidFill>
+              <a:schemeClr val="accent1"/>
+            </a:solidFill>
+          </p:spPr>
+          <p:style>
+            <a:lnRef idx="2">
+              <a:schemeClr val="accent1">
+                <a:shade val="15000"/>
+              </a:schemeClr>
+            </a:lnRef>
+            <a:fillRef idx="1">
+              <a:schemeClr val="accent1"/>
+            </a:fillRef>
+            <a:effectRef idx="0">
+              <a:schemeClr val="accent1"/>
+            </a:effectRef>
+            <a:fontRef idx="minor">
+              <a:schemeClr val="lt1"/>
+            </a:fontRef>
+          </p:style>
+          <p:txBody>
+            <a:bodyPr rtlCol="0" anchor="ctr"/>
+            <a:lstStyle/>
+            <a:p>
+              <a:pPr algn="ctr"/>
+              <a:endParaRPr lang="es-ES"/>
+            </a:p>
+          </p:txBody>
+        </p:sp>
+        <p:cxnSp>
+          <p:nvCxnSpPr>
+            <p:cNvPr id="61" name="Conector recto 60">
+              <a:extLst>
+                <a:ext uri="{FF2B5EF4-FFF2-40B4-BE49-F238E27FC236}">
+                  <a16:creationId xmlns:a16="http://schemas.microsoft.com/office/drawing/2014/main" id="{2E61ADC7-C319-8C70-F65B-C2FA9D10F465}"/>
+                </a:ext>
+              </a:extLst>
+            </p:cNvPr>
+            <p:cNvCxnSpPr>
+              <a:cxnSpLocks/>
+            </p:cNvCxnSpPr>
+            <p:nvPr/>
+          </p:nvCxnSpPr>
+          <p:spPr>
+            <a:xfrm>
+              <a:off x="6717506" y="1104900"/>
+              <a:ext cx="196889" cy="0"/>
+            </a:xfrm>
+            <a:prstGeom prst="line">
+              <a:avLst/>
+            </a:prstGeom>
+            <a:ln>
               <a:solidFill>
-                <a:schemeClr val="accent1"/>
+                <a:schemeClr val="tx1"/>
               </a:solidFill>
-            </p:spPr>
-            <p:style>
-              <a:lnRef idx="2">
-                <a:schemeClr val="accent1">
-                  <a:shade val="15000"/>
-                </a:schemeClr>
-              </a:lnRef>
-              <a:fillRef idx="1">
-                <a:schemeClr val="accent1"/>
-              </a:fillRef>
-              <a:effectRef idx="0">
-                <a:schemeClr val="accent1"/>
-              </a:effectRef>
-              <a:fontRef idx="minor">
-                <a:schemeClr val="lt1"/>
-              </a:fontRef>
-            </p:style>
-            <p:txBody>
-              <a:bodyPr rtlCol="0" anchor="ctr"/>
-              <a:lstStyle/>
-              <a:p>
-                <a:pPr algn="ctr"/>
-                <a:endParaRPr lang="es-ES"/>
-              </a:p>
-            </p:txBody>
-          </p:sp>
-          <p:cxnSp>
-            <p:nvCxnSpPr>
-              <p:cNvPr id="125" name="Conector recto 124">
-                <a:extLst>
-                  <a:ext uri="{FF2B5EF4-FFF2-40B4-BE49-F238E27FC236}">
-                    <a16:creationId xmlns:a16="http://schemas.microsoft.com/office/drawing/2014/main" id="{D7F49DA8-250D-6118-9E11-206C72A24874}"/>
-                  </a:ext>
-                </a:extLst>
-              </p:cNvPr>
-              <p:cNvCxnSpPr>
-                <a:cxnSpLocks/>
-              </p:cNvCxnSpPr>
-              <p:nvPr/>
-            </p:nvCxnSpPr>
-            <p:spPr>
-              <a:xfrm>
-                <a:off x="6717506" y="1104900"/>
-                <a:ext cx="196889" cy="0"/>
-              </a:xfrm>
-              <a:prstGeom prst="line">
-                <a:avLst/>
-              </a:prstGeom>
-              <a:ln>
-                <a:solidFill>
-                  <a:schemeClr val="tx1"/>
-                </a:solidFill>
-              </a:ln>
-            </p:spPr>
-            <p:style>
-              <a:lnRef idx="2">
-                <a:schemeClr val="accent1"/>
-              </a:lnRef>
-              <a:fillRef idx="0">
-                <a:schemeClr val="accent1"/>
-              </a:fillRef>
-              <a:effectRef idx="1">
-                <a:schemeClr val="accent1"/>
-              </a:effectRef>
-              <a:fontRef idx="minor">
+            </a:ln>
+          </p:spPr>
+          <p:style>
+            <a:lnRef idx="2">
+              <a:schemeClr val="accent1"/>
+            </a:lnRef>
+            <a:fillRef idx="0">
+              <a:schemeClr val="accent1"/>
+            </a:fillRef>
+            <a:effectRef idx="1">
+              <a:schemeClr val="accent1"/>
+            </a:effectRef>
+            <a:fontRef idx="minor">
+              <a:schemeClr val="tx1"/>
+            </a:fontRef>
+          </p:style>
+        </p:cxnSp>
+      </p:grpSp>
+      <p:grpSp>
+        <p:nvGrpSpPr>
+          <p:cNvPr id="54" name="Grupo 53">
+            <a:extLst>
+              <a:ext uri="{FF2B5EF4-FFF2-40B4-BE49-F238E27FC236}">
+                <a16:creationId xmlns:a16="http://schemas.microsoft.com/office/drawing/2014/main" id="{79822658-32FC-66D4-315F-BB77CA699BA5}"/>
+              </a:ext>
+            </a:extLst>
+          </p:cNvPr>
+          <p:cNvGrpSpPr/>
+          <p:nvPr/>
+        </p:nvGrpSpPr>
+        <p:grpSpPr>
+          <a:xfrm>
+            <a:off x="6609634" y="2994083"/>
+            <a:ext cx="304761" cy="107872"/>
+            <a:chOff x="6609634" y="1050964"/>
+            <a:chExt cx="304761" cy="107872"/>
+          </a:xfrm>
+        </p:grpSpPr>
+        <p:sp>
+          <p:nvSpPr>
+            <p:cNvPr id="58" name="Diagrama de flujo: conector 57">
+              <a:extLst>
+                <a:ext uri="{FF2B5EF4-FFF2-40B4-BE49-F238E27FC236}">
+                  <a16:creationId xmlns:a16="http://schemas.microsoft.com/office/drawing/2014/main" id="{B6B3938E-7944-93FE-46AE-3A96E917905C}"/>
+                </a:ext>
+              </a:extLst>
+            </p:cNvPr>
+            <p:cNvSpPr/>
+            <p:nvPr/>
+          </p:nvSpPr>
+          <p:spPr>
+            <a:xfrm>
+              <a:off x="6609634" y="1050964"/>
+              <a:ext cx="107872" cy="107872"/>
+            </a:xfrm>
+            <a:prstGeom prst="flowChartConnector">
+              <a:avLst/>
+            </a:prstGeom>
+            <a:solidFill>
+              <a:schemeClr val="accent1"/>
+            </a:solidFill>
+          </p:spPr>
+          <p:style>
+            <a:lnRef idx="2">
+              <a:schemeClr val="accent1">
+                <a:shade val="15000"/>
+              </a:schemeClr>
+            </a:lnRef>
+            <a:fillRef idx="1">
+              <a:schemeClr val="accent1"/>
+            </a:fillRef>
+            <a:effectRef idx="0">
+              <a:schemeClr val="accent1"/>
+            </a:effectRef>
+            <a:fontRef idx="minor">
+              <a:schemeClr val="lt1"/>
+            </a:fontRef>
+          </p:style>
+          <p:txBody>
+            <a:bodyPr rtlCol="0" anchor="ctr"/>
+            <a:lstStyle/>
+            <a:p>
+              <a:pPr algn="ctr"/>
+              <a:endParaRPr lang="es-ES"/>
+            </a:p>
+          </p:txBody>
+        </p:sp>
+        <p:cxnSp>
+          <p:nvCxnSpPr>
+            <p:cNvPr id="59" name="Conector recto 58">
+              <a:extLst>
+                <a:ext uri="{FF2B5EF4-FFF2-40B4-BE49-F238E27FC236}">
+                  <a16:creationId xmlns:a16="http://schemas.microsoft.com/office/drawing/2014/main" id="{A8105048-786F-3FE3-525B-663770642DB6}"/>
+                </a:ext>
+              </a:extLst>
+            </p:cNvPr>
+            <p:cNvCxnSpPr>
+              <a:cxnSpLocks/>
+            </p:cNvCxnSpPr>
+            <p:nvPr/>
+          </p:nvCxnSpPr>
+          <p:spPr>
+            <a:xfrm>
+              <a:off x="6717506" y="1104900"/>
+              <a:ext cx="196889" cy="0"/>
+            </a:xfrm>
+            <a:prstGeom prst="line">
+              <a:avLst/>
+            </a:prstGeom>
+            <a:ln>
+              <a:solidFill>
                 <a:schemeClr val="tx1"/>
-              </a:fontRef>
-            </p:style>
-          </p:cxnSp>
-        </p:grpSp>
+              </a:solidFill>
+            </a:ln>
+          </p:spPr>
+          <p:style>
+            <a:lnRef idx="2">
+              <a:schemeClr val="accent1"/>
+            </a:lnRef>
+            <a:fillRef idx="0">
+              <a:schemeClr val="accent1"/>
+            </a:fillRef>
+            <a:effectRef idx="1">
+              <a:schemeClr val="accent1"/>
+            </a:effectRef>
+            <a:fontRef idx="minor">
+              <a:schemeClr val="tx1"/>
+            </a:fontRef>
+          </p:style>
+        </p:cxnSp>
+      </p:grpSp>
+      <p:grpSp>
+        <p:nvGrpSpPr>
+          <p:cNvPr id="16" name="Grupo 15">
+            <a:extLst>
+              <a:ext uri="{FF2B5EF4-FFF2-40B4-BE49-F238E27FC236}">
+                <a16:creationId xmlns:a16="http://schemas.microsoft.com/office/drawing/2014/main" id="{E41EE993-82FF-2EB9-BBAF-36508B8465A7}"/>
+              </a:ext>
+            </a:extLst>
+          </p:cNvPr>
+          <p:cNvGrpSpPr/>
+          <p:nvPr/>
+        </p:nvGrpSpPr>
+        <p:grpSpPr>
+          <a:xfrm flipH="1">
+            <a:off x="6914395" y="3517997"/>
+            <a:ext cx="304761" cy="107872"/>
+            <a:chOff x="6609634" y="1050964"/>
+            <a:chExt cx="304761" cy="107872"/>
+          </a:xfrm>
+        </p:grpSpPr>
+        <p:sp>
+          <p:nvSpPr>
+            <p:cNvPr id="43" name="Diagrama de flujo: conector 42">
+              <a:extLst>
+                <a:ext uri="{FF2B5EF4-FFF2-40B4-BE49-F238E27FC236}">
+                  <a16:creationId xmlns:a16="http://schemas.microsoft.com/office/drawing/2014/main" id="{CAFE6F5C-B690-3B33-3E58-2CD058E1861C}"/>
+                </a:ext>
+              </a:extLst>
+            </p:cNvPr>
+            <p:cNvSpPr/>
+            <p:nvPr/>
+          </p:nvSpPr>
+          <p:spPr>
+            <a:xfrm>
+              <a:off x="6609634" y="1050964"/>
+              <a:ext cx="107872" cy="107872"/>
+            </a:xfrm>
+            <a:prstGeom prst="flowChartConnector">
+              <a:avLst/>
+            </a:prstGeom>
+            <a:solidFill>
+              <a:schemeClr val="accent1"/>
+            </a:solidFill>
+          </p:spPr>
+          <p:style>
+            <a:lnRef idx="2">
+              <a:schemeClr val="accent1">
+                <a:shade val="15000"/>
+              </a:schemeClr>
+            </a:lnRef>
+            <a:fillRef idx="1">
+              <a:schemeClr val="accent1"/>
+            </a:fillRef>
+            <a:effectRef idx="0">
+              <a:schemeClr val="accent1"/>
+            </a:effectRef>
+            <a:fontRef idx="minor">
+              <a:schemeClr val="lt1"/>
+            </a:fontRef>
+          </p:style>
+          <p:txBody>
+            <a:bodyPr rtlCol="0" anchor="ctr"/>
+            <a:lstStyle/>
+            <a:p>
+              <a:pPr algn="ctr"/>
+              <a:endParaRPr lang="es-ES"/>
+            </a:p>
+          </p:txBody>
+        </p:sp>
+        <p:cxnSp>
+          <p:nvCxnSpPr>
+            <p:cNvPr id="44" name="Conector recto 43">
+              <a:extLst>
+                <a:ext uri="{FF2B5EF4-FFF2-40B4-BE49-F238E27FC236}">
+                  <a16:creationId xmlns:a16="http://schemas.microsoft.com/office/drawing/2014/main" id="{7296CFA4-0C21-0A3E-C306-B6FAB49522A6}"/>
+                </a:ext>
+              </a:extLst>
+            </p:cNvPr>
+            <p:cNvCxnSpPr>
+              <a:cxnSpLocks/>
+            </p:cNvCxnSpPr>
+            <p:nvPr/>
+          </p:nvCxnSpPr>
+          <p:spPr>
+            <a:xfrm>
+              <a:off x="6717506" y="1104900"/>
+              <a:ext cx="196889" cy="0"/>
+            </a:xfrm>
+            <a:prstGeom prst="line">
+              <a:avLst/>
+            </a:prstGeom>
+            <a:ln>
+              <a:solidFill>
+                <a:schemeClr val="tx1"/>
+              </a:solidFill>
+            </a:ln>
+          </p:spPr>
+          <p:style>
+            <a:lnRef idx="2">
+              <a:schemeClr val="accent1"/>
+            </a:lnRef>
+            <a:fillRef idx="0">
+              <a:schemeClr val="accent1"/>
+            </a:fillRef>
+            <a:effectRef idx="1">
+              <a:schemeClr val="accent1"/>
+            </a:effectRef>
+            <a:fontRef idx="minor">
+              <a:schemeClr val="tx1"/>
+            </a:fontRef>
+          </p:style>
+        </p:cxnSp>
+      </p:grpSp>
+      <p:grpSp>
+        <p:nvGrpSpPr>
+          <p:cNvPr id="17" name="Grupo 16">
+            <a:extLst>
+              <a:ext uri="{FF2B5EF4-FFF2-40B4-BE49-F238E27FC236}">
+                <a16:creationId xmlns:a16="http://schemas.microsoft.com/office/drawing/2014/main" id="{45C6216E-CCCB-2542-ADED-3093F5CDC65E}"/>
+              </a:ext>
+            </a:extLst>
+          </p:cNvPr>
+          <p:cNvGrpSpPr/>
+          <p:nvPr/>
+        </p:nvGrpSpPr>
+        <p:grpSpPr>
+          <a:xfrm flipH="1">
+            <a:off x="6914395" y="2994083"/>
+            <a:ext cx="304761" cy="107872"/>
+            <a:chOff x="6609634" y="1050964"/>
+            <a:chExt cx="304761" cy="107872"/>
+          </a:xfrm>
+        </p:grpSpPr>
+        <p:sp>
+          <p:nvSpPr>
+            <p:cNvPr id="41" name="Diagrama de flujo: conector 40">
+              <a:extLst>
+                <a:ext uri="{FF2B5EF4-FFF2-40B4-BE49-F238E27FC236}">
+                  <a16:creationId xmlns:a16="http://schemas.microsoft.com/office/drawing/2014/main" id="{EB851EA3-EBD8-9384-E2AC-B7CC3ED8D5BB}"/>
+                </a:ext>
+              </a:extLst>
+            </p:cNvPr>
+            <p:cNvSpPr/>
+            <p:nvPr/>
+          </p:nvSpPr>
+          <p:spPr>
+            <a:xfrm>
+              <a:off x="6609634" y="1050964"/>
+              <a:ext cx="107872" cy="107872"/>
+            </a:xfrm>
+            <a:prstGeom prst="flowChartConnector">
+              <a:avLst/>
+            </a:prstGeom>
+            <a:solidFill>
+              <a:schemeClr val="accent1"/>
+            </a:solidFill>
+          </p:spPr>
+          <p:style>
+            <a:lnRef idx="2">
+              <a:schemeClr val="accent1">
+                <a:shade val="15000"/>
+              </a:schemeClr>
+            </a:lnRef>
+            <a:fillRef idx="1">
+              <a:schemeClr val="accent1"/>
+            </a:fillRef>
+            <a:effectRef idx="0">
+              <a:schemeClr val="accent1"/>
+            </a:effectRef>
+            <a:fontRef idx="minor">
+              <a:schemeClr val="lt1"/>
+            </a:fontRef>
+          </p:style>
+          <p:txBody>
+            <a:bodyPr rtlCol="0" anchor="ctr"/>
+            <a:lstStyle/>
+            <a:p>
+              <a:pPr algn="ctr"/>
+              <a:endParaRPr lang="es-ES"/>
+            </a:p>
+          </p:txBody>
+        </p:sp>
+        <p:cxnSp>
+          <p:nvCxnSpPr>
+            <p:cNvPr id="42" name="Conector recto 41">
+              <a:extLst>
+                <a:ext uri="{FF2B5EF4-FFF2-40B4-BE49-F238E27FC236}">
+                  <a16:creationId xmlns:a16="http://schemas.microsoft.com/office/drawing/2014/main" id="{8F395F81-795F-DFC3-09F5-B8635E69316D}"/>
+                </a:ext>
+              </a:extLst>
+            </p:cNvPr>
+            <p:cNvCxnSpPr>
+              <a:cxnSpLocks/>
+            </p:cNvCxnSpPr>
+            <p:nvPr/>
+          </p:nvCxnSpPr>
+          <p:spPr>
+            <a:xfrm>
+              <a:off x="6717506" y="1104900"/>
+              <a:ext cx="196889" cy="0"/>
+            </a:xfrm>
+            <a:prstGeom prst="line">
+              <a:avLst/>
+            </a:prstGeom>
+            <a:ln>
+              <a:solidFill>
+                <a:schemeClr val="tx1"/>
+              </a:solidFill>
+            </a:ln>
+          </p:spPr>
+          <p:style>
+            <a:lnRef idx="2">
+              <a:schemeClr val="accent1"/>
+            </a:lnRef>
+            <a:fillRef idx="0">
+              <a:schemeClr val="accent1"/>
+            </a:fillRef>
+            <a:effectRef idx="1">
+              <a:schemeClr val="accent1"/>
+            </a:effectRef>
+            <a:fontRef idx="minor">
+              <a:schemeClr val="tx1"/>
+            </a:fontRef>
+          </p:style>
+        </p:cxnSp>
       </p:grpSp>
     </p:spTree>
     <p:extLst>

</xml_diff>

<commit_message>
Feature: Dbl Click Open Right Sidebar and Various
</commit_message>
<xml_diff>
--- a/public/SystemShapes.pptx
+++ b/public/SystemShapes.pptx
@@ -261,7 +261,7 @@
           <a:p>
             <a:fld id="{3E0CAB7A-0CE4-45EF-934B-7E004E9774A7}" type="datetimeFigureOut">
               <a:rPr lang="es-ES" smtClean="0"/>
-              <a:t>06/05/2024</a:t>
+              <a:t>09/07/2024</a:t>
             </a:fld>
             <a:endParaRPr lang="es-ES"/>
           </a:p>
@@ -459,7 +459,7 @@
           <a:p>
             <a:fld id="{3E0CAB7A-0CE4-45EF-934B-7E004E9774A7}" type="datetimeFigureOut">
               <a:rPr lang="es-ES" smtClean="0"/>
-              <a:t>06/05/2024</a:t>
+              <a:t>09/07/2024</a:t>
             </a:fld>
             <a:endParaRPr lang="es-ES"/>
           </a:p>
@@ -667,7 +667,7 @@
           <a:p>
             <a:fld id="{3E0CAB7A-0CE4-45EF-934B-7E004E9774A7}" type="datetimeFigureOut">
               <a:rPr lang="es-ES" smtClean="0"/>
-              <a:t>06/05/2024</a:t>
+              <a:t>09/07/2024</a:t>
             </a:fld>
             <a:endParaRPr lang="es-ES"/>
           </a:p>
@@ -865,7 +865,7 @@
           <a:p>
             <a:fld id="{3E0CAB7A-0CE4-45EF-934B-7E004E9774A7}" type="datetimeFigureOut">
               <a:rPr lang="es-ES" smtClean="0"/>
-              <a:t>06/05/2024</a:t>
+              <a:t>09/07/2024</a:t>
             </a:fld>
             <a:endParaRPr lang="es-ES"/>
           </a:p>
@@ -1140,7 +1140,7 @@
           <a:p>
             <a:fld id="{3E0CAB7A-0CE4-45EF-934B-7E004E9774A7}" type="datetimeFigureOut">
               <a:rPr lang="es-ES" smtClean="0"/>
-              <a:t>06/05/2024</a:t>
+              <a:t>09/07/2024</a:t>
             </a:fld>
             <a:endParaRPr lang="es-ES"/>
           </a:p>
@@ -1405,7 +1405,7 @@
           <a:p>
             <a:fld id="{3E0CAB7A-0CE4-45EF-934B-7E004E9774A7}" type="datetimeFigureOut">
               <a:rPr lang="es-ES" smtClean="0"/>
-              <a:t>06/05/2024</a:t>
+              <a:t>09/07/2024</a:t>
             </a:fld>
             <a:endParaRPr lang="es-ES"/>
           </a:p>
@@ -1817,7 +1817,7 @@
           <a:p>
             <a:fld id="{3E0CAB7A-0CE4-45EF-934B-7E004E9774A7}" type="datetimeFigureOut">
               <a:rPr lang="es-ES" smtClean="0"/>
-              <a:t>06/05/2024</a:t>
+              <a:t>09/07/2024</a:t>
             </a:fld>
             <a:endParaRPr lang="es-ES"/>
           </a:p>
@@ -1958,7 +1958,7 @@
           <a:p>
             <a:fld id="{3E0CAB7A-0CE4-45EF-934B-7E004E9774A7}" type="datetimeFigureOut">
               <a:rPr lang="es-ES" smtClean="0"/>
-              <a:t>06/05/2024</a:t>
+              <a:t>09/07/2024</a:t>
             </a:fld>
             <a:endParaRPr lang="es-ES"/>
           </a:p>
@@ -2071,7 +2071,7 @@
           <a:p>
             <a:fld id="{3E0CAB7A-0CE4-45EF-934B-7E004E9774A7}" type="datetimeFigureOut">
               <a:rPr lang="es-ES" smtClean="0"/>
-              <a:t>06/05/2024</a:t>
+              <a:t>09/07/2024</a:t>
             </a:fld>
             <a:endParaRPr lang="es-ES"/>
           </a:p>
@@ -2382,7 +2382,7 @@
           <a:p>
             <a:fld id="{3E0CAB7A-0CE4-45EF-934B-7E004E9774A7}" type="datetimeFigureOut">
               <a:rPr lang="es-ES" smtClean="0"/>
-              <a:t>06/05/2024</a:t>
+              <a:t>09/07/2024</a:t>
             </a:fld>
             <a:endParaRPr lang="es-ES"/>
           </a:p>
@@ -2670,7 +2670,7 @@
           <a:p>
             <a:fld id="{3E0CAB7A-0CE4-45EF-934B-7E004E9774A7}" type="datetimeFigureOut">
               <a:rPr lang="es-ES" smtClean="0"/>
-              <a:t>06/05/2024</a:t>
+              <a:t>09/07/2024</a:t>
             </a:fld>
             <a:endParaRPr lang="es-ES"/>
           </a:p>
@@ -2911,7 +2911,7 @@
           <a:p>
             <a:fld id="{3E0CAB7A-0CE4-45EF-934B-7E004E9774A7}" type="datetimeFigureOut">
               <a:rPr lang="es-ES" smtClean="0"/>
-              <a:t>06/05/2024</a:t>
+              <a:t>09/07/2024</a:t>
             </a:fld>
             <a:endParaRPr lang="es-ES"/>
           </a:p>
@@ -6384,6 +6384,58 @@
           <a:p>
             <a:pPr algn="ctr"/>
             <a:endParaRPr lang="es-ES"/>
+          </a:p>
+        </p:txBody>
+      </p:sp>
+      <p:sp>
+        <p:nvSpPr>
+          <p:cNvPr id="2" name="Diagrama de flujo: terminador 21">
+            <a:extLst>
+              <a:ext uri="{FF2B5EF4-FFF2-40B4-BE49-F238E27FC236}">
+                <a16:creationId xmlns:a16="http://schemas.microsoft.com/office/drawing/2014/main" id="{71B52912-4473-7D36-C52C-93A05D6732B9}"/>
+              </a:ext>
+            </a:extLst>
+          </p:cNvPr>
+          <p:cNvSpPr/>
+          <p:nvPr/>
+        </p:nvSpPr>
+        <p:spPr>
+          <a:xfrm>
+            <a:off x="356482" y="4691715"/>
+            <a:ext cx="2484000" cy="1439999"/>
+          </a:xfrm>
+          <a:prstGeom prst="rect">
+            <a:avLst/>
+          </a:prstGeom>
+          <a:solidFill>
+            <a:schemeClr val="accent1">
+              <a:lumMod val="60000"/>
+              <a:lumOff val="40000"/>
+            </a:schemeClr>
+          </a:solidFill>
+        </p:spPr>
+        <p:style>
+          <a:lnRef idx="2">
+            <a:schemeClr val="accent1">
+              <a:shade val="15000"/>
+            </a:schemeClr>
+          </a:lnRef>
+          <a:fillRef idx="1">
+            <a:schemeClr val="accent1"/>
+          </a:fillRef>
+          <a:effectRef idx="0">
+            <a:schemeClr val="accent1"/>
+          </a:effectRef>
+          <a:fontRef idx="minor">
+            <a:schemeClr val="lt1"/>
+          </a:fontRef>
+        </p:style>
+        <p:txBody>
+          <a:bodyPr rtlCol="0" anchor="ctr"/>
+          <a:lstStyle/>
+          <a:p>
+            <a:pPr algn="ctr"/>
+            <a:endParaRPr lang="es-ES" dirty="0"/>
           </a:p>
         </p:txBody>
       </p:sp>

</xml_diff>

<commit_message>
Feature: Painting assemblies and minors
</commit_message>
<xml_diff>
--- a/public/SystemShapes.pptx
+++ b/public/SystemShapes.pptx
@@ -261,7 +261,7 @@
           <a:p>
             <a:fld id="{3E0CAB7A-0CE4-45EF-934B-7E004E9774A7}" type="datetimeFigureOut">
               <a:rPr lang="es-ES" smtClean="0"/>
-              <a:t>09/07/2024</a:t>
+              <a:t>15/07/2024</a:t>
             </a:fld>
             <a:endParaRPr lang="es-ES"/>
           </a:p>
@@ -459,7 +459,7 @@
           <a:p>
             <a:fld id="{3E0CAB7A-0CE4-45EF-934B-7E004E9774A7}" type="datetimeFigureOut">
               <a:rPr lang="es-ES" smtClean="0"/>
-              <a:t>09/07/2024</a:t>
+              <a:t>15/07/2024</a:t>
             </a:fld>
             <a:endParaRPr lang="es-ES"/>
           </a:p>
@@ -667,7 +667,7 @@
           <a:p>
             <a:fld id="{3E0CAB7A-0CE4-45EF-934B-7E004E9774A7}" type="datetimeFigureOut">
               <a:rPr lang="es-ES" smtClean="0"/>
-              <a:t>09/07/2024</a:t>
+              <a:t>15/07/2024</a:t>
             </a:fld>
             <a:endParaRPr lang="es-ES"/>
           </a:p>
@@ -865,7 +865,7 @@
           <a:p>
             <a:fld id="{3E0CAB7A-0CE4-45EF-934B-7E004E9774A7}" type="datetimeFigureOut">
               <a:rPr lang="es-ES" smtClean="0"/>
-              <a:t>09/07/2024</a:t>
+              <a:t>15/07/2024</a:t>
             </a:fld>
             <a:endParaRPr lang="es-ES"/>
           </a:p>
@@ -1140,7 +1140,7 @@
           <a:p>
             <a:fld id="{3E0CAB7A-0CE4-45EF-934B-7E004E9774A7}" type="datetimeFigureOut">
               <a:rPr lang="es-ES" smtClean="0"/>
-              <a:t>09/07/2024</a:t>
+              <a:t>15/07/2024</a:t>
             </a:fld>
             <a:endParaRPr lang="es-ES"/>
           </a:p>
@@ -1405,7 +1405,7 @@
           <a:p>
             <a:fld id="{3E0CAB7A-0CE4-45EF-934B-7E004E9774A7}" type="datetimeFigureOut">
               <a:rPr lang="es-ES" smtClean="0"/>
-              <a:t>09/07/2024</a:t>
+              <a:t>15/07/2024</a:t>
             </a:fld>
             <a:endParaRPr lang="es-ES"/>
           </a:p>
@@ -1817,7 +1817,7 @@
           <a:p>
             <a:fld id="{3E0CAB7A-0CE4-45EF-934B-7E004E9774A7}" type="datetimeFigureOut">
               <a:rPr lang="es-ES" smtClean="0"/>
-              <a:t>09/07/2024</a:t>
+              <a:t>15/07/2024</a:t>
             </a:fld>
             <a:endParaRPr lang="es-ES"/>
           </a:p>
@@ -1958,7 +1958,7 @@
           <a:p>
             <a:fld id="{3E0CAB7A-0CE4-45EF-934B-7E004E9774A7}" type="datetimeFigureOut">
               <a:rPr lang="es-ES" smtClean="0"/>
-              <a:t>09/07/2024</a:t>
+              <a:t>15/07/2024</a:t>
             </a:fld>
             <a:endParaRPr lang="es-ES"/>
           </a:p>
@@ -2071,7 +2071,7 @@
           <a:p>
             <a:fld id="{3E0CAB7A-0CE4-45EF-934B-7E004E9774A7}" type="datetimeFigureOut">
               <a:rPr lang="es-ES" smtClean="0"/>
-              <a:t>09/07/2024</a:t>
+              <a:t>15/07/2024</a:t>
             </a:fld>
             <a:endParaRPr lang="es-ES"/>
           </a:p>
@@ -2382,7 +2382,7 @@
           <a:p>
             <a:fld id="{3E0CAB7A-0CE4-45EF-934B-7E004E9774A7}" type="datetimeFigureOut">
               <a:rPr lang="es-ES" smtClean="0"/>
-              <a:t>09/07/2024</a:t>
+              <a:t>15/07/2024</a:t>
             </a:fld>
             <a:endParaRPr lang="es-ES"/>
           </a:p>
@@ -2670,7 +2670,7 @@
           <a:p>
             <a:fld id="{3E0CAB7A-0CE4-45EF-934B-7E004E9774A7}" type="datetimeFigureOut">
               <a:rPr lang="es-ES" smtClean="0"/>
-              <a:t>09/07/2024</a:t>
+              <a:t>15/07/2024</a:t>
             </a:fld>
             <a:endParaRPr lang="es-ES"/>
           </a:p>
@@ -2911,7 +2911,7 @@
           <a:p>
             <a:fld id="{3E0CAB7A-0CE4-45EF-934B-7E004E9774A7}" type="datetimeFigureOut">
               <a:rPr lang="es-ES" smtClean="0"/>
-              <a:t>09/07/2024</a:t>
+              <a:t>15/07/2024</a:t>
             </a:fld>
             <a:endParaRPr lang="es-ES"/>
           </a:p>
@@ -6488,6 +6488,12 @@
             <a:chOff x="222250" y="193675"/>
             <a:chExt cx="2484000" cy="1440000"/>
           </a:xfrm>
+          <a:solidFill>
+            <a:schemeClr val="accent1">
+              <a:lumMod val="60000"/>
+              <a:lumOff val="40000"/>
+            </a:schemeClr>
+          </a:solidFill>
         </p:grpSpPr>
         <p:sp>
           <p:nvSpPr>
@@ -6509,12 +6515,7 @@
             <a:prstGeom prst="rect">
               <a:avLst/>
             </a:prstGeom>
-            <a:solidFill>
-              <a:schemeClr val="tx2">
-                <a:lumMod val="25000"/>
-                <a:lumOff val="75000"/>
-              </a:schemeClr>
-            </a:solidFill>
+            <a:grpFill/>
           </p:spPr>
           <p:style>
             <a:lnRef idx="2">
@@ -6659,6 +6660,12 @@
             <a:chOff x="2957830" y="193675"/>
             <a:chExt cx="2484000" cy="1440000"/>
           </a:xfrm>
+          <a:solidFill>
+            <a:schemeClr val="accent1">
+              <a:lumMod val="60000"/>
+              <a:lumOff val="40000"/>
+            </a:schemeClr>
+          </a:solidFill>
         </p:grpSpPr>
         <p:sp>
           <p:nvSpPr>
@@ -6680,12 +6687,7 @@
             <a:prstGeom prst="rect">
               <a:avLst/>
             </a:prstGeom>
-            <a:solidFill>
-              <a:schemeClr val="tx2">
-                <a:lumMod val="25000"/>
-                <a:lumOff val="75000"/>
-              </a:schemeClr>
-            </a:solidFill>
+            <a:grpFill/>
           </p:spPr>
           <p:style>
             <a:lnRef idx="2">

</xml_diff>